<commit_message>
Código sql BBDD Inicial #2
Primera versión del código de BBDD.
Correcciones documentación Tablas y Relaciones.
</commit_message>
<xml_diff>
--- a/Documentación Soporte/Documento Tablas - Relaciones Borrador.pptx
+++ b/Documentación Soporte/Documento Tablas - Relaciones Borrador.pptx
@@ -110,7 +110,7 @@
   </p:defaultTextStyle>
   <p:extLst>
     <p:ext uri="{EFAFB233-063F-42B5-8137-9DF3F51BA10A}">
-      <p15:sldGuideLst xmlns:p15="http://schemas.microsoft.com/office/powerpoint/2012/main" xmlns="">
+      <p15:sldGuideLst xmlns="" xmlns:p15="http://schemas.microsoft.com/office/powerpoint/2012/main">
         <p15:guide id="1" orient="horz" pos="2160">
           <p15:clr>
             <a:srgbClr val="A4A3A4"/>
@@ -3122,7 +3122,7 @@
                 <a:gridCol w="1463824">
                   <a:extLst>
                     <a:ext uri="{9D8B030D-6E8A-4147-A177-3AD203B41FA5}">
-                      <a16:colId xmlns:a16="http://schemas.microsoft.com/office/drawing/2014/main" xmlns="" val="20000"/>
+                      <a16:colId xmlns="" xmlns:a16="http://schemas.microsoft.com/office/drawing/2014/main" val="20000"/>
                     </a:ext>
                   </a:extLst>
                 </a:gridCol>
@@ -3144,7 +3144,7 @@
                 </a:tc>
                 <a:extLst>
                   <a:ext uri="{0D108BD9-81ED-4DB2-BD59-A6C34878D82A}">
-                    <a16:rowId xmlns:a16="http://schemas.microsoft.com/office/drawing/2014/main" xmlns="" val="10000"/>
+                    <a16:rowId xmlns="" xmlns:a16="http://schemas.microsoft.com/office/drawing/2014/main" val="10000"/>
                   </a:ext>
                 </a:extLst>
               </a:tr>
@@ -3212,7 +3212,7 @@
                 </a:tc>
                 <a:extLst>
                   <a:ext uri="{0D108BD9-81ED-4DB2-BD59-A6C34878D82A}">
-                    <a16:rowId xmlns:a16="http://schemas.microsoft.com/office/drawing/2014/main" xmlns="" val="10001"/>
+                    <a16:rowId xmlns="" xmlns:a16="http://schemas.microsoft.com/office/drawing/2014/main" val="10001"/>
                   </a:ext>
                 </a:extLst>
               </a:tr>
@@ -3245,7 +3245,7 @@
                 </a:tc>
                 <a:extLst>
                   <a:ext uri="{0D108BD9-81ED-4DB2-BD59-A6C34878D82A}">
-                    <a16:rowId xmlns:a16="http://schemas.microsoft.com/office/drawing/2014/main" xmlns="" val="10002"/>
+                    <a16:rowId xmlns="" xmlns:a16="http://schemas.microsoft.com/office/drawing/2014/main" val="10002"/>
                   </a:ext>
                 </a:extLst>
               </a:tr>
@@ -3281,7 +3281,7 @@
                 <a:gridCol w="1463824">
                   <a:extLst>
                     <a:ext uri="{9D8B030D-6E8A-4147-A177-3AD203B41FA5}">
-                      <a16:colId xmlns:a16="http://schemas.microsoft.com/office/drawing/2014/main" xmlns="" val="20000"/>
+                      <a16:colId xmlns="" xmlns:a16="http://schemas.microsoft.com/office/drawing/2014/main" val="20000"/>
                     </a:ext>
                   </a:extLst>
                 </a:gridCol>
@@ -3303,7 +3303,7 @@
                 </a:tc>
                 <a:extLst>
                   <a:ext uri="{0D108BD9-81ED-4DB2-BD59-A6C34878D82A}">
-                    <a16:rowId xmlns:a16="http://schemas.microsoft.com/office/drawing/2014/main" xmlns="" val="10000"/>
+                    <a16:rowId xmlns="" xmlns:a16="http://schemas.microsoft.com/office/drawing/2014/main" val="10000"/>
                   </a:ext>
                 </a:extLst>
               </a:tr>
@@ -3324,7 +3324,7 @@
                 </a:tc>
                 <a:extLst>
                   <a:ext uri="{0D108BD9-81ED-4DB2-BD59-A6C34878D82A}">
-                    <a16:rowId xmlns:a16="http://schemas.microsoft.com/office/drawing/2014/main" xmlns="" val="10001"/>
+                    <a16:rowId xmlns="" xmlns:a16="http://schemas.microsoft.com/office/drawing/2014/main" val="10001"/>
                   </a:ext>
                 </a:extLst>
               </a:tr>
@@ -3354,13 +3354,8 @@
                     <a:p>
                       <a:r>
                         <a:rPr lang="es-ES" sz="800" dirty="0" smtClean="0"/>
-                        <a:t>APROBADO  (BIN</a:t>
-                      </a:r>
-                      <a:r>
-                        <a:rPr lang="es-ES" sz="800" dirty="0" smtClean="0"/>
-                        <a:t>)</a:t>
-                      </a:r>
-                      <a:endParaRPr lang="es-ES" sz="800" dirty="0" smtClean="0"/>
+                        <a:t>APROBADO  (BIN)</a:t>
+                      </a:r>
                     </a:p>
                     <a:p>
                       <a:r>
@@ -3396,7 +3391,6 @@
                         <a:rPr lang="es-ES" sz="800" dirty="0" smtClean="0"/>
                         <a:t>ID_JP</a:t>
                       </a:r>
-                      <a:endParaRPr lang="es-ES" sz="800" dirty="0" smtClean="0"/>
                     </a:p>
                     <a:p>
                       <a:r>
@@ -3543,7 +3537,7 @@
                 </a:tc>
                 <a:extLst>
                   <a:ext uri="{0D108BD9-81ED-4DB2-BD59-A6C34878D82A}">
-                    <a16:rowId xmlns:a16="http://schemas.microsoft.com/office/drawing/2014/main" xmlns="" val="10002"/>
+                    <a16:rowId xmlns="" xmlns:a16="http://schemas.microsoft.com/office/drawing/2014/main" val="10002"/>
                   </a:ext>
                 </a:extLst>
               </a:tr>
@@ -3579,7 +3573,7 @@
                 <a:gridCol w="1463824">
                   <a:extLst>
                     <a:ext uri="{9D8B030D-6E8A-4147-A177-3AD203B41FA5}">
-                      <a16:colId xmlns:a16="http://schemas.microsoft.com/office/drawing/2014/main" xmlns="" val="20000"/>
+                      <a16:colId xmlns="" xmlns:a16="http://schemas.microsoft.com/office/drawing/2014/main" val="20000"/>
                     </a:ext>
                   </a:extLst>
                 </a:gridCol>
@@ -3601,7 +3595,7 @@
                 </a:tc>
                 <a:extLst>
                   <a:ext uri="{0D108BD9-81ED-4DB2-BD59-A6C34878D82A}">
-                    <a16:rowId xmlns:a16="http://schemas.microsoft.com/office/drawing/2014/main" xmlns="" val="10000"/>
+                    <a16:rowId xmlns="" xmlns:a16="http://schemas.microsoft.com/office/drawing/2014/main" val="10000"/>
                   </a:ext>
                 </a:extLst>
               </a:tr>
@@ -3622,7 +3616,7 @@
                 </a:tc>
                 <a:extLst>
                   <a:ext uri="{0D108BD9-81ED-4DB2-BD59-A6C34878D82A}">
-                    <a16:rowId xmlns:a16="http://schemas.microsoft.com/office/drawing/2014/main" xmlns="" val="10001"/>
+                    <a16:rowId xmlns="" xmlns:a16="http://schemas.microsoft.com/office/drawing/2014/main" val="10001"/>
                   </a:ext>
                 </a:extLst>
               </a:tr>
@@ -3701,14 +3695,12 @@
                         <a:rPr lang="es-ES" sz="800" dirty="0" smtClean="0"/>
                         <a:t>INICIO_TRAMITACION</a:t>
                       </a:r>
-                      <a:endParaRPr lang="es-ES" sz="800" dirty="0" smtClean="0"/>
                     </a:p>
                     <a:p>
                       <a:r>
                         <a:rPr lang="es-ES" sz="800" dirty="0" smtClean="0"/>
                         <a:t>TIPO_CONTRATACION</a:t>
                       </a:r>
-                      <a:endParaRPr lang="es-ES" sz="800" dirty="0" smtClean="0"/>
                     </a:p>
                     <a:p>
                       <a:r>
@@ -3763,7 +3755,6 @@
                         <a:rPr lang="es-ES" sz="800" dirty="0" smtClean="0"/>
                         <a:t>TRAM_ANTICIPADA</a:t>
                       </a:r>
-                      <a:endParaRPr lang="es-ES" sz="800" dirty="0" smtClean="0"/>
                     </a:p>
                     <a:p>
                       <a:r>
@@ -3789,7 +3780,7 @@
                 </a:tc>
                 <a:extLst>
                   <a:ext uri="{0D108BD9-81ED-4DB2-BD59-A6C34878D82A}">
-                    <a16:rowId xmlns:a16="http://schemas.microsoft.com/office/drawing/2014/main" xmlns="" val="10002"/>
+                    <a16:rowId xmlns="" xmlns:a16="http://schemas.microsoft.com/office/drawing/2014/main" val="10002"/>
                   </a:ext>
                 </a:extLst>
               </a:tr>
@@ -3825,7 +3816,7 @@
                 <a:gridCol w="1332402">
                   <a:extLst>
                     <a:ext uri="{9D8B030D-6E8A-4147-A177-3AD203B41FA5}">
-                      <a16:colId xmlns:a16="http://schemas.microsoft.com/office/drawing/2014/main" xmlns="" val="20000"/>
+                      <a16:colId xmlns="" xmlns:a16="http://schemas.microsoft.com/office/drawing/2014/main" val="20000"/>
                     </a:ext>
                   </a:extLst>
                 </a:gridCol>
@@ -3846,7 +3837,7 @@
                 </a:tc>
                 <a:extLst>
                   <a:ext uri="{0D108BD9-81ED-4DB2-BD59-A6C34878D82A}">
-                    <a16:rowId xmlns:a16="http://schemas.microsoft.com/office/drawing/2014/main" xmlns="" val="10000"/>
+                    <a16:rowId xmlns="" xmlns:a16="http://schemas.microsoft.com/office/drawing/2014/main" val="10000"/>
                   </a:ext>
                 </a:extLst>
               </a:tr>
@@ -3873,7 +3864,7 @@
                 </a:tc>
                 <a:extLst>
                   <a:ext uri="{0D108BD9-81ED-4DB2-BD59-A6C34878D82A}">
-                    <a16:rowId xmlns:a16="http://schemas.microsoft.com/office/drawing/2014/main" xmlns="" val="10001"/>
+                    <a16:rowId xmlns="" xmlns:a16="http://schemas.microsoft.com/office/drawing/2014/main" val="10001"/>
                   </a:ext>
                 </a:extLst>
               </a:tr>
@@ -3893,7 +3884,6 @@
                         <a:rPr lang="es-ES" sz="800" dirty="0" smtClean="0"/>
                         <a:t>ID_JP</a:t>
                       </a:r>
-                      <a:endParaRPr lang="es-ES" sz="800" dirty="0" smtClean="0"/>
                     </a:p>
                     <a:p>
                       <a:r>
@@ -3961,7 +3951,7 @@
                 </a:tc>
                 <a:extLst>
                   <a:ext uri="{0D108BD9-81ED-4DB2-BD59-A6C34878D82A}">
-                    <a16:rowId xmlns:a16="http://schemas.microsoft.com/office/drawing/2014/main" xmlns="" val="10002"/>
+                    <a16:rowId xmlns="" xmlns:a16="http://schemas.microsoft.com/office/drawing/2014/main" val="10002"/>
                   </a:ext>
                 </a:extLst>
               </a:tr>
@@ -3997,7 +3987,7 @@
                 <a:gridCol w="1296144">
                   <a:extLst>
                     <a:ext uri="{9D8B030D-6E8A-4147-A177-3AD203B41FA5}">
-                      <a16:colId xmlns:a16="http://schemas.microsoft.com/office/drawing/2014/main" xmlns="" val="20000"/>
+                      <a16:colId xmlns="" xmlns:a16="http://schemas.microsoft.com/office/drawing/2014/main" val="20000"/>
                     </a:ext>
                   </a:extLst>
                 </a:gridCol>
@@ -4023,7 +4013,7 @@
                 </a:tc>
                 <a:extLst>
                   <a:ext uri="{0D108BD9-81ED-4DB2-BD59-A6C34878D82A}">
-                    <a16:rowId xmlns:a16="http://schemas.microsoft.com/office/drawing/2014/main" xmlns="" val="10000"/>
+                    <a16:rowId xmlns="" xmlns:a16="http://schemas.microsoft.com/office/drawing/2014/main" val="10000"/>
                   </a:ext>
                 </a:extLst>
               </a:tr>
@@ -4049,7 +4039,7 @@
                 </a:tc>
                 <a:extLst>
                   <a:ext uri="{0D108BD9-81ED-4DB2-BD59-A6C34878D82A}">
-                    <a16:rowId xmlns:a16="http://schemas.microsoft.com/office/drawing/2014/main" xmlns="" val="10001"/>
+                    <a16:rowId xmlns="" xmlns:a16="http://schemas.microsoft.com/office/drawing/2014/main" val="10001"/>
                   </a:ext>
                 </a:extLst>
               </a:tr>
@@ -4076,7 +4066,7 @@
                 </a:tc>
                 <a:extLst>
                   <a:ext uri="{0D108BD9-81ED-4DB2-BD59-A6C34878D82A}">
-                    <a16:rowId xmlns:a16="http://schemas.microsoft.com/office/drawing/2014/main" xmlns="" val="10002"/>
+                    <a16:rowId xmlns="" xmlns:a16="http://schemas.microsoft.com/office/drawing/2014/main" val="10002"/>
                   </a:ext>
                 </a:extLst>
               </a:tr>
@@ -4112,7 +4102,7 @@
                 <a:gridCol w="1317165">
                   <a:extLst>
                     <a:ext uri="{9D8B030D-6E8A-4147-A177-3AD203B41FA5}">
-                      <a16:colId xmlns:a16="http://schemas.microsoft.com/office/drawing/2014/main" xmlns="" val="20000"/>
+                      <a16:colId xmlns="" xmlns:a16="http://schemas.microsoft.com/office/drawing/2014/main" val="20000"/>
                     </a:ext>
                   </a:extLst>
                 </a:gridCol>
@@ -4134,7 +4124,7 @@
                 </a:tc>
                 <a:extLst>
                   <a:ext uri="{0D108BD9-81ED-4DB2-BD59-A6C34878D82A}">
-                    <a16:rowId xmlns:a16="http://schemas.microsoft.com/office/drawing/2014/main" xmlns="" val="10000"/>
+                    <a16:rowId xmlns="" xmlns:a16="http://schemas.microsoft.com/office/drawing/2014/main" val="10000"/>
                   </a:ext>
                 </a:extLst>
               </a:tr>
@@ -4155,7 +4145,7 @@
                 </a:tc>
                 <a:extLst>
                   <a:ext uri="{0D108BD9-81ED-4DB2-BD59-A6C34878D82A}">
-                    <a16:rowId xmlns:a16="http://schemas.microsoft.com/office/drawing/2014/main" xmlns="" val="10001"/>
+                    <a16:rowId xmlns="" xmlns:a16="http://schemas.microsoft.com/office/drawing/2014/main" val="10001"/>
                   </a:ext>
                 </a:extLst>
               </a:tr>
@@ -4205,7 +4195,6 @@
                         <a:rPr lang="es-ES" sz="800" dirty="0" smtClean="0"/>
                         <a:t>PERIODO</a:t>
                       </a:r>
-                      <a:endParaRPr lang="es-ES" sz="800" dirty="0" smtClean="0"/>
                     </a:p>
                     <a:p>
                       <a:r>
@@ -4262,7 +4251,7 @@
                 </a:tc>
                 <a:extLst>
                   <a:ext uri="{0D108BD9-81ED-4DB2-BD59-A6C34878D82A}">
-                    <a16:rowId xmlns:a16="http://schemas.microsoft.com/office/drawing/2014/main" xmlns="" val="10002"/>
+                    <a16:rowId xmlns="" xmlns:a16="http://schemas.microsoft.com/office/drawing/2014/main" val="10002"/>
                   </a:ext>
                 </a:extLst>
               </a:tr>
@@ -4298,7 +4287,7 @@
                 <a:gridCol w="1080120">
                   <a:extLst>
                     <a:ext uri="{9D8B030D-6E8A-4147-A177-3AD203B41FA5}">
-                      <a16:colId xmlns:a16="http://schemas.microsoft.com/office/drawing/2014/main" xmlns="" val="20000"/>
+                      <a16:colId xmlns="" xmlns:a16="http://schemas.microsoft.com/office/drawing/2014/main" val="20000"/>
                     </a:ext>
                   </a:extLst>
                 </a:gridCol>
@@ -4320,7 +4309,7 @@
                 </a:tc>
                 <a:extLst>
                   <a:ext uri="{0D108BD9-81ED-4DB2-BD59-A6C34878D82A}">
-                    <a16:rowId xmlns:a16="http://schemas.microsoft.com/office/drawing/2014/main" xmlns="" val="10000"/>
+                    <a16:rowId xmlns="" xmlns:a16="http://schemas.microsoft.com/office/drawing/2014/main" val="10000"/>
                   </a:ext>
                 </a:extLst>
               </a:tr>
@@ -4353,7 +4342,7 @@
                 </a:tc>
                 <a:extLst>
                   <a:ext uri="{0D108BD9-81ED-4DB2-BD59-A6C34878D82A}">
-                    <a16:rowId xmlns:a16="http://schemas.microsoft.com/office/drawing/2014/main" xmlns="" val="10001"/>
+                    <a16:rowId xmlns="" xmlns:a16="http://schemas.microsoft.com/office/drawing/2014/main" val="10001"/>
                   </a:ext>
                 </a:extLst>
               </a:tr>
@@ -4386,7 +4375,7 @@
                 </a:tc>
                 <a:extLst>
                   <a:ext uri="{0D108BD9-81ED-4DB2-BD59-A6C34878D82A}">
-                    <a16:rowId xmlns:a16="http://schemas.microsoft.com/office/drawing/2014/main" xmlns="" val="10002"/>
+                    <a16:rowId xmlns="" xmlns:a16="http://schemas.microsoft.com/office/drawing/2014/main" val="10002"/>
                   </a:ext>
                 </a:extLst>
               </a:tr>
@@ -4422,7 +4411,7 @@
                 <a:gridCol w="1512168">
                   <a:extLst>
                     <a:ext uri="{9D8B030D-6E8A-4147-A177-3AD203B41FA5}">
-                      <a16:colId xmlns:a16="http://schemas.microsoft.com/office/drawing/2014/main" xmlns="" val="20000"/>
+                      <a16:colId xmlns="" xmlns:a16="http://schemas.microsoft.com/office/drawing/2014/main" val="20000"/>
                     </a:ext>
                   </a:extLst>
                 </a:gridCol>
@@ -4444,7 +4433,7 @@
                 </a:tc>
                 <a:extLst>
                   <a:ext uri="{0D108BD9-81ED-4DB2-BD59-A6C34878D82A}">
-                    <a16:rowId xmlns:a16="http://schemas.microsoft.com/office/drawing/2014/main" xmlns="" val="10000"/>
+                    <a16:rowId xmlns="" xmlns:a16="http://schemas.microsoft.com/office/drawing/2014/main" val="10000"/>
                   </a:ext>
                 </a:extLst>
               </a:tr>
@@ -4465,7 +4454,7 @@
                 </a:tc>
                 <a:extLst>
                   <a:ext uri="{0D108BD9-81ED-4DB2-BD59-A6C34878D82A}">
-                    <a16:rowId xmlns:a16="http://schemas.microsoft.com/office/drawing/2014/main" xmlns="" val="10001"/>
+                    <a16:rowId xmlns="" xmlns:a16="http://schemas.microsoft.com/office/drawing/2014/main" val="10001"/>
                   </a:ext>
                 </a:extLst>
               </a:tr>
@@ -4502,7 +4491,6 @@
                         <a:rPr lang="es-ES" sz="800" dirty="0" smtClean="0"/>
                         <a:t>TIPO_EVENTO_CONTRATACION</a:t>
                       </a:r>
-                      <a:endParaRPr lang="es-ES" sz="800" dirty="0" smtClean="0"/>
                     </a:p>
                     <a:p>
                       <a:pPr marL="0" marR="0" indent="0" algn="l" defTabSz="914400" rtl="0" eaLnBrk="1" fontAlgn="auto" latinLnBrk="0" hangingPunct="1">
@@ -4596,7 +4584,7 @@
                 </a:tc>
                 <a:extLst>
                   <a:ext uri="{0D108BD9-81ED-4DB2-BD59-A6C34878D82A}">
-                    <a16:rowId xmlns:a16="http://schemas.microsoft.com/office/drawing/2014/main" xmlns="" val="10002"/>
+                    <a16:rowId xmlns="" xmlns:a16="http://schemas.microsoft.com/office/drawing/2014/main" val="10002"/>
                   </a:ext>
                 </a:extLst>
               </a:tr>
@@ -4632,7 +4620,7 @@
                 <a:gridCol w="1463824">
                   <a:extLst>
                     <a:ext uri="{9D8B030D-6E8A-4147-A177-3AD203B41FA5}">
-                      <a16:colId xmlns:a16="http://schemas.microsoft.com/office/drawing/2014/main" xmlns="" val="20000"/>
+                      <a16:colId xmlns="" xmlns:a16="http://schemas.microsoft.com/office/drawing/2014/main" val="20000"/>
                     </a:ext>
                   </a:extLst>
                 </a:gridCol>
@@ -4654,7 +4642,7 @@
                 </a:tc>
                 <a:extLst>
                   <a:ext uri="{0D108BD9-81ED-4DB2-BD59-A6C34878D82A}">
-                    <a16:rowId xmlns:a16="http://schemas.microsoft.com/office/drawing/2014/main" xmlns="" val="10000"/>
+                    <a16:rowId xmlns="" xmlns:a16="http://schemas.microsoft.com/office/drawing/2014/main" val="10000"/>
                   </a:ext>
                 </a:extLst>
               </a:tr>
@@ -4681,7 +4669,7 @@
                 </a:tc>
                 <a:extLst>
                   <a:ext uri="{0D108BD9-81ED-4DB2-BD59-A6C34878D82A}">
-                    <a16:rowId xmlns:a16="http://schemas.microsoft.com/office/drawing/2014/main" xmlns="" val="10001"/>
+                    <a16:rowId xmlns="" xmlns:a16="http://schemas.microsoft.com/office/drawing/2014/main" val="10001"/>
                   </a:ext>
                 </a:extLst>
               </a:tr>
@@ -4702,7 +4690,7 @@
                 </a:tc>
                 <a:extLst>
                   <a:ext uri="{0D108BD9-81ED-4DB2-BD59-A6C34878D82A}">
-                    <a16:rowId xmlns:a16="http://schemas.microsoft.com/office/drawing/2014/main" xmlns="" val="10002"/>
+                    <a16:rowId xmlns="" xmlns:a16="http://schemas.microsoft.com/office/drawing/2014/main" val="10002"/>
                   </a:ext>
                 </a:extLst>
               </a:tr>
@@ -5045,7 +5033,7 @@
                 <a:gridCol w="1080120">
                   <a:extLst>
                     <a:ext uri="{9D8B030D-6E8A-4147-A177-3AD203B41FA5}">
-                      <a16:colId xmlns:a16="http://schemas.microsoft.com/office/drawing/2014/main" xmlns="" val="20000"/>
+                      <a16:colId xmlns="" xmlns:a16="http://schemas.microsoft.com/office/drawing/2014/main" val="20000"/>
                     </a:ext>
                   </a:extLst>
                 </a:gridCol>
@@ -5067,7 +5055,7 @@
                 </a:tc>
                 <a:extLst>
                   <a:ext uri="{0D108BD9-81ED-4DB2-BD59-A6C34878D82A}">
-                    <a16:rowId xmlns:a16="http://schemas.microsoft.com/office/drawing/2014/main" xmlns="" val="10000"/>
+                    <a16:rowId xmlns="" xmlns:a16="http://schemas.microsoft.com/office/drawing/2014/main" val="10000"/>
                   </a:ext>
                 </a:extLst>
               </a:tr>
@@ -5094,7 +5082,7 @@
                 </a:tc>
                 <a:extLst>
                   <a:ext uri="{0D108BD9-81ED-4DB2-BD59-A6C34878D82A}">
-                    <a16:rowId xmlns:a16="http://schemas.microsoft.com/office/drawing/2014/main" xmlns="" val="10001"/>
+                    <a16:rowId xmlns="" xmlns:a16="http://schemas.microsoft.com/office/drawing/2014/main" val="10001"/>
                   </a:ext>
                 </a:extLst>
               </a:tr>
@@ -5127,7 +5115,7 @@
                 </a:tc>
                 <a:extLst>
                   <a:ext uri="{0D108BD9-81ED-4DB2-BD59-A6C34878D82A}">
-                    <a16:rowId xmlns:a16="http://schemas.microsoft.com/office/drawing/2014/main" xmlns="" val="10002"/>
+                    <a16:rowId xmlns="" xmlns:a16="http://schemas.microsoft.com/office/drawing/2014/main" val="10002"/>
                   </a:ext>
                 </a:extLst>
               </a:tr>
@@ -5203,7 +5191,7 @@
                 <a:gridCol w="1368152">
                   <a:extLst>
                     <a:ext uri="{9D8B030D-6E8A-4147-A177-3AD203B41FA5}">
-                      <a16:colId xmlns:a16="http://schemas.microsoft.com/office/drawing/2014/main" xmlns="" val="20000"/>
+                      <a16:colId xmlns="" xmlns:a16="http://schemas.microsoft.com/office/drawing/2014/main" val="20000"/>
                     </a:ext>
                   </a:extLst>
                 </a:gridCol>
@@ -5225,7 +5213,7 @@
                 </a:tc>
                 <a:extLst>
                   <a:ext uri="{0D108BD9-81ED-4DB2-BD59-A6C34878D82A}">
-                    <a16:rowId xmlns:a16="http://schemas.microsoft.com/office/drawing/2014/main" xmlns="" val="10000"/>
+                    <a16:rowId xmlns="" xmlns:a16="http://schemas.microsoft.com/office/drawing/2014/main" val="10000"/>
                   </a:ext>
                 </a:extLst>
               </a:tr>
@@ -5294,7 +5282,7 @@
                 </a:tc>
                 <a:extLst>
                   <a:ext uri="{0D108BD9-81ED-4DB2-BD59-A6C34878D82A}">
-                    <a16:rowId xmlns:a16="http://schemas.microsoft.com/office/drawing/2014/main" xmlns="" val="10001"/>
+                    <a16:rowId xmlns="" xmlns:a16="http://schemas.microsoft.com/office/drawing/2014/main" val="10001"/>
                   </a:ext>
                 </a:extLst>
               </a:tr>
@@ -5327,7 +5315,7 @@
                 </a:tc>
                 <a:extLst>
                   <a:ext uri="{0D108BD9-81ED-4DB2-BD59-A6C34878D82A}">
-                    <a16:rowId xmlns:a16="http://schemas.microsoft.com/office/drawing/2014/main" xmlns="" val="10002"/>
+                    <a16:rowId xmlns="" xmlns:a16="http://schemas.microsoft.com/office/drawing/2014/main" val="10002"/>
                   </a:ext>
                 </a:extLst>
               </a:tr>
@@ -5380,7 +5368,7 @@
           <p:cNvPr id="20" name="CuadroTexto 19">
             <a:extLst>
               <a:ext uri="{FF2B5EF4-FFF2-40B4-BE49-F238E27FC236}">
-                <a16:creationId xmlns:a16="http://schemas.microsoft.com/office/drawing/2014/main" xmlns="" id="{58ABF96F-D80D-4391-85D2-883FE28F91A0}"/>
+                <a16:creationId xmlns="" xmlns:a16="http://schemas.microsoft.com/office/drawing/2014/main" id="{58ABF96F-D80D-4391-85D2-883FE28F91A0}"/>
               </a:ext>
             </a:extLst>
           </p:cNvPr>
@@ -5415,7 +5403,7 @@
           <p:cNvPr id="39" name="CuadroTexto 38">
             <a:extLst>
               <a:ext uri="{FF2B5EF4-FFF2-40B4-BE49-F238E27FC236}">
-                <a16:creationId xmlns:a16="http://schemas.microsoft.com/office/drawing/2014/main" xmlns="" id="{6B08FE2C-B795-482D-8B2D-91CAB6048C42}"/>
+                <a16:creationId xmlns="" xmlns:a16="http://schemas.microsoft.com/office/drawing/2014/main" id="{6B08FE2C-B795-482D-8B2D-91CAB6048C42}"/>
               </a:ext>
             </a:extLst>
           </p:cNvPr>
@@ -5450,7 +5438,7 @@
           <p:cNvPr id="42" name="CuadroTexto 41">
             <a:extLst>
               <a:ext uri="{FF2B5EF4-FFF2-40B4-BE49-F238E27FC236}">
-                <a16:creationId xmlns:a16="http://schemas.microsoft.com/office/drawing/2014/main" xmlns="" id="{D4BD3DB6-0773-492F-8371-E4DBF04AB502}"/>
+                <a16:creationId xmlns="" xmlns:a16="http://schemas.microsoft.com/office/drawing/2014/main" id="{D4BD3DB6-0773-492F-8371-E4DBF04AB502}"/>
               </a:ext>
             </a:extLst>
           </p:cNvPr>
@@ -5486,7 +5474,7 @@
           <p:cNvPr id="43" name="CuadroTexto 42">
             <a:extLst>
               <a:ext uri="{FF2B5EF4-FFF2-40B4-BE49-F238E27FC236}">
-                <a16:creationId xmlns:a16="http://schemas.microsoft.com/office/drawing/2014/main" xmlns="" id="{319322CE-E44B-4D1D-8E0E-B3B87AE651CB}"/>
+                <a16:creationId xmlns="" xmlns:a16="http://schemas.microsoft.com/office/drawing/2014/main" id="{319322CE-E44B-4D1D-8E0E-B3B87AE651CB}"/>
               </a:ext>
             </a:extLst>
           </p:cNvPr>
@@ -5521,7 +5509,7 @@
           <p:cNvPr id="45" name="CuadroTexto 44">
             <a:extLst>
               <a:ext uri="{FF2B5EF4-FFF2-40B4-BE49-F238E27FC236}">
-                <a16:creationId xmlns:a16="http://schemas.microsoft.com/office/drawing/2014/main" xmlns="" id="{58DDF0F6-557A-42E3-87C5-C25B3173C4ED}"/>
+                <a16:creationId xmlns="" xmlns:a16="http://schemas.microsoft.com/office/drawing/2014/main" id="{58DDF0F6-557A-42E3-87C5-C25B3173C4ED}"/>
               </a:ext>
             </a:extLst>
           </p:cNvPr>
@@ -5556,7 +5544,7 @@
           <p:cNvPr id="46" name="CuadroTexto 45">
             <a:extLst>
               <a:ext uri="{FF2B5EF4-FFF2-40B4-BE49-F238E27FC236}">
-                <a16:creationId xmlns:a16="http://schemas.microsoft.com/office/drawing/2014/main" xmlns="" id="{55F53D7F-2119-4913-AA53-D870B574148E}"/>
+                <a16:creationId xmlns="" xmlns:a16="http://schemas.microsoft.com/office/drawing/2014/main" id="{55F53D7F-2119-4913-AA53-D870B574148E}"/>
               </a:ext>
             </a:extLst>
           </p:cNvPr>
@@ -5591,7 +5579,7 @@
           <p:cNvPr id="52" name="CuadroTexto 51">
             <a:extLst>
               <a:ext uri="{FF2B5EF4-FFF2-40B4-BE49-F238E27FC236}">
-                <a16:creationId xmlns:a16="http://schemas.microsoft.com/office/drawing/2014/main" xmlns="" id="{B6D70908-F77F-48B9-9026-68A9D9B4D50E}"/>
+                <a16:creationId xmlns="" xmlns:a16="http://schemas.microsoft.com/office/drawing/2014/main" id="{B6D70908-F77F-48B9-9026-68A9D9B4D50E}"/>
               </a:ext>
             </a:extLst>
           </p:cNvPr>
@@ -5626,7 +5614,7 @@
           <p:cNvPr id="53" name="CuadroTexto 52">
             <a:extLst>
               <a:ext uri="{FF2B5EF4-FFF2-40B4-BE49-F238E27FC236}">
-                <a16:creationId xmlns:a16="http://schemas.microsoft.com/office/drawing/2014/main" xmlns="" id="{753AD79F-CA2B-4809-8F9C-D46F075A8F66}"/>
+                <a16:creationId xmlns="" xmlns:a16="http://schemas.microsoft.com/office/drawing/2014/main" id="{753AD79F-CA2B-4809-8F9C-D46F075A8F66}"/>
               </a:ext>
             </a:extLst>
           </p:cNvPr>
@@ -5661,7 +5649,7 @@
           <p:cNvPr id="57" name="CuadroTexto 56">
             <a:extLst>
               <a:ext uri="{FF2B5EF4-FFF2-40B4-BE49-F238E27FC236}">
-                <a16:creationId xmlns:a16="http://schemas.microsoft.com/office/drawing/2014/main" xmlns="" id="{D5180711-4B86-4B2F-956C-8DDD8710CE54}"/>
+                <a16:creationId xmlns="" xmlns:a16="http://schemas.microsoft.com/office/drawing/2014/main" id="{D5180711-4B86-4B2F-956C-8DDD8710CE54}"/>
               </a:ext>
             </a:extLst>
           </p:cNvPr>
@@ -5696,7 +5684,7 @@
           <p:cNvPr id="58" name="CuadroTexto 57">
             <a:extLst>
               <a:ext uri="{FF2B5EF4-FFF2-40B4-BE49-F238E27FC236}">
-                <a16:creationId xmlns:a16="http://schemas.microsoft.com/office/drawing/2014/main" xmlns="" id="{D7B2DB04-F793-460A-B7CB-1510DCB68D1D}"/>
+                <a16:creationId xmlns="" xmlns:a16="http://schemas.microsoft.com/office/drawing/2014/main" id="{D7B2DB04-F793-460A-B7CB-1510DCB68D1D}"/>
               </a:ext>
             </a:extLst>
           </p:cNvPr>
@@ -5731,7 +5719,7 @@
           <p:cNvPr id="66" name="18 Tabla">
             <a:extLst>
               <a:ext uri="{FF2B5EF4-FFF2-40B4-BE49-F238E27FC236}">
-                <a16:creationId xmlns:a16="http://schemas.microsoft.com/office/drawing/2014/main" xmlns="" id="{05566C85-30C2-4CE1-8CE7-EDB88250823F}"/>
+                <a16:creationId xmlns="" xmlns:a16="http://schemas.microsoft.com/office/drawing/2014/main" id="{05566C85-30C2-4CE1-8CE7-EDB88250823F}"/>
               </a:ext>
             </a:extLst>
           </p:cNvPr>
@@ -5760,7 +5748,7 @@
                 <a:gridCol w="1920581">
                   <a:extLst>
                     <a:ext uri="{9D8B030D-6E8A-4147-A177-3AD203B41FA5}">
-                      <a16:colId xmlns:a16="http://schemas.microsoft.com/office/drawing/2014/main" xmlns="" val="20000"/>
+                      <a16:colId xmlns="" xmlns:a16="http://schemas.microsoft.com/office/drawing/2014/main" val="20000"/>
                     </a:ext>
                   </a:extLst>
                 </a:gridCol>
@@ -5782,7 +5770,7 @@
                 </a:tc>
                 <a:extLst>
                   <a:ext uri="{0D108BD9-81ED-4DB2-BD59-A6C34878D82A}">
-                    <a16:rowId xmlns:a16="http://schemas.microsoft.com/office/drawing/2014/main" xmlns="" val="10000"/>
+                    <a16:rowId xmlns="" xmlns:a16="http://schemas.microsoft.com/office/drawing/2014/main" val="10000"/>
                   </a:ext>
                 </a:extLst>
               </a:tr>
@@ -5815,7 +5803,7 @@
                 </a:tc>
                 <a:extLst>
                   <a:ext uri="{0D108BD9-81ED-4DB2-BD59-A6C34878D82A}">
-                    <a16:rowId xmlns:a16="http://schemas.microsoft.com/office/drawing/2014/main" xmlns="" val="10001"/>
+                    <a16:rowId xmlns="" xmlns:a16="http://schemas.microsoft.com/office/drawing/2014/main" val="10001"/>
                   </a:ext>
                 </a:extLst>
               </a:tr>
@@ -5836,7 +5824,7 @@
                 </a:tc>
                 <a:extLst>
                   <a:ext uri="{0D108BD9-81ED-4DB2-BD59-A6C34878D82A}">
-                    <a16:rowId xmlns:a16="http://schemas.microsoft.com/office/drawing/2014/main" xmlns="" val="10002"/>
+                    <a16:rowId xmlns="" xmlns:a16="http://schemas.microsoft.com/office/drawing/2014/main" val="10002"/>
                   </a:ext>
                 </a:extLst>
               </a:tr>
@@ -5849,7 +5837,7 @@
           <p:cNvPr id="67" name="23 Conector angular">
             <a:extLst>
               <a:ext uri="{FF2B5EF4-FFF2-40B4-BE49-F238E27FC236}">
-                <a16:creationId xmlns:a16="http://schemas.microsoft.com/office/drawing/2014/main" xmlns="" id="{651FD637-AEF2-4614-B81D-AA28E6099CB3}"/>
+                <a16:creationId xmlns="" xmlns:a16="http://schemas.microsoft.com/office/drawing/2014/main" id="{651FD637-AEF2-4614-B81D-AA28E6099CB3}"/>
               </a:ext>
             </a:extLst>
           </p:cNvPr>
@@ -5892,7 +5880,7 @@
           <p:cNvPr id="68" name="CuadroTexto 67">
             <a:extLst>
               <a:ext uri="{FF2B5EF4-FFF2-40B4-BE49-F238E27FC236}">
-                <a16:creationId xmlns:a16="http://schemas.microsoft.com/office/drawing/2014/main" xmlns="" id="{A558D5E9-768D-44B0-A51D-DF01F25E9C04}"/>
+                <a16:creationId xmlns="" xmlns:a16="http://schemas.microsoft.com/office/drawing/2014/main" id="{A558D5E9-768D-44B0-A51D-DF01F25E9C04}"/>
               </a:ext>
             </a:extLst>
           </p:cNvPr>
@@ -5950,7 +5938,7 @@
                 <a:gridCol w="756085">
                   <a:extLst>
                     <a:ext uri="{9D8B030D-6E8A-4147-A177-3AD203B41FA5}">
-                      <a16:colId xmlns:a16="http://schemas.microsoft.com/office/drawing/2014/main" xmlns="" val="20000"/>
+                      <a16:colId xmlns="" xmlns:a16="http://schemas.microsoft.com/office/drawing/2014/main" val="20000"/>
                     </a:ext>
                   </a:extLst>
                 </a:gridCol>
@@ -5972,7 +5960,7 @@
                 </a:tc>
                 <a:extLst>
                   <a:ext uri="{0D108BD9-81ED-4DB2-BD59-A6C34878D82A}">
-                    <a16:rowId xmlns:a16="http://schemas.microsoft.com/office/drawing/2014/main" xmlns="" val="10000"/>
+                    <a16:rowId xmlns="" xmlns:a16="http://schemas.microsoft.com/office/drawing/2014/main" val="10000"/>
                   </a:ext>
                 </a:extLst>
               </a:tr>
@@ -5993,7 +5981,7 @@
                 </a:tc>
                 <a:extLst>
                   <a:ext uri="{0D108BD9-81ED-4DB2-BD59-A6C34878D82A}">
-                    <a16:rowId xmlns:a16="http://schemas.microsoft.com/office/drawing/2014/main" xmlns="" val="10001"/>
+                    <a16:rowId xmlns="" xmlns:a16="http://schemas.microsoft.com/office/drawing/2014/main" val="10001"/>
                   </a:ext>
                 </a:extLst>
               </a:tr>
@@ -6020,7 +6008,7 @@
                 </a:tc>
                 <a:extLst>
                   <a:ext uri="{0D108BD9-81ED-4DB2-BD59-A6C34878D82A}">
-                    <a16:rowId xmlns:a16="http://schemas.microsoft.com/office/drawing/2014/main" xmlns="" val="10002"/>
+                    <a16:rowId xmlns="" xmlns:a16="http://schemas.microsoft.com/office/drawing/2014/main" val="10002"/>
                   </a:ext>
                 </a:extLst>
               </a:tr>
@@ -6072,7 +6060,7 @@
           <p:cNvPr id="70" name="CuadroTexto 38">
             <a:extLst>
               <a:ext uri="{FF2B5EF4-FFF2-40B4-BE49-F238E27FC236}">
-                <a16:creationId xmlns:a16="http://schemas.microsoft.com/office/drawing/2014/main" xmlns="" id="{6B08FE2C-B795-482D-8B2D-91CAB6048C42}"/>
+                <a16:creationId xmlns="" xmlns:a16="http://schemas.microsoft.com/office/drawing/2014/main" id="{6B08FE2C-B795-482D-8B2D-91CAB6048C42}"/>
               </a:ext>
             </a:extLst>
           </p:cNvPr>
@@ -6160,7 +6148,7 @@
                 <a:gridCol w="1296144">
                   <a:extLst>
                     <a:ext uri="{9D8B030D-6E8A-4147-A177-3AD203B41FA5}">
-                      <a16:colId xmlns:a16="http://schemas.microsoft.com/office/drawing/2014/main" xmlns="" val="20000"/>
+                      <a16:colId xmlns="" xmlns:a16="http://schemas.microsoft.com/office/drawing/2014/main" val="20000"/>
                     </a:ext>
                   </a:extLst>
                 </a:gridCol>
@@ -6182,7 +6170,7 @@
                 </a:tc>
                 <a:extLst>
                   <a:ext uri="{0D108BD9-81ED-4DB2-BD59-A6C34878D82A}">
-                    <a16:rowId xmlns:a16="http://schemas.microsoft.com/office/drawing/2014/main" xmlns="" val="10000"/>
+                    <a16:rowId xmlns="" xmlns:a16="http://schemas.microsoft.com/office/drawing/2014/main" val="10000"/>
                   </a:ext>
                 </a:extLst>
               </a:tr>
@@ -6245,7 +6233,7 @@
                 </a:tc>
                 <a:extLst>
                   <a:ext uri="{0D108BD9-81ED-4DB2-BD59-A6C34878D82A}">
-                    <a16:rowId xmlns:a16="http://schemas.microsoft.com/office/drawing/2014/main" xmlns="" val="10001"/>
+                    <a16:rowId xmlns="" xmlns:a16="http://schemas.microsoft.com/office/drawing/2014/main" val="10001"/>
                   </a:ext>
                 </a:extLst>
               </a:tr>
@@ -6282,7 +6270,7 @@
                 </a:tc>
                 <a:extLst>
                   <a:ext uri="{0D108BD9-81ED-4DB2-BD59-A6C34878D82A}">
-                    <a16:rowId xmlns:a16="http://schemas.microsoft.com/office/drawing/2014/main" xmlns="" val="10002"/>
+                    <a16:rowId xmlns="" xmlns:a16="http://schemas.microsoft.com/office/drawing/2014/main" val="10002"/>
                   </a:ext>
                 </a:extLst>
               </a:tr>
@@ -6334,7 +6322,7 @@
           <p:cNvPr id="61" name="CuadroTexto 67">
             <a:extLst>
               <a:ext uri="{FF2B5EF4-FFF2-40B4-BE49-F238E27FC236}">
-                <a16:creationId xmlns:a16="http://schemas.microsoft.com/office/drawing/2014/main" xmlns="" id="{A558D5E9-768D-44B0-A51D-DF01F25E9C04}"/>
+                <a16:creationId xmlns="" xmlns:a16="http://schemas.microsoft.com/office/drawing/2014/main" id="{A558D5E9-768D-44B0-A51D-DF01F25E9C04}"/>
               </a:ext>
             </a:extLst>
           </p:cNvPr>
@@ -6369,7 +6357,7 @@
           <p:cNvPr id="62" name="CuadroTexto 67">
             <a:extLst>
               <a:ext uri="{FF2B5EF4-FFF2-40B4-BE49-F238E27FC236}">
-                <a16:creationId xmlns:a16="http://schemas.microsoft.com/office/drawing/2014/main" xmlns="" id="{A558D5E9-768D-44B0-A51D-DF01F25E9C04}"/>
+                <a16:creationId xmlns="" xmlns:a16="http://schemas.microsoft.com/office/drawing/2014/main" id="{A558D5E9-768D-44B0-A51D-DF01F25E9C04}"/>
               </a:ext>
             </a:extLst>
           </p:cNvPr>
@@ -6427,7 +6415,7 @@
                 <a:gridCol w="756085">
                   <a:extLst>
                     <a:ext uri="{9D8B030D-6E8A-4147-A177-3AD203B41FA5}">
-                      <a16:colId xmlns:a16="http://schemas.microsoft.com/office/drawing/2014/main" xmlns="" val="20000"/>
+                      <a16:colId xmlns="" xmlns:a16="http://schemas.microsoft.com/office/drawing/2014/main" val="20000"/>
                     </a:ext>
                   </a:extLst>
                 </a:gridCol>
@@ -6449,7 +6437,7 @@
                 </a:tc>
                 <a:extLst>
                   <a:ext uri="{0D108BD9-81ED-4DB2-BD59-A6C34878D82A}">
-                    <a16:rowId xmlns:a16="http://schemas.microsoft.com/office/drawing/2014/main" xmlns="" val="10000"/>
+                    <a16:rowId xmlns="" xmlns:a16="http://schemas.microsoft.com/office/drawing/2014/main" val="10000"/>
                   </a:ext>
                 </a:extLst>
               </a:tr>
@@ -6470,7 +6458,7 @@
                 </a:tc>
                 <a:extLst>
                   <a:ext uri="{0D108BD9-81ED-4DB2-BD59-A6C34878D82A}">
-                    <a16:rowId xmlns:a16="http://schemas.microsoft.com/office/drawing/2014/main" xmlns="" val="10001"/>
+                    <a16:rowId xmlns="" xmlns:a16="http://schemas.microsoft.com/office/drawing/2014/main" val="10001"/>
                   </a:ext>
                 </a:extLst>
               </a:tr>
@@ -6484,7 +6472,6 @@
                         <a:rPr lang="es-ES" sz="800" dirty="0" smtClean="0"/>
                         <a:t>TIPO_ATRIBUTO</a:t>
                       </a:r>
-                      <a:endParaRPr lang="es-ES" sz="800" dirty="0" smtClean="0"/>
                     </a:p>
                     <a:p>
                       <a:r>
@@ -6498,7 +6485,7 @@
                 </a:tc>
                 <a:extLst>
                   <a:ext uri="{0D108BD9-81ED-4DB2-BD59-A6C34878D82A}">
-                    <a16:rowId xmlns:a16="http://schemas.microsoft.com/office/drawing/2014/main" xmlns="" val="10002"/>
+                    <a16:rowId xmlns="" xmlns:a16="http://schemas.microsoft.com/office/drawing/2014/main" val="10002"/>
                   </a:ext>
                 </a:extLst>
               </a:tr>
@@ -6550,7 +6537,7 @@
           <p:cNvPr id="63" name="CuadroTexto 38">
             <a:extLst>
               <a:ext uri="{FF2B5EF4-FFF2-40B4-BE49-F238E27FC236}">
-                <a16:creationId xmlns:a16="http://schemas.microsoft.com/office/drawing/2014/main" xmlns="" id="{6B08FE2C-B795-482D-8B2D-91CAB6048C42}"/>
+                <a16:creationId xmlns="" xmlns:a16="http://schemas.microsoft.com/office/drawing/2014/main" id="{6B08FE2C-B795-482D-8B2D-91CAB6048C42}"/>
               </a:ext>
             </a:extLst>
           </p:cNvPr>
@@ -6608,7 +6595,7 @@
                 <a:gridCol w="1317165">
                   <a:extLst>
                     <a:ext uri="{9D8B030D-6E8A-4147-A177-3AD203B41FA5}">
-                      <a16:colId xmlns:a16="http://schemas.microsoft.com/office/drawing/2014/main" xmlns="" val="20000"/>
+                      <a16:colId xmlns="" xmlns:a16="http://schemas.microsoft.com/office/drawing/2014/main" val="20000"/>
                     </a:ext>
                   </a:extLst>
                 </a:gridCol>
@@ -6638,7 +6625,7 @@
                 </a:tc>
                 <a:extLst>
                   <a:ext uri="{0D108BD9-81ED-4DB2-BD59-A6C34878D82A}">
-                    <a16:rowId xmlns:a16="http://schemas.microsoft.com/office/drawing/2014/main" xmlns="" val="10000"/>
+                    <a16:rowId xmlns="" xmlns:a16="http://schemas.microsoft.com/office/drawing/2014/main" val="10000"/>
                   </a:ext>
                 </a:extLst>
               </a:tr>
@@ -6659,7 +6646,7 @@
                 </a:tc>
                 <a:extLst>
                   <a:ext uri="{0D108BD9-81ED-4DB2-BD59-A6C34878D82A}">
-                    <a16:rowId xmlns:a16="http://schemas.microsoft.com/office/drawing/2014/main" xmlns="" val="10001"/>
+                    <a16:rowId xmlns="" xmlns:a16="http://schemas.microsoft.com/office/drawing/2014/main" val="10001"/>
                   </a:ext>
                 </a:extLst>
               </a:tr>
@@ -6692,7 +6679,7 @@
                 </a:tc>
                 <a:extLst>
                   <a:ext uri="{0D108BD9-81ED-4DB2-BD59-A6C34878D82A}">
-                    <a16:rowId xmlns:a16="http://schemas.microsoft.com/office/drawing/2014/main" xmlns="" val="10002"/>
+                    <a16:rowId xmlns="" xmlns:a16="http://schemas.microsoft.com/office/drawing/2014/main" val="10002"/>
                   </a:ext>
                 </a:extLst>
               </a:tr>
@@ -6743,7 +6730,7 @@
           <p:cNvPr id="72" name="CuadroTexto 67">
             <a:extLst>
               <a:ext uri="{FF2B5EF4-FFF2-40B4-BE49-F238E27FC236}">
-                <a16:creationId xmlns:a16="http://schemas.microsoft.com/office/drawing/2014/main" xmlns="" id="{A558D5E9-768D-44B0-A51D-DF01F25E9C04}"/>
+                <a16:creationId xmlns="" xmlns:a16="http://schemas.microsoft.com/office/drawing/2014/main" id="{A558D5E9-768D-44B0-A51D-DF01F25E9C04}"/>
               </a:ext>
             </a:extLst>
           </p:cNvPr>
@@ -6801,7 +6788,7 @@
                 <a:gridCol w="1688172">
                   <a:extLst>
                     <a:ext uri="{9D8B030D-6E8A-4147-A177-3AD203B41FA5}">
-                      <a16:colId xmlns:a16="http://schemas.microsoft.com/office/drawing/2014/main" xmlns="" val="20000"/>
+                      <a16:colId xmlns="" xmlns:a16="http://schemas.microsoft.com/office/drawing/2014/main" val="20000"/>
                     </a:ext>
                   </a:extLst>
                 </a:gridCol>
@@ -6823,7 +6810,7 @@
                 </a:tc>
                 <a:extLst>
                   <a:ext uri="{0D108BD9-81ED-4DB2-BD59-A6C34878D82A}">
-                    <a16:rowId xmlns:a16="http://schemas.microsoft.com/office/drawing/2014/main" xmlns="" val="10000"/>
+                    <a16:rowId xmlns="" xmlns:a16="http://schemas.microsoft.com/office/drawing/2014/main" val="10000"/>
                   </a:ext>
                 </a:extLst>
               </a:tr>
@@ -6844,7 +6831,7 @@
                 </a:tc>
                 <a:extLst>
                   <a:ext uri="{0D108BD9-81ED-4DB2-BD59-A6C34878D82A}">
-                    <a16:rowId xmlns:a16="http://schemas.microsoft.com/office/drawing/2014/main" xmlns="" val="10001"/>
+                    <a16:rowId xmlns="" xmlns:a16="http://schemas.microsoft.com/office/drawing/2014/main" val="10001"/>
                   </a:ext>
                 </a:extLst>
               </a:tr>
@@ -6858,7 +6845,6 @@
                         <a:rPr lang="es-ES" sz="800" dirty="0" smtClean="0"/>
                         <a:t>NUM_FACTURA</a:t>
                       </a:r>
-                      <a:endParaRPr lang="es-ES" sz="800" dirty="0" smtClean="0"/>
                     </a:p>
                     <a:p>
                       <a:pPr marL="0" marR="0" indent="0" algn="l" defTabSz="914400" rtl="0" eaLnBrk="1" fontAlgn="auto" latinLnBrk="0" hangingPunct="1">
@@ -6974,7 +6960,7 @@
                 </a:tc>
                 <a:extLst>
                   <a:ext uri="{0D108BD9-81ED-4DB2-BD59-A6C34878D82A}">
-                    <a16:rowId xmlns:a16="http://schemas.microsoft.com/office/drawing/2014/main" xmlns="" val="10002"/>
+                    <a16:rowId xmlns="" xmlns:a16="http://schemas.microsoft.com/office/drawing/2014/main" val="10002"/>
                   </a:ext>
                 </a:extLst>
               </a:tr>
@@ -7027,7 +7013,7 @@
           <p:cNvPr id="75" name="CuadroTexto 67">
             <a:extLst>
               <a:ext uri="{FF2B5EF4-FFF2-40B4-BE49-F238E27FC236}">
-                <a16:creationId xmlns:a16="http://schemas.microsoft.com/office/drawing/2014/main" xmlns="" id="{A558D5E9-768D-44B0-A51D-DF01F25E9C04}"/>
+                <a16:creationId xmlns="" xmlns:a16="http://schemas.microsoft.com/office/drawing/2014/main" id="{A558D5E9-768D-44B0-A51D-DF01F25E9C04}"/>
               </a:ext>
             </a:extLst>
           </p:cNvPr>
@@ -7085,7 +7071,7 @@
                 <a:gridCol w="1512168">
                   <a:extLst>
                     <a:ext uri="{9D8B030D-6E8A-4147-A177-3AD203B41FA5}">
-                      <a16:colId xmlns:a16="http://schemas.microsoft.com/office/drawing/2014/main" xmlns="" val="20000"/>
+                      <a16:colId xmlns="" xmlns:a16="http://schemas.microsoft.com/office/drawing/2014/main" val="20000"/>
                     </a:ext>
                   </a:extLst>
                 </a:gridCol>
@@ -7107,7 +7093,7 @@
                 </a:tc>
                 <a:extLst>
                   <a:ext uri="{0D108BD9-81ED-4DB2-BD59-A6C34878D82A}">
-                    <a16:rowId xmlns:a16="http://schemas.microsoft.com/office/drawing/2014/main" xmlns="" val="10000"/>
+                    <a16:rowId xmlns="" xmlns:a16="http://schemas.microsoft.com/office/drawing/2014/main" val="10000"/>
                   </a:ext>
                 </a:extLst>
               </a:tr>
@@ -7128,7 +7114,7 @@
                 </a:tc>
                 <a:extLst>
                   <a:ext uri="{0D108BD9-81ED-4DB2-BD59-A6C34878D82A}">
-                    <a16:rowId xmlns:a16="http://schemas.microsoft.com/office/drawing/2014/main" xmlns="" val="10001"/>
+                    <a16:rowId xmlns="" xmlns:a16="http://schemas.microsoft.com/office/drawing/2014/main" val="10001"/>
                   </a:ext>
                 </a:extLst>
               </a:tr>
@@ -7142,7 +7128,6 @@
                         <a:rPr lang="es-ES" sz="800" dirty="0" smtClean="0"/>
                         <a:t>SP</a:t>
                       </a:r>
-                      <a:endParaRPr lang="es-ES" sz="800" dirty="0" smtClean="0"/>
                     </a:p>
                     <a:p>
                       <a:pPr marL="0" marR="0" indent="0" algn="l" defTabSz="914400" rtl="0" eaLnBrk="1" fontAlgn="auto" latinLnBrk="0" hangingPunct="1">
@@ -7166,7 +7151,6 @@
                         <a:rPr lang="es-ES" sz="800" dirty="0" smtClean="0"/>
                         <a:t>TIPO_EVENTO_PLANIFICACION</a:t>
                       </a:r>
-                      <a:endParaRPr lang="es-ES" sz="800" dirty="0" smtClean="0"/>
                     </a:p>
                     <a:p>
                       <a:pPr marL="0" marR="0" indent="0" algn="l" defTabSz="914400" rtl="0" eaLnBrk="1" fontAlgn="auto" latinLnBrk="0" hangingPunct="1">
@@ -7260,7 +7244,7 @@
                 </a:tc>
                 <a:extLst>
                   <a:ext uri="{0D108BD9-81ED-4DB2-BD59-A6C34878D82A}">
-                    <a16:rowId xmlns:a16="http://schemas.microsoft.com/office/drawing/2014/main" xmlns="" val="10002"/>
+                    <a16:rowId xmlns="" xmlns:a16="http://schemas.microsoft.com/office/drawing/2014/main" val="10002"/>
                   </a:ext>
                 </a:extLst>
               </a:tr>
@@ -7310,7 +7294,7 @@
           <p:cNvPr id="78" name="CuadroTexto 38">
             <a:extLst>
               <a:ext uri="{FF2B5EF4-FFF2-40B4-BE49-F238E27FC236}">
-                <a16:creationId xmlns:a16="http://schemas.microsoft.com/office/drawing/2014/main" xmlns="" id="{6B08FE2C-B795-482D-8B2D-91CAB6048C42}"/>
+                <a16:creationId xmlns="" xmlns:a16="http://schemas.microsoft.com/office/drawing/2014/main" id="{6B08FE2C-B795-482D-8B2D-91CAB6048C42}"/>
               </a:ext>
             </a:extLst>
           </p:cNvPr>
@@ -7398,7 +7382,7 @@
                 <a:gridCol w="1446076">
                   <a:extLst>
                     <a:ext uri="{9D8B030D-6E8A-4147-A177-3AD203B41FA5}">
-                      <a16:colId xmlns:a16="http://schemas.microsoft.com/office/drawing/2014/main" xmlns="" val="20000"/>
+                      <a16:colId xmlns="" xmlns:a16="http://schemas.microsoft.com/office/drawing/2014/main" val="20000"/>
                     </a:ext>
                   </a:extLst>
                 </a:gridCol>
@@ -7424,7 +7408,7 @@
                 </a:tc>
                 <a:extLst>
                   <a:ext uri="{0D108BD9-81ED-4DB2-BD59-A6C34878D82A}">
-                    <a16:rowId xmlns:a16="http://schemas.microsoft.com/office/drawing/2014/main" xmlns="" val="10000"/>
+                    <a16:rowId xmlns="" xmlns:a16="http://schemas.microsoft.com/office/drawing/2014/main" val="10000"/>
                   </a:ext>
                 </a:extLst>
               </a:tr>
@@ -7445,7 +7429,7 @@
                 </a:tc>
                 <a:extLst>
                   <a:ext uri="{0D108BD9-81ED-4DB2-BD59-A6C34878D82A}">
-                    <a16:rowId xmlns:a16="http://schemas.microsoft.com/office/drawing/2014/main" xmlns="" val="10001"/>
+                    <a16:rowId xmlns="" xmlns:a16="http://schemas.microsoft.com/office/drawing/2014/main" val="10001"/>
                   </a:ext>
                 </a:extLst>
               </a:tr>
@@ -7526,7 +7510,7 @@
                 </a:tc>
                 <a:extLst>
                   <a:ext uri="{0D108BD9-81ED-4DB2-BD59-A6C34878D82A}">
-                    <a16:rowId xmlns:a16="http://schemas.microsoft.com/office/drawing/2014/main" xmlns="" val="10002"/>
+                    <a16:rowId xmlns="" xmlns:a16="http://schemas.microsoft.com/office/drawing/2014/main" val="10002"/>
                   </a:ext>
                 </a:extLst>
               </a:tr>
@@ -7562,7 +7546,7 @@
                 <a:gridCol w="1620780">
                   <a:extLst>
                     <a:ext uri="{9D8B030D-6E8A-4147-A177-3AD203B41FA5}">
-                      <a16:colId xmlns:a16="http://schemas.microsoft.com/office/drawing/2014/main" xmlns="" val="20000"/>
+                      <a16:colId xmlns="" xmlns:a16="http://schemas.microsoft.com/office/drawing/2014/main" val="20000"/>
                     </a:ext>
                   </a:extLst>
                 </a:gridCol>
@@ -7583,7 +7567,7 @@
                 </a:tc>
                 <a:extLst>
                   <a:ext uri="{0D108BD9-81ED-4DB2-BD59-A6C34878D82A}">
-                    <a16:rowId xmlns:a16="http://schemas.microsoft.com/office/drawing/2014/main" xmlns="" val="10000"/>
+                    <a16:rowId xmlns="" xmlns:a16="http://schemas.microsoft.com/office/drawing/2014/main" val="10000"/>
                   </a:ext>
                 </a:extLst>
               </a:tr>
@@ -7604,7 +7588,7 @@
                 </a:tc>
                 <a:extLst>
                   <a:ext uri="{0D108BD9-81ED-4DB2-BD59-A6C34878D82A}">
-                    <a16:rowId xmlns:a16="http://schemas.microsoft.com/office/drawing/2014/main" xmlns="" val="10001"/>
+                    <a16:rowId xmlns="" xmlns:a16="http://schemas.microsoft.com/office/drawing/2014/main" val="10001"/>
                   </a:ext>
                 </a:extLst>
               </a:tr>
@@ -7740,7 +7724,6 @@
                         <a:rPr lang="es-ES" sz="800" dirty="0" smtClean="0"/>
                         <a:t>PROYECTO_INVERSION</a:t>
                       </a:r>
-                      <a:endParaRPr lang="es-ES" sz="800" dirty="0" smtClean="0"/>
                     </a:p>
                     <a:p>
                       <a:r>
@@ -7754,7 +7737,7 @@
                 </a:tc>
                 <a:extLst>
                   <a:ext uri="{0D108BD9-81ED-4DB2-BD59-A6C34878D82A}">
-                    <a16:rowId xmlns:a16="http://schemas.microsoft.com/office/drawing/2014/main" xmlns="" val="10002"/>
+                    <a16:rowId xmlns="" xmlns:a16="http://schemas.microsoft.com/office/drawing/2014/main" val="10002"/>
                   </a:ext>
                 </a:extLst>
               </a:tr>
@@ -7790,7 +7773,7 @@
                 <a:gridCol w="1528262">
                   <a:extLst>
                     <a:ext uri="{9D8B030D-6E8A-4147-A177-3AD203B41FA5}">
-                      <a16:colId xmlns:a16="http://schemas.microsoft.com/office/drawing/2014/main" xmlns="" val="20000"/>
+                      <a16:colId xmlns="" xmlns:a16="http://schemas.microsoft.com/office/drawing/2014/main" val="20000"/>
                     </a:ext>
                   </a:extLst>
                 </a:gridCol>
@@ -7812,7 +7795,7 @@
                 </a:tc>
                 <a:extLst>
                   <a:ext uri="{0D108BD9-81ED-4DB2-BD59-A6C34878D82A}">
-                    <a16:rowId xmlns:a16="http://schemas.microsoft.com/office/drawing/2014/main" xmlns="" val="10000"/>
+                    <a16:rowId xmlns="" xmlns:a16="http://schemas.microsoft.com/office/drawing/2014/main" val="10000"/>
                   </a:ext>
                 </a:extLst>
               </a:tr>
@@ -7833,7 +7816,7 @@
                 </a:tc>
                 <a:extLst>
                   <a:ext uri="{0D108BD9-81ED-4DB2-BD59-A6C34878D82A}">
-                    <a16:rowId xmlns:a16="http://schemas.microsoft.com/office/drawing/2014/main" xmlns="" val="10001"/>
+                    <a16:rowId xmlns="" xmlns:a16="http://schemas.microsoft.com/office/drawing/2014/main" val="10001"/>
                   </a:ext>
                 </a:extLst>
               </a:tr>
@@ -7926,7 +7909,7 @@
                 </a:tc>
                 <a:extLst>
                   <a:ext uri="{0D108BD9-81ED-4DB2-BD59-A6C34878D82A}">
-                    <a16:rowId xmlns:a16="http://schemas.microsoft.com/office/drawing/2014/main" xmlns="" val="10002"/>
+                    <a16:rowId xmlns="" xmlns:a16="http://schemas.microsoft.com/office/drawing/2014/main" val="10002"/>
                   </a:ext>
                 </a:extLst>
               </a:tr>
@@ -8058,7 +8041,7 @@
           <p:cNvPr id="59" name="CuadroTexto 59">
             <a:extLst>
               <a:ext uri="{FF2B5EF4-FFF2-40B4-BE49-F238E27FC236}">
-                <a16:creationId xmlns:a16="http://schemas.microsoft.com/office/drawing/2014/main" xmlns="" id="{E3E4B657-CF4C-4A80-9E44-4A0317C54F9E}"/>
+                <a16:creationId xmlns="" xmlns:a16="http://schemas.microsoft.com/office/drawing/2014/main" id="{E3E4B657-CF4C-4A80-9E44-4A0317C54F9E}"/>
               </a:ext>
             </a:extLst>
           </p:cNvPr>
@@ -8094,7 +8077,7 @@
           <p:cNvPr id="61" name="CuadroTexto 59">
             <a:extLst>
               <a:ext uri="{FF2B5EF4-FFF2-40B4-BE49-F238E27FC236}">
-                <a16:creationId xmlns:a16="http://schemas.microsoft.com/office/drawing/2014/main" xmlns="" id="{E3E4B657-CF4C-4A80-9E44-4A0317C54F9E}"/>
+                <a16:creationId xmlns="" xmlns:a16="http://schemas.microsoft.com/office/drawing/2014/main" id="{E3E4B657-CF4C-4A80-9E44-4A0317C54F9E}"/>
               </a:ext>
             </a:extLst>
           </p:cNvPr>
@@ -8129,7 +8112,7 @@
           <p:cNvPr id="62" name="CuadroTexto 59">
             <a:extLst>
               <a:ext uri="{FF2B5EF4-FFF2-40B4-BE49-F238E27FC236}">
-                <a16:creationId xmlns:a16="http://schemas.microsoft.com/office/drawing/2014/main" xmlns="" id="{E3E4B657-CF4C-4A80-9E44-4A0317C54F9E}"/>
+                <a16:creationId xmlns="" xmlns:a16="http://schemas.microsoft.com/office/drawing/2014/main" id="{E3E4B657-CF4C-4A80-9E44-4A0317C54F9E}"/>
               </a:ext>
             </a:extLst>
           </p:cNvPr>
@@ -8187,7 +8170,7 @@
                 <a:gridCol w="1512168">
                   <a:extLst>
                     <a:ext uri="{9D8B030D-6E8A-4147-A177-3AD203B41FA5}">
-                      <a16:colId xmlns:a16="http://schemas.microsoft.com/office/drawing/2014/main" xmlns="" val="20000"/>
+                      <a16:colId xmlns="" xmlns:a16="http://schemas.microsoft.com/office/drawing/2014/main" val="20000"/>
                     </a:ext>
                   </a:extLst>
                 </a:gridCol>
@@ -8209,7 +8192,7 @@
                 </a:tc>
                 <a:extLst>
                   <a:ext uri="{0D108BD9-81ED-4DB2-BD59-A6C34878D82A}">
-                    <a16:rowId xmlns:a16="http://schemas.microsoft.com/office/drawing/2014/main" xmlns="" val="10000"/>
+                    <a16:rowId xmlns="" xmlns:a16="http://schemas.microsoft.com/office/drawing/2014/main" val="10000"/>
                   </a:ext>
                 </a:extLst>
               </a:tr>
@@ -8236,7 +8219,7 @@
                 </a:tc>
                 <a:extLst>
                   <a:ext uri="{0D108BD9-81ED-4DB2-BD59-A6C34878D82A}">
-                    <a16:rowId xmlns:a16="http://schemas.microsoft.com/office/drawing/2014/main" xmlns="" val="10001"/>
+                    <a16:rowId xmlns="" xmlns:a16="http://schemas.microsoft.com/office/drawing/2014/main" val="10001"/>
                   </a:ext>
                 </a:extLst>
               </a:tr>
@@ -8269,7 +8252,7 @@
                 </a:tc>
                 <a:extLst>
                   <a:ext uri="{0D108BD9-81ED-4DB2-BD59-A6C34878D82A}">
-                    <a16:rowId xmlns:a16="http://schemas.microsoft.com/office/drawing/2014/main" xmlns="" val="10002"/>
+                    <a16:rowId xmlns="" xmlns:a16="http://schemas.microsoft.com/office/drawing/2014/main" val="10002"/>
                   </a:ext>
                 </a:extLst>
               </a:tr>
@@ -8321,7 +8304,7 @@
           <p:cNvPr id="65" name="CuadroTexto 59">
             <a:extLst>
               <a:ext uri="{FF2B5EF4-FFF2-40B4-BE49-F238E27FC236}">
-                <a16:creationId xmlns:a16="http://schemas.microsoft.com/office/drawing/2014/main" xmlns="" id="{E3E4B657-CF4C-4A80-9E44-4A0317C54F9E}"/>
+                <a16:creationId xmlns="" xmlns:a16="http://schemas.microsoft.com/office/drawing/2014/main" id="{E3E4B657-CF4C-4A80-9E44-4A0317C54F9E}"/>
               </a:ext>
             </a:extLst>
           </p:cNvPr>
@@ -8379,7 +8362,7 @@
                 <a:gridCol w="1404155">
                   <a:extLst>
                     <a:ext uri="{9D8B030D-6E8A-4147-A177-3AD203B41FA5}">
-                      <a16:colId xmlns:a16="http://schemas.microsoft.com/office/drawing/2014/main" xmlns="" val="20000"/>
+                      <a16:colId xmlns="" xmlns:a16="http://schemas.microsoft.com/office/drawing/2014/main" val="20000"/>
                     </a:ext>
                   </a:extLst>
                 </a:gridCol>
@@ -8405,7 +8388,7 @@
                 </a:tc>
                 <a:extLst>
                   <a:ext uri="{0D108BD9-81ED-4DB2-BD59-A6C34878D82A}">
-                    <a16:rowId xmlns:a16="http://schemas.microsoft.com/office/drawing/2014/main" xmlns="" val="10000"/>
+                    <a16:rowId xmlns="" xmlns:a16="http://schemas.microsoft.com/office/drawing/2014/main" val="10000"/>
                   </a:ext>
                 </a:extLst>
               </a:tr>
@@ -8426,7 +8409,7 @@
                 </a:tc>
                 <a:extLst>
                   <a:ext uri="{0D108BD9-81ED-4DB2-BD59-A6C34878D82A}">
-                    <a16:rowId xmlns:a16="http://schemas.microsoft.com/office/drawing/2014/main" xmlns="" val="10001"/>
+                    <a16:rowId xmlns="" xmlns:a16="http://schemas.microsoft.com/office/drawing/2014/main" val="10001"/>
                   </a:ext>
                 </a:extLst>
               </a:tr>
@@ -8507,7 +8490,7 @@
                 </a:tc>
                 <a:extLst>
                   <a:ext uri="{0D108BD9-81ED-4DB2-BD59-A6C34878D82A}">
-                    <a16:rowId xmlns:a16="http://schemas.microsoft.com/office/drawing/2014/main" xmlns="" val="10002"/>
+                    <a16:rowId xmlns="" xmlns:a16="http://schemas.microsoft.com/office/drawing/2014/main" val="10002"/>
                   </a:ext>
                 </a:extLst>
               </a:tr>
@@ -8543,7 +8526,7 @@
                 <a:gridCol w="1547919">
                   <a:extLst>
                     <a:ext uri="{9D8B030D-6E8A-4147-A177-3AD203B41FA5}">
-                      <a16:colId xmlns:a16="http://schemas.microsoft.com/office/drawing/2014/main" xmlns="" val="20000"/>
+                      <a16:colId xmlns="" xmlns:a16="http://schemas.microsoft.com/office/drawing/2014/main" val="20000"/>
                     </a:ext>
                   </a:extLst>
                 </a:gridCol>
@@ -8565,7 +8548,7 @@
                 </a:tc>
                 <a:extLst>
                   <a:ext uri="{0D108BD9-81ED-4DB2-BD59-A6C34878D82A}">
-                    <a16:rowId xmlns:a16="http://schemas.microsoft.com/office/drawing/2014/main" xmlns="" val="10000"/>
+                    <a16:rowId xmlns="" xmlns:a16="http://schemas.microsoft.com/office/drawing/2014/main" val="10000"/>
                   </a:ext>
                 </a:extLst>
               </a:tr>
@@ -8586,7 +8569,7 @@
                 </a:tc>
                 <a:extLst>
                   <a:ext uri="{0D108BD9-81ED-4DB2-BD59-A6C34878D82A}">
-                    <a16:rowId xmlns:a16="http://schemas.microsoft.com/office/drawing/2014/main" xmlns="" val="10001"/>
+                    <a16:rowId xmlns="" xmlns:a16="http://schemas.microsoft.com/office/drawing/2014/main" val="10001"/>
                   </a:ext>
                 </a:extLst>
               </a:tr>
@@ -8643,7 +8626,7 @@
                 </a:tc>
                 <a:extLst>
                   <a:ext uri="{0D108BD9-81ED-4DB2-BD59-A6C34878D82A}">
-                    <a16:rowId xmlns:a16="http://schemas.microsoft.com/office/drawing/2014/main" xmlns="" val="10002"/>
+                    <a16:rowId xmlns="" xmlns:a16="http://schemas.microsoft.com/office/drawing/2014/main" val="10002"/>
                   </a:ext>
                 </a:extLst>
               </a:tr>
@@ -8696,7 +8679,7 @@
           <p:cNvPr id="71" name="CuadroTexto 59">
             <a:extLst>
               <a:ext uri="{FF2B5EF4-FFF2-40B4-BE49-F238E27FC236}">
-                <a16:creationId xmlns:a16="http://schemas.microsoft.com/office/drawing/2014/main" xmlns="" id="{E3E4B657-CF4C-4A80-9E44-4A0317C54F9E}"/>
+                <a16:creationId xmlns="" xmlns:a16="http://schemas.microsoft.com/office/drawing/2014/main" id="{E3E4B657-CF4C-4A80-9E44-4A0317C54F9E}"/>
               </a:ext>
             </a:extLst>
           </p:cNvPr>
@@ -8770,7 +8753,7 @@
           <p:cNvPr id="73" name="CuadroTexto 59">
             <a:extLst>
               <a:ext uri="{FF2B5EF4-FFF2-40B4-BE49-F238E27FC236}">
-                <a16:creationId xmlns:a16="http://schemas.microsoft.com/office/drawing/2014/main" xmlns="" id="{E3E4B657-CF4C-4A80-9E44-4A0317C54F9E}"/>
+                <a16:creationId xmlns="" xmlns:a16="http://schemas.microsoft.com/office/drawing/2014/main" id="{E3E4B657-CF4C-4A80-9E44-4A0317C54F9E}"/>
               </a:ext>
             </a:extLst>
           </p:cNvPr>
@@ -8893,7 +8876,7 @@
                 <a:gridCol w="1080120">
                   <a:extLst>
                     <a:ext uri="{9D8B030D-6E8A-4147-A177-3AD203B41FA5}">
-                      <a16:colId xmlns:a16="http://schemas.microsoft.com/office/drawing/2014/main" xmlns="" val="20000"/>
+                      <a16:colId xmlns="" xmlns:a16="http://schemas.microsoft.com/office/drawing/2014/main" val="20000"/>
                     </a:ext>
                   </a:extLst>
                 </a:gridCol>
@@ -8915,7 +8898,7 @@
                 </a:tc>
                 <a:extLst>
                   <a:ext uri="{0D108BD9-81ED-4DB2-BD59-A6C34878D82A}">
-                    <a16:rowId xmlns:a16="http://schemas.microsoft.com/office/drawing/2014/main" xmlns="" val="10000"/>
+                    <a16:rowId xmlns="" xmlns:a16="http://schemas.microsoft.com/office/drawing/2014/main" val="10000"/>
                   </a:ext>
                 </a:extLst>
               </a:tr>
@@ -8977,7 +8960,7 @@
                 </a:tc>
                 <a:extLst>
                   <a:ext uri="{0D108BD9-81ED-4DB2-BD59-A6C34878D82A}">
-                    <a16:rowId xmlns:a16="http://schemas.microsoft.com/office/drawing/2014/main" xmlns="" val="10001"/>
+                    <a16:rowId xmlns="" xmlns:a16="http://schemas.microsoft.com/office/drawing/2014/main" val="10001"/>
                   </a:ext>
                 </a:extLst>
               </a:tr>
@@ -9010,7 +8993,7 @@
                 </a:tc>
                 <a:extLst>
                   <a:ext uri="{0D108BD9-81ED-4DB2-BD59-A6C34878D82A}">
-                    <a16:rowId xmlns:a16="http://schemas.microsoft.com/office/drawing/2014/main" xmlns="" val="10002"/>
+                    <a16:rowId xmlns="" xmlns:a16="http://schemas.microsoft.com/office/drawing/2014/main" val="10002"/>
                   </a:ext>
                 </a:extLst>
               </a:tr>
@@ -9077,7 +9060,7 @@
                 <a:gridCol w="1463824">
                   <a:extLst>
                     <a:ext uri="{9D8B030D-6E8A-4147-A177-3AD203B41FA5}">
-                      <a16:colId xmlns:a16="http://schemas.microsoft.com/office/drawing/2014/main" xmlns="" val="20000"/>
+                      <a16:colId xmlns="" xmlns:a16="http://schemas.microsoft.com/office/drawing/2014/main" val="20000"/>
                     </a:ext>
                   </a:extLst>
                 </a:gridCol>
@@ -9099,7 +9082,7 @@
                 </a:tc>
                 <a:extLst>
                   <a:ext uri="{0D108BD9-81ED-4DB2-BD59-A6C34878D82A}">
-                    <a16:rowId xmlns:a16="http://schemas.microsoft.com/office/drawing/2014/main" xmlns="" val="10000"/>
+                    <a16:rowId xmlns="" xmlns:a16="http://schemas.microsoft.com/office/drawing/2014/main" val="10000"/>
                   </a:ext>
                 </a:extLst>
               </a:tr>
@@ -9120,7 +9103,7 @@
                 </a:tc>
                 <a:extLst>
                   <a:ext uri="{0D108BD9-81ED-4DB2-BD59-A6C34878D82A}">
-                    <a16:rowId xmlns:a16="http://schemas.microsoft.com/office/drawing/2014/main" xmlns="" val="10001"/>
+                    <a16:rowId xmlns="" xmlns:a16="http://schemas.microsoft.com/office/drawing/2014/main" val="10001"/>
                   </a:ext>
                 </a:extLst>
               </a:tr>
@@ -9177,7 +9160,7 @@
                 </a:tc>
                 <a:extLst>
                   <a:ext uri="{0D108BD9-81ED-4DB2-BD59-A6C34878D82A}">
-                    <a16:rowId xmlns:a16="http://schemas.microsoft.com/office/drawing/2014/main" xmlns="" val="10002"/>
+                    <a16:rowId xmlns="" xmlns:a16="http://schemas.microsoft.com/office/drawing/2014/main" val="10002"/>
                   </a:ext>
                 </a:extLst>
               </a:tr>
@@ -9213,7 +9196,7 @@
                 <a:gridCol w="1440160">
                   <a:extLst>
                     <a:ext uri="{9D8B030D-6E8A-4147-A177-3AD203B41FA5}">
-                      <a16:colId xmlns:a16="http://schemas.microsoft.com/office/drawing/2014/main" xmlns="" val="20000"/>
+                      <a16:colId xmlns="" xmlns:a16="http://schemas.microsoft.com/office/drawing/2014/main" val="20000"/>
                     </a:ext>
                   </a:extLst>
                 </a:gridCol>
@@ -9235,7 +9218,7 @@
                 </a:tc>
                 <a:extLst>
                   <a:ext uri="{0D108BD9-81ED-4DB2-BD59-A6C34878D82A}">
-                    <a16:rowId xmlns:a16="http://schemas.microsoft.com/office/drawing/2014/main" xmlns="" val="10000"/>
+                    <a16:rowId xmlns="" xmlns:a16="http://schemas.microsoft.com/office/drawing/2014/main" val="10000"/>
                   </a:ext>
                 </a:extLst>
               </a:tr>
@@ -9262,7 +9245,7 @@
                 </a:tc>
                 <a:extLst>
                   <a:ext uri="{0D108BD9-81ED-4DB2-BD59-A6C34878D82A}">
-                    <a16:rowId xmlns:a16="http://schemas.microsoft.com/office/drawing/2014/main" xmlns="" val="10001"/>
+                    <a16:rowId xmlns="" xmlns:a16="http://schemas.microsoft.com/office/drawing/2014/main" val="10001"/>
                   </a:ext>
                 </a:extLst>
               </a:tr>
@@ -9295,7 +9278,7 @@
                 </a:tc>
                 <a:extLst>
                   <a:ext uri="{0D108BD9-81ED-4DB2-BD59-A6C34878D82A}">
-                    <a16:rowId xmlns:a16="http://schemas.microsoft.com/office/drawing/2014/main" xmlns="" val="10002"/>
+                    <a16:rowId xmlns="" xmlns:a16="http://schemas.microsoft.com/office/drawing/2014/main" val="10002"/>
                   </a:ext>
                 </a:extLst>
               </a:tr>
@@ -9347,7 +9330,7 @@
           <p:cNvPr id="72" name="CuadroTexto 44">
             <a:extLst>
               <a:ext uri="{FF2B5EF4-FFF2-40B4-BE49-F238E27FC236}">
-                <a16:creationId xmlns:a16="http://schemas.microsoft.com/office/drawing/2014/main" xmlns="" id="{58DDF0F6-557A-42E3-87C5-C25B3173C4ED}"/>
+                <a16:creationId xmlns="" xmlns:a16="http://schemas.microsoft.com/office/drawing/2014/main" id="{58DDF0F6-557A-42E3-87C5-C25B3173C4ED}"/>
               </a:ext>
             </a:extLst>
           </p:cNvPr>
@@ -9420,7 +9403,7 @@
           <p:cNvPr id="74" name="CuadroTexto 44">
             <a:extLst>
               <a:ext uri="{FF2B5EF4-FFF2-40B4-BE49-F238E27FC236}">
-                <a16:creationId xmlns:a16="http://schemas.microsoft.com/office/drawing/2014/main" xmlns="" id="{58DDF0F6-557A-42E3-87C5-C25B3173C4ED}"/>
+                <a16:creationId xmlns="" xmlns:a16="http://schemas.microsoft.com/office/drawing/2014/main" id="{58DDF0F6-557A-42E3-87C5-C25B3173C4ED}"/>
               </a:ext>
             </a:extLst>
           </p:cNvPr>
@@ -9540,7 +9523,7 @@
                 <a:gridCol w="1440160">
                   <a:extLst>
                     <a:ext uri="{9D8B030D-6E8A-4147-A177-3AD203B41FA5}">
-                      <a16:colId xmlns:a16="http://schemas.microsoft.com/office/drawing/2014/main" xmlns="" val="20000"/>
+                      <a16:colId xmlns="" xmlns:a16="http://schemas.microsoft.com/office/drawing/2014/main" val="20000"/>
                     </a:ext>
                   </a:extLst>
                 </a:gridCol>
@@ -9562,7 +9545,7 @@
                 </a:tc>
                 <a:extLst>
                   <a:ext uri="{0D108BD9-81ED-4DB2-BD59-A6C34878D82A}">
-                    <a16:rowId xmlns:a16="http://schemas.microsoft.com/office/drawing/2014/main" xmlns="" val="10000"/>
+                    <a16:rowId xmlns="" xmlns:a16="http://schemas.microsoft.com/office/drawing/2014/main" val="10000"/>
                   </a:ext>
                 </a:extLst>
               </a:tr>
@@ -9606,7 +9589,7 @@
                 </a:tc>
                 <a:extLst>
                   <a:ext uri="{0D108BD9-81ED-4DB2-BD59-A6C34878D82A}">
-                    <a16:rowId xmlns:a16="http://schemas.microsoft.com/office/drawing/2014/main" xmlns="" val="10001"/>
+                    <a16:rowId xmlns="" xmlns:a16="http://schemas.microsoft.com/office/drawing/2014/main" val="10001"/>
                   </a:ext>
                 </a:extLst>
               </a:tr>
@@ -9633,7 +9616,7 @@
                 </a:tc>
                 <a:extLst>
                   <a:ext uri="{0D108BD9-81ED-4DB2-BD59-A6C34878D82A}">
-                    <a16:rowId xmlns:a16="http://schemas.microsoft.com/office/drawing/2014/main" xmlns="" val="10002"/>
+                    <a16:rowId xmlns="" xmlns:a16="http://schemas.microsoft.com/office/drawing/2014/main" val="10002"/>
                   </a:ext>
                 </a:extLst>
               </a:tr>
@@ -9669,7 +9652,7 @@
                 <a:gridCol w="1463824">
                   <a:extLst>
                     <a:ext uri="{9D8B030D-6E8A-4147-A177-3AD203B41FA5}">
-                      <a16:colId xmlns:a16="http://schemas.microsoft.com/office/drawing/2014/main" xmlns="" val="20000"/>
+                      <a16:colId xmlns="" xmlns:a16="http://schemas.microsoft.com/office/drawing/2014/main" val="20000"/>
                     </a:ext>
                   </a:extLst>
                 </a:gridCol>
@@ -9691,7 +9674,7 @@
                 </a:tc>
                 <a:extLst>
                   <a:ext uri="{0D108BD9-81ED-4DB2-BD59-A6C34878D82A}">
-                    <a16:rowId xmlns:a16="http://schemas.microsoft.com/office/drawing/2014/main" xmlns="" val="10000"/>
+                    <a16:rowId xmlns="" xmlns:a16="http://schemas.microsoft.com/office/drawing/2014/main" val="10000"/>
                   </a:ext>
                 </a:extLst>
               </a:tr>
@@ -9712,7 +9695,7 @@
                 </a:tc>
                 <a:extLst>
                   <a:ext uri="{0D108BD9-81ED-4DB2-BD59-A6C34878D82A}">
-                    <a16:rowId xmlns:a16="http://schemas.microsoft.com/office/drawing/2014/main" xmlns="" val="10001"/>
+                    <a16:rowId xmlns="" xmlns:a16="http://schemas.microsoft.com/office/drawing/2014/main" val="10001"/>
                   </a:ext>
                 </a:extLst>
               </a:tr>
@@ -9739,7 +9722,7 @@
                 </a:tc>
                 <a:extLst>
                   <a:ext uri="{0D108BD9-81ED-4DB2-BD59-A6C34878D82A}">
-                    <a16:rowId xmlns:a16="http://schemas.microsoft.com/office/drawing/2014/main" xmlns="" val="10002"/>
+                    <a16:rowId xmlns="" xmlns:a16="http://schemas.microsoft.com/office/drawing/2014/main" val="10002"/>
                   </a:ext>
                 </a:extLst>
               </a:tr>
@@ -9835,7 +9818,7 @@
                 <a:gridCol w="1463824">
                   <a:extLst>
                     <a:ext uri="{9D8B030D-6E8A-4147-A177-3AD203B41FA5}">
-                      <a16:colId xmlns:a16="http://schemas.microsoft.com/office/drawing/2014/main" xmlns="" val="20000"/>
+                      <a16:colId xmlns="" xmlns:a16="http://schemas.microsoft.com/office/drawing/2014/main" val="20000"/>
                     </a:ext>
                   </a:extLst>
                 </a:gridCol>
@@ -9856,7 +9839,7 @@
                 </a:tc>
                 <a:extLst>
                   <a:ext uri="{0D108BD9-81ED-4DB2-BD59-A6C34878D82A}">
-                    <a16:rowId xmlns:a16="http://schemas.microsoft.com/office/drawing/2014/main" xmlns="" val="10000"/>
+                    <a16:rowId xmlns="" xmlns:a16="http://schemas.microsoft.com/office/drawing/2014/main" val="10000"/>
                   </a:ext>
                 </a:extLst>
               </a:tr>
@@ -9877,7 +9860,7 @@
                 </a:tc>
                 <a:extLst>
                   <a:ext uri="{0D108BD9-81ED-4DB2-BD59-A6C34878D82A}">
-                    <a16:rowId xmlns:a16="http://schemas.microsoft.com/office/drawing/2014/main" xmlns="" val="10001"/>
+                    <a16:rowId xmlns="" xmlns:a16="http://schemas.microsoft.com/office/drawing/2014/main" val="10001"/>
                   </a:ext>
                 </a:extLst>
               </a:tr>
@@ -9985,7 +9968,7 @@
                 </a:tc>
                 <a:extLst>
                   <a:ext uri="{0D108BD9-81ED-4DB2-BD59-A6C34878D82A}">
-                    <a16:rowId xmlns:a16="http://schemas.microsoft.com/office/drawing/2014/main" xmlns="" val="10002"/>
+                    <a16:rowId xmlns="" xmlns:a16="http://schemas.microsoft.com/office/drawing/2014/main" val="10002"/>
                   </a:ext>
                 </a:extLst>
               </a:tr>
@@ -10021,7 +10004,7 @@
                 <a:gridCol w="1463824">
                   <a:extLst>
                     <a:ext uri="{9D8B030D-6E8A-4147-A177-3AD203B41FA5}">
-                      <a16:colId xmlns:a16="http://schemas.microsoft.com/office/drawing/2014/main" xmlns="" val="20000"/>
+                      <a16:colId xmlns="" xmlns:a16="http://schemas.microsoft.com/office/drawing/2014/main" val="20000"/>
                     </a:ext>
                   </a:extLst>
                 </a:gridCol>
@@ -10043,7 +10026,7 @@
                 </a:tc>
                 <a:extLst>
                   <a:ext uri="{0D108BD9-81ED-4DB2-BD59-A6C34878D82A}">
-                    <a16:rowId xmlns:a16="http://schemas.microsoft.com/office/drawing/2014/main" xmlns="" val="10000"/>
+                    <a16:rowId xmlns="" xmlns:a16="http://schemas.microsoft.com/office/drawing/2014/main" val="10000"/>
                   </a:ext>
                 </a:extLst>
               </a:tr>
@@ -10064,7 +10047,7 @@
                 </a:tc>
                 <a:extLst>
                   <a:ext uri="{0D108BD9-81ED-4DB2-BD59-A6C34878D82A}">
-                    <a16:rowId xmlns:a16="http://schemas.microsoft.com/office/drawing/2014/main" xmlns="" val="10001"/>
+                    <a16:rowId xmlns="" xmlns:a16="http://schemas.microsoft.com/office/drawing/2014/main" val="10001"/>
                   </a:ext>
                 </a:extLst>
               </a:tr>
@@ -10103,7 +10086,7 @@
                 </a:tc>
                 <a:extLst>
                   <a:ext uri="{0D108BD9-81ED-4DB2-BD59-A6C34878D82A}">
-                    <a16:rowId xmlns:a16="http://schemas.microsoft.com/office/drawing/2014/main" xmlns="" val="10002"/>
+                    <a16:rowId xmlns="" xmlns:a16="http://schemas.microsoft.com/office/drawing/2014/main" val="10002"/>
                   </a:ext>
                 </a:extLst>
               </a:tr>
@@ -10139,7 +10122,7 @@
                 <a:gridCol w="720080">
                   <a:extLst>
                     <a:ext uri="{9D8B030D-6E8A-4147-A177-3AD203B41FA5}">
-                      <a16:colId xmlns:a16="http://schemas.microsoft.com/office/drawing/2014/main" xmlns="" val="20000"/>
+                      <a16:colId xmlns="" xmlns:a16="http://schemas.microsoft.com/office/drawing/2014/main" val="20000"/>
                     </a:ext>
                   </a:extLst>
                 </a:gridCol>
@@ -10160,7 +10143,7 @@
                 </a:tc>
                 <a:extLst>
                   <a:ext uri="{0D108BD9-81ED-4DB2-BD59-A6C34878D82A}">
-                    <a16:rowId xmlns:a16="http://schemas.microsoft.com/office/drawing/2014/main" xmlns="" val="10000"/>
+                    <a16:rowId xmlns="" xmlns:a16="http://schemas.microsoft.com/office/drawing/2014/main" val="10000"/>
                   </a:ext>
                 </a:extLst>
               </a:tr>
@@ -10181,7 +10164,7 @@
                 </a:tc>
                 <a:extLst>
                   <a:ext uri="{0D108BD9-81ED-4DB2-BD59-A6C34878D82A}">
-                    <a16:rowId xmlns:a16="http://schemas.microsoft.com/office/drawing/2014/main" xmlns="" val="10001"/>
+                    <a16:rowId xmlns="" xmlns:a16="http://schemas.microsoft.com/office/drawing/2014/main" val="10001"/>
                   </a:ext>
                 </a:extLst>
               </a:tr>
@@ -10201,7 +10184,7 @@
                 </a:tc>
                 <a:extLst>
                   <a:ext uri="{0D108BD9-81ED-4DB2-BD59-A6C34878D82A}">
-                    <a16:rowId xmlns:a16="http://schemas.microsoft.com/office/drawing/2014/main" xmlns="" val="10002"/>
+                    <a16:rowId xmlns="" xmlns:a16="http://schemas.microsoft.com/office/drawing/2014/main" val="10002"/>
                   </a:ext>
                 </a:extLst>
               </a:tr>
@@ -10237,7 +10220,7 @@
                 <a:gridCol w="1368152">
                   <a:extLst>
                     <a:ext uri="{9D8B030D-6E8A-4147-A177-3AD203B41FA5}">
-                      <a16:colId xmlns:a16="http://schemas.microsoft.com/office/drawing/2014/main" xmlns="" val="20000"/>
+                      <a16:colId xmlns="" xmlns:a16="http://schemas.microsoft.com/office/drawing/2014/main" val="20000"/>
                     </a:ext>
                   </a:extLst>
                 </a:gridCol>
@@ -10258,7 +10241,7 @@
                 </a:tc>
                 <a:extLst>
                   <a:ext uri="{0D108BD9-81ED-4DB2-BD59-A6C34878D82A}">
-                    <a16:rowId xmlns:a16="http://schemas.microsoft.com/office/drawing/2014/main" xmlns="" val="10000"/>
+                    <a16:rowId xmlns="" xmlns:a16="http://schemas.microsoft.com/office/drawing/2014/main" val="10000"/>
                   </a:ext>
                 </a:extLst>
               </a:tr>
@@ -10285,7 +10268,7 @@
                 </a:tc>
                 <a:extLst>
                   <a:ext uri="{0D108BD9-81ED-4DB2-BD59-A6C34878D82A}">
-                    <a16:rowId xmlns:a16="http://schemas.microsoft.com/office/drawing/2014/main" xmlns="" val="10001"/>
+                    <a16:rowId xmlns="" xmlns:a16="http://schemas.microsoft.com/office/drawing/2014/main" val="10001"/>
                   </a:ext>
                 </a:extLst>
               </a:tr>
@@ -10305,7 +10288,7 @@
                 </a:tc>
                 <a:extLst>
                   <a:ext uri="{0D108BD9-81ED-4DB2-BD59-A6C34878D82A}">
-                    <a16:rowId xmlns:a16="http://schemas.microsoft.com/office/drawing/2014/main" xmlns="" val="10002"/>
+                    <a16:rowId xmlns="" xmlns:a16="http://schemas.microsoft.com/office/drawing/2014/main" val="10002"/>
                   </a:ext>
                 </a:extLst>
               </a:tr>
@@ -10341,7 +10324,7 @@
                 <a:gridCol w="1368152">
                   <a:extLst>
                     <a:ext uri="{9D8B030D-6E8A-4147-A177-3AD203B41FA5}">
-                      <a16:colId xmlns:a16="http://schemas.microsoft.com/office/drawing/2014/main" xmlns="" val="20000"/>
+                      <a16:colId xmlns="" xmlns:a16="http://schemas.microsoft.com/office/drawing/2014/main" val="20000"/>
                     </a:ext>
                   </a:extLst>
                 </a:gridCol>
@@ -10362,7 +10345,7 @@
                 </a:tc>
                 <a:extLst>
                   <a:ext uri="{0D108BD9-81ED-4DB2-BD59-A6C34878D82A}">
-                    <a16:rowId xmlns:a16="http://schemas.microsoft.com/office/drawing/2014/main" xmlns="" val="10000"/>
+                    <a16:rowId xmlns="" xmlns:a16="http://schemas.microsoft.com/office/drawing/2014/main" val="10000"/>
                   </a:ext>
                 </a:extLst>
               </a:tr>
@@ -10382,7 +10365,7 @@
                 </a:tc>
                 <a:extLst>
                   <a:ext uri="{0D108BD9-81ED-4DB2-BD59-A6C34878D82A}">
-                    <a16:rowId xmlns:a16="http://schemas.microsoft.com/office/drawing/2014/main" xmlns="" val="10001"/>
+                    <a16:rowId xmlns="" xmlns:a16="http://schemas.microsoft.com/office/drawing/2014/main" val="10001"/>
                   </a:ext>
                 </a:extLst>
               </a:tr>
@@ -10410,7 +10393,7 @@
                 </a:tc>
                 <a:extLst>
                   <a:ext uri="{0D108BD9-81ED-4DB2-BD59-A6C34878D82A}">
-                    <a16:rowId xmlns:a16="http://schemas.microsoft.com/office/drawing/2014/main" xmlns="" val="10002"/>
+                    <a16:rowId xmlns="" xmlns:a16="http://schemas.microsoft.com/office/drawing/2014/main" val="10002"/>
                   </a:ext>
                 </a:extLst>
               </a:tr>
@@ -10446,7 +10429,7 @@
                 <a:gridCol w="1463824">
                   <a:extLst>
                     <a:ext uri="{9D8B030D-6E8A-4147-A177-3AD203B41FA5}">
-                      <a16:colId xmlns:a16="http://schemas.microsoft.com/office/drawing/2014/main" xmlns="" val="20000"/>
+                      <a16:colId xmlns="" xmlns:a16="http://schemas.microsoft.com/office/drawing/2014/main" val="20000"/>
                     </a:ext>
                   </a:extLst>
                 </a:gridCol>
@@ -10467,7 +10450,7 @@
                 </a:tc>
                 <a:extLst>
                   <a:ext uri="{0D108BD9-81ED-4DB2-BD59-A6C34878D82A}">
-                    <a16:rowId xmlns:a16="http://schemas.microsoft.com/office/drawing/2014/main" xmlns="" val="10000"/>
+                    <a16:rowId xmlns="" xmlns:a16="http://schemas.microsoft.com/office/drawing/2014/main" val="10000"/>
                   </a:ext>
                 </a:extLst>
               </a:tr>
@@ -10487,7 +10470,7 @@
                 </a:tc>
                 <a:extLst>
                   <a:ext uri="{0D108BD9-81ED-4DB2-BD59-A6C34878D82A}">
-                    <a16:rowId xmlns:a16="http://schemas.microsoft.com/office/drawing/2014/main" xmlns="" val="10001"/>
+                    <a16:rowId xmlns="" xmlns:a16="http://schemas.microsoft.com/office/drawing/2014/main" val="10001"/>
                   </a:ext>
                 </a:extLst>
               </a:tr>
@@ -10514,7 +10497,7 @@
                 </a:tc>
                 <a:extLst>
                   <a:ext uri="{0D108BD9-81ED-4DB2-BD59-A6C34878D82A}">
-                    <a16:rowId xmlns:a16="http://schemas.microsoft.com/office/drawing/2014/main" xmlns="" val="10002"/>
+                    <a16:rowId xmlns="" xmlns:a16="http://schemas.microsoft.com/office/drawing/2014/main" val="10002"/>
                   </a:ext>
                 </a:extLst>
               </a:tr>
@@ -10550,7 +10533,7 @@
                 <a:gridCol w="1463824">
                   <a:extLst>
                     <a:ext uri="{9D8B030D-6E8A-4147-A177-3AD203B41FA5}">
-                      <a16:colId xmlns:a16="http://schemas.microsoft.com/office/drawing/2014/main" xmlns="" val="20000"/>
+                      <a16:colId xmlns="" xmlns:a16="http://schemas.microsoft.com/office/drawing/2014/main" val="20000"/>
                     </a:ext>
                   </a:extLst>
                 </a:gridCol>
@@ -10572,7 +10555,7 @@
                 </a:tc>
                 <a:extLst>
                   <a:ext uri="{0D108BD9-81ED-4DB2-BD59-A6C34878D82A}">
-                    <a16:rowId xmlns:a16="http://schemas.microsoft.com/office/drawing/2014/main" xmlns="" val="10000"/>
+                    <a16:rowId xmlns="" xmlns:a16="http://schemas.microsoft.com/office/drawing/2014/main" val="10000"/>
                   </a:ext>
                 </a:extLst>
               </a:tr>
@@ -10593,7 +10576,7 @@
                 </a:tc>
                 <a:extLst>
                   <a:ext uri="{0D108BD9-81ED-4DB2-BD59-A6C34878D82A}">
-                    <a16:rowId xmlns:a16="http://schemas.microsoft.com/office/drawing/2014/main" xmlns="" val="10001"/>
+                    <a16:rowId xmlns="" xmlns:a16="http://schemas.microsoft.com/office/drawing/2014/main" val="10001"/>
                   </a:ext>
                 </a:extLst>
               </a:tr>
@@ -10642,7 +10625,7 @@
                 </a:tc>
                 <a:extLst>
                   <a:ext uri="{0D108BD9-81ED-4DB2-BD59-A6C34878D82A}">
-                    <a16:rowId xmlns:a16="http://schemas.microsoft.com/office/drawing/2014/main" xmlns="" val="10002"/>
+                    <a16:rowId xmlns="" xmlns:a16="http://schemas.microsoft.com/office/drawing/2014/main" val="10002"/>
                   </a:ext>
                 </a:extLst>
               </a:tr>
@@ -10678,7 +10661,7 @@
                 <a:gridCol w="1463824">
                   <a:extLst>
                     <a:ext uri="{9D8B030D-6E8A-4147-A177-3AD203B41FA5}">
-                      <a16:colId xmlns:a16="http://schemas.microsoft.com/office/drawing/2014/main" xmlns="" val="20000"/>
+                      <a16:colId xmlns="" xmlns:a16="http://schemas.microsoft.com/office/drawing/2014/main" val="20000"/>
                     </a:ext>
                   </a:extLst>
                 </a:gridCol>
@@ -10699,7 +10682,7 @@
                 </a:tc>
                 <a:extLst>
                   <a:ext uri="{0D108BD9-81ED-4DB2-BD59-A6C34878D82A}">
-                    <a16:rowId xmlns:a16="http://schemas.microsoft.com/office/drawing/2014/main" xmlns="" val="10000"/>
+                    <a16:rowId xmlns="" xmlns:a16="http://schemas.microsoft.com/office/drawing/2014/main" val="10000"/>
                   </a:ext>
                 </a:extLst>
               </a:tr>
@@ -10720,7 +10703,7 @@
                 </a:tc>
                 <a:extLst>
                   <a:ext uri="{0D108BD9-81ED-4DB2-BD59-A6C34878D82A}">
-                    <a16:rowId xmlns:a16="http://schemas.microsoft.com/office/drawing/2014/main" xmlns="" val="10001"/>
+                    <a16:rowId xmlns="" xmlns:a16="http://schemas.microsoft.com/office/drawing/2014/main" val="10001"/>
                   </a:ext>
                 </a:extLst>
               </a:tr>
@@ -10741,7 +10724,7 @@
                 </a:tc>
                 <a:extLst>
                   <a:ext uri="{0D108BD9-81ED-4DB2-BD59-A6C34878D82A}">
-                    <a16:rowId xmlns:a16="http://schemas.microsoft.com/office/drawing/2014/main" xmlns="" val="10002"/>
+                    <a16:rowId xmlns="" xmlns:a16="http://schemas.microsoft.com/office/drawing/2014/main" val="10002"/>
                   </a:ext>
                 </a:extLst>
               </a:tr>
@@ -10777,7 +10760,7 @@
                 <a:gridCol w="1728192">
                   <a:extLst>
                     <a:ext uri="{9D8B030D-6E8A-4147-A177-3AD203B41FA5}">
-                      <a16:colId xmlns:a16="http://schemas.microsoft.com/office/drawing/2014/main" xmlns="" val="20000"/>
+                      <a16:colId xmlns="" xmlns:a16="http://schemas.microsoft.com/office/drawing/2014/main" val="20000"/>
                     </a:ext>
                   </a:extLst>
                 </a:gridCol>
@@ -10799,7 +10782,7 @@
                 </a:tc>
                 <a:extLst>
                   <a:ext uri="{0D108BD9-81ED-4DB2-BD59-A6C34878D82A}">
-                    <a16:rowId xmlns:a16="http://schemas.microsoft.com/office/drawing/2014/main" xmlns="" val="10000"/>
+                    <a16:rowId xmlns="" xmlns:a16="http://schemas.microsoft.com/office/drawing/2014/main" val="10000"/>
                   </a:ext>
                 </a:extLst>
               </a:tr>
@@ -10820,7 +10803,7 @@
                 </a:tc>
                 <a:extLst>
                   <a:ext uri="{0D108BD9-81ED-4DB2-BD59-A6C34878D82A}">
-                    <a16:rowId xmlns:a16="http://schemas.microsoft.com/office/drawing/2014/main" xmlns="" val="10001"/>
+                    <a16:rowId xmlns="" xmlns:a16="http://schemas.microsoft.com/office/drawing/2014/main" val="10001"/>
                   </a:ext>
                 </a:extLst>
               </a:tr>
@@ -10841,7 +10824,7 @@
                 </a:tc>
                 <a:extLst>
                   <a:ext uri="{0D108BD9-81ED-4DB2-BD59-A6C34878D82A}">
-                    <a16:rowId xmlns:a16="http://schemas.microsoft.com/office/drawing/2014/main" xmlns="" val="10002"/>
+                    <a16:rowId xmlns="" xmlns:a16="http://schemas.microsoft.com/office/drawing/2014/main" val="10002"/>
                   </a:ext>
                 </a:extLst>
               </a:tr>
@@ -10877,7 +10860,7 @@
                 <a:gridCol w="1728192">
                   <a:extLst>
                     <a:ext uri="{9D8B030D-6E8A-4147-A177-3AD203B41FA5}">
-                      <a16:colId xmlns:a16="http://schemas.microsoft.com/office/drawing/2014/main" xmlns="" val="20000"/>
+                      <a16:colId xmlns="" xmlns:a16="http://schemas.microsoft.com/office/drawing/2014/main" val="20000"/>
                     </a:ext>
                   </a:extLst>
                 </a:gridCol>
@@ -10899,7 +10882,7 @@
                 </a:tc>
                 <a:extLst>
                   <a:ext uri="{0D108BD9-81ED-4DB2-BD59-A6C34878D82A}">
-                    <a16:rowId xmlns:a16="http://schemas.microsoft.com/office/drawing/2014/main" xmlns="" val="10000"/>
+                    <a16:rowId xmlns="" xmlns:a16="http://schemas.microsoft.com/office/drawing/2014/main" val="10000"/>
                   </a:ext>
                 </a:extLst>
               </a:tr>
@@ -10920,7 +10903,7 @@
                 </a:tc>
                 <a:extLst>
                   <a:ext uri="{0D108BD9-81ED-4DB2-BD59-A6C34878D82A}">
-                    <a16:rowId xmlns:a16="http://schemas.microsoft.com/office/drawing/2014/main" xmlns="" val="10001"/>
+                    <a16:rowId xmlns="" xmlns:a16="http://schemas.microsoft.com/office/drawing/2014/main" val="10001"/>
                   </a:ext>
                 </a:extLst>
               </a:tr>
@@ -10941,7 +10924,7 @@
                 </a:tc>
                 <a:extLst>
                   <a:ext uri="{0D108BD9-81ED-4DB2-BD59-A6C34878D82A}">
-                    <a16:rowId xmlns:a16="http://schemas.microsoft.com/office/drawing/2014/main" xmlns="" val="10002"/>
+                    <a16:rowId xmlns="" xmlns:a16="http://schemas.microsoft.com/office/drawing/2014/main" val="10002"/>
                   </a:ext>
                 </a:extLst>
               </a:tr>
@@ -10977,7 +10960,7 @@
                 <a:gridCol w="1463824">
                   <a:extLst>
                     <a:ext uri="{9D8B030D-6E8A-4147-A177-3AD203B41FA5}">
-                      <a16:colId xmlns:a16="http://schemas.microsoft.com/office/drawing/2014/main" xmlns="" val="20000"/>
+                      <a16:colId xmlns="" xmlns:a16="http://schemas.microsoft.com/office/drawing/2014/main" val="20000"/>
                     </a:ext>
                   </a:extLst>
                 </a:gridCol>
@@ -10999,7 +10982,7 @@
                 </a:tc>
                 <a:extLst>
                   <a:ext uri="{0D108BD9-81ED-4DB2-BD59-A6C34878D82A}">
-                    <a16:rowId xmlns:a16="http://schemas.microsoft.com/office/drawing/2014/main" xmlns="" val="10000"/>
+                    <a16:rowId xmlns="" xmlns:a16="http://schemas.microsoft.com/office/drawing/2014/main" val="10000"/>
                   </a:ext>
                 </a:extLst>
               </a:tr>
@@ -11020,7 +11003,7 @@
                 </a:tc>
                 <a:extLst>
                   <a:ext uri="{0D108BD9-81ED-4DB2-BD59-A6C34878D82A}">
-                    <a16:rowId xmlns:a16="http://schemas.microsoft.com/office/drawing/2014/main" xmlns="" val="10001"/>
+                    <a16:rowId xmlns="" xmlns:a16="http://schemas.microsoft.com/office/drawing/2014/main" val="10001"/>
                   </a:ext>
                 </a:extLst>
               </a:tr>
@@ -11041,7 +11024,7 @@
                 </a:tc>
                 <a:extLst>
                   <a:ext uri="{0D108BD9-81ED-4DB2-BD59-A6C34878D82A}">
-                    <a16:rowId xmlns:a16="http://schemas.microsoft.com/office/drawing/2014/main" xmlns="" val="10002"/>
+                    <a16:rowId xmlns="" xmlns:a16="http://schemas.microsoft.com/office/drawing/2014/main" val="10002"/>
                   </a:ext>
                 </a:extLst>
               </a:tr>
@@ -11077,7 +11060,7 @@
                 <a:gridCol w="1463824">
                   <a:extLst>
                     <a:ext uri="{9D8B030D-6E8A-4147-A177-3AD203B41FA5}">
-                      <a16:colId xmlns:a16="http://schemas.microsoft.com/office/drawing/2014/main" xmlns="" val="20000"/>
+                      <a16:colId xmlns="" xmlns:a16="http://schemas.microsoft.com/office/drawing/2014/main" val="20000"/>
                     </a:ext>
                   </a:extLst>
                 </a:gridCol>
@@ -11098,7 +11081,7 @@
                 </a:tc>
                 <a:extLst>
                   <a:ext uri="{0D108BD9-81ED-4DB2-BD59-A6C34878D82A}">
-                    <a16:rowId xmlns:a16="http://schemas.microsoft.com/office/drawing/2014/main" xmlns="" val="10000"/>
+                    <a16:rowId xmlns="" xmlns:a16="http://schemas.microsoft.com/office/drawing/2014/main" val="10000"/>
                   </a:ext>
                 </a:extLst>
               </a:tr>
@@ -11119,7 +11102,7 @@
                 </a:tc>
                 <a:extLst>
                   <a:ext uri="{0D108BD9-81ED-4DB2-BD59-A6C34878D82A}">
-                    <a16:rowId xmlns:a16="http://schemas.microsoft.com/office/drawing/2014/main" xmlns="" val="10001"/>
+                    <a16:rowId xmlns="" xmlns:a16="http://schemas.microsoft.com/office/drawing/2014/main" val="10001"/>
                   </a:ext>
                 </a:extLst>
               </a:tr>
@@ -11153,7 +11136,7 @@
                 </a:tc>
                 <a:extLst>
                   <a:ext uri="{0D108BD9-81ED-4DB2-BD59-A6C34878D82A}">
-                    <a16:rowId xmlns:a16="http://schemas.microsoft.com/office/drawing/2014/main" xmlns="" val="10002"/>
+                    <a16:rowId xmlns="" xmlns:a16="http://schemas.microsoft.com/office/drawing/2014/main" val="10002"/>
                   </a:ext>
                 </a:extLst>
               </a:tr>
@@ -11189,7 +11172,7 @@
                 <a:gridCol w="1463824">
                   <a:extLst>
                     <a:ext uri="{9D8B030D-6E8A-4147-A177-3AD203B41FA5}">
-                      <a16:colId xmlns:a16="http://schemas.microsoft.com/office/drawing/2014/main" xmlns="" val="20000"/>
+                      <a16:colId xmlns="" xmlns:a16="http://schemas.microsoft.com/office/drawing/2014/main" val="20000"/>
                     </a:ext>
                   </a:extLst>
                 </a:gridCol>
@@ -11211,7 +11194,7 @@
                 </a:tc>
                 <a:extLst>
                   <a:ext uri="{0D108BD9-81ED-4DB2-BD59-A6C34878D82A}">
-                    <a16:rowId xmlns:a16="http://schemas.microsoft.com/office/drawing/2014/main" xmlns="" val="10000"/>
+                    <a16:rowId xmlns="" xmlns:a16="http://schemas.microsoft.com/office/drawing/2014/main" val="10000"/>
                   </a:ext>
                 </a:extLst>
               </a:tr>
@@ -11232,7 +11215,7 @@
                 </a:tc>
                 <a:extLst>
                   <a:ext uri="{0D108BD9-81ED-4DB2-BD59-A6C34878D82A}">
-                    <a16:rowId xmlns:a16="http://schemas.microsoft.com/office/drawing/2014/main" xmlns="" val="10001"/>
+                    <a16:rowId xmlns="" xmlns:a16="http://schemas.microsoft.com/office/drawing/2014/main" val="10001"/>
                   </a:ext>
                 </a:extLst>
               </a:tr>
@@ -11252,7 +11235,7 @@
                 </a:tc>
                 <a:extLst>
                   <a:ext uri="{0D108BD9-81ED-4DB2-BD59-A6C34878D82A}">
-                    <a16:rowId xmlns:a16="http://schemas.microsoft.com/office/drawing/2014/main" xmlns="" val="10002"/>
+                    <a16:rowId xmlns="" xmlns:a16="http://schemas.microsoft.com/office/drawing/2014/main" val="10002"/>
                   </a:ext>
                 </a:extLst>
               </a:tr>
@@ -11288,7 +11271,7 @@
                 <a:gridCol w="1463824">
                   <a:extLst>
                     <a:ext uri="{9D8B030D-6E8A-4147-A177-3AD203B41FA5}">
-                      <a16:colId xmlns:a16="http://schemas.microsoft.com/office/drawing/2014/main" xmlns="" val="20000"/>
+                      <a16:colId xmlns="" xmlns:a16="http://schemas.microsoft.com/office/drawing/2014/main" val="20000"/>
                     </a:ext>
                   </a:extLst>
                 </a:gridCol>
@@ -11310,7 +11293,7 @@
                 </a:tc>
                 <a:extLst>
                   <a:ext uri="{0D108BD9-81ED-4DB2-BD59-A6C34878D82A}">
-                    <a16:rowId xmlns:a16="http://schemas.microsoft.com/office/drawing/2014/main" xmlns="" val="10000"/>
+                    <a16:rowId xmlns="" xmlns:a16="http://schemas.microsoft.com/office/drawing/2014/main" val="10000"/>
                   </a:ext>
                 </a:extLst>
               </a:tr>
@@ -11330,7 +11313,7 @@
                 </a:tc>
                 <a:extLst>
                   <a:ext uri="{0D108BD9-81ED-4DB2-BD59-A6C34878D82A}">
-                    <a16:rowId xmlns:a16="http://schemas.microsoft.com/office/drawing/2014/main" xmlns="" val="10001"/>
+                    <a16:rowId xmlns="" xmlns:a16="http://schemas.microsoft.com/office/drawing/2014/main" val="10001"/>
                   </a:ext>
                 </a:extLst>
               </a:tr>
@@ -11351,7 +11334,7 @@
                 </a:tc>
                 <a:extLst>
                   <a:ext uri="{0D108BD9-81ED-4DB2-BD59-A6C34878D82A}">
-                    <a16:rowId xmlns:a16="http://schemas.microsoft.com/office/drawing/2014/main" xmlns="" val="10002"/>
+                    <a16:rowId xmlns="" xmlns:a16="http://schemas.microsoft.com/office/drawing/2014/main" val="10002"/>
                   </a:ext>
                 </a:extLst>
               </a:tr>
@@ -11417,7 +11400,7 @@
                 <a:gridCol w="1463824">
                   <a:extLst>
                     <a:ext uri="{9D8B030D-6E8A-4147-A177-3AD203B41FA5}">
-                      <a16:colId xmlns:a16="http://schemas.microsoft.com/office/drawing/2014/main" xmlns="" val="20000"/>
+                      <a16:colId xmlns="" xmlns:a16="http://schemas.microsoft.com/office/drawing/2014/main" val="20000"/>
                     </a:ext>
                   </a:extLst>
                 </a:gridCol>
@@ -11439,7 +11422,7 @@
                 </a:tc>
                 <a:extLst>
                   <a:ext uri="{0D108BD9-81ED-4DB2-BD59-A6C34878D82A}">
-                    <a16:rowId xmlns:a16="http://schemas.microsoft.com/office/drawing/2014/main" xmlns="" val="10000"/>
+                    <a16:rowId xmlns="" xmlns:a16="http://schemas.microsoft.com/office/drawing/2014/main" val="10000"/>
                   </a:ext>
                 </a:extLst>
               </a:tr>
@@ -11460,7 +11443,7 @@
                 </a:tc>
                 <a:extLst>
                   <a:ext uri="{0D108BD9-81ED-4DB2-BD59-A6C34878D82A}">
-                    <a16:rowId xmlns:a16="http://schemas.microsoft.com/office/drawing/2014/main" xmlns="" val="10001"/>
+                    <a16:rowId xmlns="" xmlns:a16="http://schemas.microsoft.com/office/drawing/2014/main" val="10001"/>
                   </a:ext>
                 </a:extLst>
               </a:tr>
@@ -11481,7 +11464,7 @@
                 </a:tc>
                 <a:extLst>
                   <a:ext uri="{0D108BD9-81ED-4DB2-BD59-A6C34878D82A}">
-                    <a16:rowId xmlns:a16="http://schemas.microsoft.com/office/drawing/2014/main" xmlns="" val="10002"/>
+                    <a16:rowId xmlns="" xmlns:a16="http://schemas.microsoft.com/office/drawing/2014/main" val="10002"/>
                   </a:ext>
                 </a:extLst>
               </a:tr>
@@ -11517,7 +11500,7 @@
                 <a:gridCol w="1800200">
                   <a:extLst>
                     <a:ext uri="{9D8B030D-6E8A-4147-A177-3AD203B41FA5}">
-                      <a16:colId xmlns:a16="http://schemas.microsoft.com/office/drawing/2014/main" xmlns="" val="20000"/>
+                      <a16:colId xmlns="" xmlns:a16="http://schemas.microsoft.com/office/drawing/2014/main" val="20000"/>
                     </a:ext>
                   </a:extLst>
                 </a:gridCol>
@@ -11539,7 +11522,7 @@
                 </a:tc>
                 <a:extLst>
                   <a:ext uri="{0D108BD9-81ED-4DB2-BD59-A6C34878D82A}">
-                    <a16:rowId xmlns:a16="http://schemas.microsoft.com/office/drawing/2014/main" xmlns="" val="10000"/>
+                    <a16:rowId xmlns="" xmlns:a16="http://schemas.microsoft.com/office/drawing/2014/main" val="10000"/>
                   </a:ext>
                 </a:extLst>
               </a:tr>
@@ -11560,7 +11543,7 @@
                 </a:tc>
                 <a:extLst>
                   <a:ext uri="{0D108BD9-81ED-4DB2-BD59-A6C34878D82A}">
-                    <a16:rowId xmlns:a16="http://schemas.microsoft.com/office/drawing/2014/main" xmlns="" val="10001"/>
+                    <a16:rowId xmlns="" xmlns:a16="http://schemas.microsoft.com/office/drawing/2014/main" val="10001"/>
                   </a:ext>
                 </a:extLst>
               </a:tr>
@@ -11581,7 +11564,7 @@
                 </a:tc>
                 <a:extLst>
                   <a:ext uri="{0D108BD9-81ED-4DB2-BD59-A6C34878D82A}">
-                    <a16:rowId xmlns:a16="http://schemas.microsoft.com/office/drawing/2014/main" xmlns="" val="10002"/>
+                    <a16:rowId xmlns="" xmlns:a16="http://schemas.microsoft.com/office/drawing/2014/main" val="10002"/>
                   </a:ext>
                 </a:extLst>
               </a:tr>
@@ -11617,7 +11600,7 @@
                 <a:gridCol w="1463824">
                   <a:extLst>
                     <a:ext uri="{9D8B030D-6E8A-4147-A177-3AD203B41FA5}">
-                      <a16:colId xmlns:a16="http://schemas.microsoft.com/office/drawing/2014/main" xmlns="" val="20000"/>
+                      <a16:colId xmlns="" xmlns:a16="http://schemas.microsoft.com/office/drawing/2014/main" val="20000"/>
                     </a:ext>
                   </a:extLst>
                 </a:gridCol>
@@ -11638,7 +11621,7 @@
                 </a:tc>
                 <a:extLst>
                   <a:ext uri="{0D108BD9-81ED-4DB2-BD59-A6C34878D82A}">
-                    <a16:rowId xmlns:a16="http://schemas.microsoft.com/office/drawing/2014/main" xmlns="" val="10000"/>
+                    <a16:rowId xmlns="" xmlns:a16="http://schemas.microsoft.com/office/drawing/2014/main" val="10000"/>
                   </a:ext>
                 </a:extLst>
               </a:tr>
@@ -11663,7 +11646,7 @@
                 </a:tc>
                 <a:extLst>
                   <a:ext uri="{0D108BD9-81ED-4DB2-BD59-A6C34878D82A}">
-                    <a16:rowId xmlns:a16="http://schemas.microsoft.com/office/drawing/2014/main" xmlns="" val="10001"/>
+                    <a16:rowId xmlns="" xmlns:a16="http://schemas.microsoft.com/office/drawing/2014/main" val="10001"/>
                   </a:ext>
                 </a:extLst>
               </a:tr>
@@ -11684,7 +11667,7 @@
                 </a:tc>
                 <a:extLst>
                   <a:ext uri="{0D108BD9-81ED-4DB2-BD59-A6C34878D82A}">
-                    <a16:rowId xmlns:a16="http://schemas.microsoft.com/office/drawing/2014/main" xmlns="" val="10002"/>
+                    <a16:rowId xmlns="" xmlns:a16="http://schemas.microsoft.com/office/drawing/2014/main" val="10002"/>
                   </a:ext>
                 </a:extLst>
               </a:tr>
@@ -11720,7 +11703,7 @@
                 <a:gridCol w="1463824">
                   <a:extLst>
                     <a:ext uri="{9D8B030D-6E8A-4147-A177-3AD203B41FA5}">
-                      <a16:colId xmlns:a16="http://schemas.microsoft.com/office/drawing/2014/main" xmlns="" val="20000"/>
+                      <a16:colId xmlns="" xmlns:a16="http://schemas.microsoft.com/office/drawing/2014/main" val="20000"/>
                     </a:ext>
                   </a:extLst>
                 </a:gridCol>
@@ -11741,7 +11724,7 @@
                 </a:tc>
                 <a:extLst>
                   <a:ext uri="{0D108BD9-81ED-4DB2-BD59-A6C34878D82A}">
-                    <a16:rowId xmlns:a16="http://schemas.microsoft.com/office/drawing/2014/main" xmlns="" val="10000"/>
+                    <a16:rowId xmlns="" xmlns:a16="http://schemas.microsoft.com/office/drawing/2014/main" val="10000"/>
                   </a:ext>
                 </a:extLst>
               </a:tr>
@@ -11762,7 +11745,7 @@
                 </a:tc>
                 <a:extLst>
                   <a:ext uri="{0D108BD9-81ED-4DB2-BD59-A6C34878D82A}">
-                    <a16:rowId xmlns:a16="http://schemas.microsoft.com/office/drawing/2014/main" xmlns="" val="10001"/>
+                    <a16:rowId xmlns="" xmlns:a16="http://schemas.microsoft.com/office/drawing/2014/main" val="10001"/>
                   </a:ext>
                 </a:extLst>
               </a:tr>
@@ -11789,7 +11772,7 @@
                 </a:tc>
                 <a:extLst>
                   <a:ext uri="{0D108BD9-81ED-4DB2-BD59-A6C34878D82A}">
-                    <a16:rowId xmlns:a16="http://schemas.microsoft.com/office/drawing/2014/main" xmlns="" val="10002"/>
+                    <a16:rowId xmlns="" xmlns:a16="http://schemas.microsoft.com/office/drawing/2014/main" val="10002"/>
                   </a:ext>
                 </a:extLst>
               </a:tr>
@@ -11825,7 +11808,7 @@
                 <a:gridCol w="1800200">
                   <a:extLst>
                     <a:ext uri="{9D8B030D-6E8A-4147-A177-3AD203B41FA5}">
-                      <a16:colId xmlns:a16="http://schemas.microsoft.com/office/drawing/2014/main" xmlns="" val="20000"/>
+                      <a16:colId xmlns="" xmlns:a16="http://schemas.microsoft.com/office/drawing/2014/main" val="20000"/>
                     </a:ext>
                   </a:extLst>
                 </a:gridCol>
@@ -11846,7 +11829,7 @@
                 </a:tc>
                 <a:extLst>
                   <a:ext uri="{0D108BD9-81ED-4DB2-BD59-A6C34878D82A}">
-                    <a16:rowId xmlns:a16="http://schemas.microsoft.com/office/drawing/2014/main" xmlns="" val="10000"/>
+                    <a16:rowId xmlns="" xmlns:a16="http://schemas.microsoft.com/office/drawing/2014/main" val="10000"/>
                   </a:ext>
                 </a:extLst>
               </a:tr>
@@ -11866,7 +11849,7 @@
                 </a:tc>
                 <a:extLst>
                   <a:ext uri="{0D108BD9-81ED-4DB2-BD59-A6C34878D82A}">
-                    <a16:rowId xmlns:a16="http://schemas.microsoft.com/office/drawing/2014/main" xmlns="" val="10001"/>
+                    <a16:rowId xmlns="" xmlns:a16="http://schemas.microsoft.com/office/drawing/2014/main" val="10001"/>
                   </a:ext>
                 </a:extLst>
               </a:tr>
@@ -11886,7 +11869,7 @@
                 </a:tc>
                 <a:extLst>
                   <a:ext uri="{0D108BD9-81ED-4DB2-BD59-A6C34878D82A}">
-                    <a16:rowId xmlns:a16="http://schemas.microsoft.com/office/drawing/2014/main" xmlns="" val="10002"/>
+                    <a16:rowId xmlns="" xmlns:a16="http://schemas.microsoft.com/office/drawing/2014/main" val="10002"/>
                   </a:ext>
                 </a:extLst>
               </a:tr>
@@ -11922,7 +11905,7 @@
                 <a:gridCol w="1463824">
                   <a:extLst>
                     <a:ext uri="{9D8B030D-6E8A-4147-A177-3AD203B41FA5}">
-                      <a16:colId xmlns:a16="http://schemas.microsoft.com/office/drawing/2014/main" xmlns="" val="20000"/>
+                      <a16:colId xmlns="" xmlns:a16="http://schemas.microsoft.com/office/drawing/2014/main" val="20000"/>
                     </a:ext>
                   </a:extLst>
                 </a:gridCol>
@@ -11943,7 +11926,7 @@
                 </a:tc>
                 <a:extLst>
                   <a:ext uri="{0D108BD9-81ED-4DB2-BD59-A6C34878D82A}">
-                    <a16:rowId xmlns:a16="http://schemas.microsoft.com/office/drawing/2014/main" xmlns="" val="10000"/>
+                    <a16:rowId xmlns="" xmlns:a16="http://schemas.microsoft.com/office/drawing/2014/main" val="10000"/>
                   </a:ext>
                 </a:extLst>
               </a:tr>
@@ -11963,7 +11946,7 @@
                 </a:tc>
                 <a:extLst>
                   <a:ext uri="{0D108BD9-81ED-4DB2-BD59-A6C34878D82A}">
-                    <a16:rowId xmlns:a16="http://schemas.microsoft.com/office/drawing/2014/main" xmlns="" val="10001"/>
+                    <a16:rowId xmlns="" xmlns:a16="http://schemas.microsoft.com/office/drawing/2014/main" val="10001"/>
                   </a:ext>
                 </a:extLst>
               </a:tr>
@@ -11983,7 +11966,7 @@
                 </a:tc>
                 <a:extLst>
                   <a:ext uri="{0D108BD9-81ED-4DB2-BD59-A6C34878D82A}">
-                    <a16:rowId xmlns:a16="http://schemas.microsoft.com/office/drawing/2014/main" xmlns="" val="10002"/>
+                    <a16:rowId xmlns="" xmlns:a16="http://schemas.microsoft.com/office/drawing/2014/main" val="10002"/>
                   </a:ext>
                 </a:extLst>
               </a:tr>
@@ -12019,7 +12002,7 @@
                 <a:gridCol w="1463824">
                   <a:extLst>
                     <a:ext uri="{9D8B030D-6E8A-4147-A177-3AD203B41FA5}">
-                      <a16:colId xmlns:a16="http://schemas.microsoft.com/office/drawing/2014/main" xmlns="" val="20000"/>
+                      <a16:colId xmlns="" xmlns:a16="http://schemas.microsoft.com/office/drawing/2014/main" val="20000"/>
                     </a:ext>
                   </a:extLst>
                 </a:gridCol>
@@ -12041,7 +12024,7 @@
                 </a:tc>
                 <a:extLst>
                   <a:ext uri="{0D108BD9-81ED-4DB2-BD59-A6C34878D82A}">
-                    <a16:rowId xmlns:a16="http://schemas.microsoft.com/office/drawing/2014/main" xmlns="" val="10000"/>
+                    <a16:rowId xmlns="" xmlns:a16="http://schemas.microsoft.com/office/drawing/2014/main" val="10000"/>
                   </a:ext>
                 </a:extLst>
               </a:tr>
@@ -12079,7 +12062,7 @@
                 </a:tc>
                 <a:extLst>
                   <a:ext uri="{0D108BD9-81ED-4DB2-BD59-A6C34878D82A}">
-                    <a16:rowId xmlns:a16="http://schemas.microsoft.com/office/drawing/2014/main" xmlns="" val="10001"/>
+                    <a16:rowId xmlns="" xmlns:a16="http://schemas.microsoft.com/office/drawing/2014/main" val="10001"/>
                   </a:ext>
                 </a:extLst>
               </a:tr>
@@ -12100,7 +12083,7 @@
                 </a:tc>
                 <a:extLst>
                   <a:ext uri="{0D108BD9-81ED-4DB2-BD59-A6C34878D82A}">
-                    <a16:rowId xmlns:a16="http://schemas.microsoft.com/office/drawing/2014/main" xmlns="" val="10002"/>
+                    <a16:rowId xmlns="" xmlns:a16="http://schemas.microsoft.com/office/drawing/2014/main" val="10002"/>
                   </a:ext>
                 </a:extLst>
               </a:tr>
@@ -12136,7 +12119,7 @@
                 <a:gridCol w="1463824">
                   <a:extLst>
                     <a:ext uri="{9D8B030D-6E8A-4147-A177-3AD203B41FA5}">
-                      <a16:colId xmlns:a16="http://schemas.microsoft.com/office/drawing/2014/main" xmlns="" val="20000"/>
+                      <a16:colId xmlns="" xmlns:a16="http://schemas.microsoft.com/office/drawing/2014/main" val="20000"/>
                     </a:ext>
                   </a:extLst>
                 </a:gridCol>
@@ -12158,7 +12141,7 @@
                 </a:tc>
                 <a:extLst>
                   <a:ext uri="{0D108BD9-81ED-4DB2-BD59-A6C34878D82A}">
-                    <a16:rowId xmlns:a16="http://schemas.microsoft.com/office/drawing/2014/main" xmlns="" val="10000"/>
+                    <a16:rowId xmlns="" xmlns:a16="http://schemas.microsoft.com/office/drawing/2014/main" val="10000"/>
                   </a:ext>
                 </a:extLst>
               </a:tr>
@@ -12195,7 +12178,7 @@
                 </a:tc>
                 <a:extLst>
                   <a:ext uri="{0D108BD9-81ED-4DB2-BD59-A6C34878D82A}">
-                    <a16:rowId xmlns:a16="http://schemas.microsoft.com/office/drawing/2014/main" xmlns="" val="10001"/>
+                    <a16:rowId xmlns="" xmlns:a16="http://schemas.microsoft.com/office/drawing/2014/main" val="10001"/>
                   </a:ext>
                 </a:extLst>
               </a:tr>
@@ -12216,7 +12199,7 @@
                 </a:tc>
                 <a:extLst>
                   <a:ext uri="{0D108BD9-81ED-4DB2-BD59-A6C34878D82A}">
-                    <a16:rowId xmlns:a16="http://schemas.microsoft.com/office/drawing/2014/main" xmlns="" val="10002"/>
+                    <a16:rowId xmlns="" xmlns:a16="http://schemas.microsoft.com/office/drawing/2014/main" val="10002"/>
                   </a:ext>
                 </a:extLst>
               </a:tr>
@@ -12252,7 +12235,7 @@
                 <a:gridCol w="1463824">
                   <a:extLst>
                     <a:ext uri="{9D8B030D-6E8A-4147-A177-3AD203B41FA5}">
-                      <a16:colId xmlns:a16="http://schemas.microsoft.com/office/drawing/2014/main" xmlns="" val="20000"/>
+                      <a16:colId xmlns="" xmlns:a16="http://schemas.microsoft.com/office/drawing/2014/main" val="20000"/>
                     </a:ext>
                   </a:extLst>
                 </a:gridCol>
@@ -12273,7 +12256,7 @@
                 </a:tc>
                 <a:extLst>
                   <a:ext uri="{0D108BD9-81ED-4DB2-BD59-A6C34878D82A}">
-                    <a16:rowId xmlns:a16="http://schemas.microsoft.com/office/drawing/2014/main" xmlns="" val="10000"/>
+                    <a16:rowId xmlns="" xmlns:a16="http://schemas.microsoft.com/office/drawing/2014/main" val="10000"/>
                   </a:ext>
                 </a:extLst>
               </a:tr>
@@ -12310,7 +12293,7 @@
                 </a:tc>
                 <a:extLst>
                   <a:ext uri="{0D108BD9-81ED-4DB2-BD59-A6C34878D82A}">
-                    <a16:rowId xmlns:a16="http://schemas.microsoft.com/office/drawing/2014/main" xmlns="" val="10001"/>
+                    <a16:rowId xmlns="" xmlns:a16="http://schemas.microsoft.com/office/drawing/2014/main" val="10001"/>
                   </a:ext>
                 </a:extLst>
               </a:tr>
@@ -12331,7 +12314,7 @@
                 </a:tc>
                 <a:extLst>
                   <a:ext uri="{0D108BD9-81ED-4DB2-BD59-A6C34878D82A}">
-                    <a16:rowId xmlns:a16="http://schemas.microsoft.com/office/drawing/2014/main" xmlns="" val="10002"/>
+                    <a16:rowId xmlns="" xmlns:a16="http://schemas.microsoft.com/office/drawing/2014/main" val="10002"/>
                   </a:ext>
                 </a:extLst>
               </a:tr>
@@ -12602,7 +12585,7 @@
           <p:cNvPr id="51" name="28 Tabla">
             <a:extLst>
               <a:ext uri="{FF2B5EF4-FFF2-40B4-BE49-F238E27FC236}">
-                <a16:creationId xmlns:a16="http://schemas.microsoft.com/office/drawing/2014/main" xmlns="" id="{7BC80704-58FD-41C9-9A09-CA32EBE0B254}"/>
+                <a16:creationId xmlns="" xmlns:a16="http://schemas.microsoft.com/office/drawing/2014/main" id="{7BC80704-58FD-41C9-9A09-CA32EBE0B254}"/>
               </a:ext>
             </a:extLst>
           </p:cNvPr>
@@ -12631,7 +12614,7 @@
                 <a:gridCol w="1463824">
                   <a:extLst>
                     <a:ext uri="{9D8B030D-6E8A-4147-A177-3AD203B41FA5}">
-                      <a16:colId xmlns:a16="http://schemas.microsoft.com/office/drawing/2014/main" xmlns="" val="20000"/>
+                      <a16:colId xmlns="" xmlns:a16="http://schemas.microsoft.com/office/drawing/2014/main" val="20000"/>
                     </a:ext>
                   </a:extLst>
                 </a:gridCol>
@@ -12653,7 +12636,7 @@
                 </a:tc>
                 <a:extLst>
                   <a:ext uri="{0D108BD9-81ED-4DB2-BD59-A6C34878D82A}">
-                    <a16:rowId xmlns:a16="http://schemas.microsoft.com/office/drawing/2014/main" xmlns="" val="10000"/>
+                    <a16:rowId xmlns="" xmlns:a16="http://schemas.microsoft.com/office/drawing/2014/main" val="10000"/>
                   </a:ext>
                 </a:extLst>
               </a:tr>
@@ -12691,7 +12674,7 @@
                 </a:tc>
                 <a:extLst>
                   <a:ext uri="{0D108BD9-81ED-4DB2-BD59-A6C34878D82A}">
-                    <a16:rowId xmlns:a16="http://schemas.microsoft.com/office/drawing/2014/main" xmlns="" val="10001"/>
+                    <a16:rowId xmlns="" xmlns:a16="http://schemas.microsoft.com/office/drawing/2014/main" val="10001"/>
                   </a:ext>
                 </a:extLst>
               </a:tr>
@@ -12712,7 +12695,7 @@
                 </a:tc>
                 <a:extLst>
                   <a:ext uri="{0D108BD9-81ED-4DB2-BD59-A6C34878D82A}">
-                    <a16:rowId xmlns:a16="http://schemas.microsoft.com/office/drawing/2014/main" xmlns="" val="10002"/>
+                    <a16:rowId xmlns="" xmlns:a16="http://schemas.microsoft.com/office/drawing/2014/main" val="10002"/>
                   </a:ext>
                 </a:extLst>
               </a:tr>
@@ -12779,7 +12762,7 @@
                 <a:gridCol w="1103784">
                   <a:extLst>
                     <a:ext uri="{9D8B030D-6E8A-4147-A177-3AD203B41FA5}">
-                      <a16:colId xmlns:a16="http://schemas.microsoft.com/office/drawing/2014/main" xmlns="" val="20000"/>
+                      <a16:colId xmlns="" xmlns:a16="http://schemas.microsoft.com/office/drawing/2014/main" val="20000"/>
                     </a:ext>
                   </a:extLst>
                 </a:gridCol>
@@ -12801,7 +12784,7 @@
                 </a:tc>
                 <a:extLst>
                   <a:ext uri="{0D108BD9-81ED-4DB2-BD59-A6C34878D82A}">
-                    <a16:rowId xmlns:a16="http://schemas.microsoft.com/office/drawing/2014/main" xmlns="" val="10000"/>
+                    <a16:rowId xmlns="" xmlns:a16="http://schemas.microsoft.com/office/drawing/2014/main" val="10000"/>
                   </a:ext>
                 </a:extLst>
               </a:tr>
@@ -12826,7 +12809,7 @@
                 </a:tc>
                 <a:extLst>
                   <a:ext uri="{0D108BD9-81ED-4DB2-BD59-A6C34878D82A}">
-                    <a16:rowId xmlns:a16="http://schemas.microsoft.com/office/drawing/2014/main" xmlns="" val="10001"/>
+                    <a16:rowId xmlns="" xmlns:a16="http://schemas.microsoft.com/office/drawing/2014/main" val="10001"/>
                   </a:ext>
                 </a:extLst>
               </a:tr>
@@ -12868,7 +12851,7 @@
                 </a:tc>
                 <a:extLst>
                   <a:ext uri="{0D108BD9-81ED-4DB2-BD59-A6C34878D82A}">
-                    <a16:rowId xmlns:a16="http://schemas.microsoft.com/office/drawing/2014/main" xmlns="" val="10002"/>
+                    <a16:rowId xmlns="" xmlns:a16="http://schemas.microsoft.com/office/drawing/2014/main" val="10002"/>
                   </a:ext>
                 </a:extLst>
               </a:tr>
@@ -12911,7 +12894,7 @@
           <p:cNvPr id="2" name="24 Tabla">
             <a:extLst>
               <a:ext uri="{FF2B5EF4-FFF2-40B4-BE49-F238E27FC236}">
-                <a16:creationId xmlns:a16="http://schemas.microsoft.com/office/drawing/2014/main" xmlns="" id="{F6A8AF39-2787-44F7-B4F6-72ABA8FD81D3}"/>
+                <a16:creationId xmlns="" xmlns:a16="http://schemas.microsoft.com/office/drawing/2014/main" id="{F6A8AF39-2787-44F7-B4F6-72ABA8FD81D3}"/>
               </a:ext>
             </a:extLst>
           </p:cNvPr>
@@ -12940,7 +12923,7 @@
                 <a:gridCol w="1463824">
                   <a:extLst>
                     <a:ext uri="{9D8B030D-6E8A-4147-A177-3AD203B41FA5}">
-                      <a16:colId xmlns:a16="http://schemas.microsoft.com/office/drawing/2014/main" xmlns="" val="20000"/>
+                      <a16:colId xmlns="" xmlns:a16="http://schemas.microsoft.com/office/drawing/2014/main" val="20000"/>
                     </a:ext>
                   </a:extLst>
                 </a:gridCol>
@@ -12962,7 +12945,7 @@
                 </a:tc>
                 <a:extLst>
                   <a:ext uri="{0D108BD9-81ED-4DB2-BD59-A6C34878D82A}">
-                    <a16:rowId xmlns:a16="http://schemas.microsoft.com/office/drawing/2014/main" xmlns="" val="10000"/>
+                    <a16:rowId xmlns="" xmlns:a16="http://schemas.microsoft.com/office/drawing/2014/main" val="10000"/>
                   </a:ext>
                 </a:extLst>
               </a:tr>
@@ -12983,7 +12966,7 @@
                 </a:tc>
                 <a:extLst>
                   <a:ext uri="{0D108BD9-81ED-4DB2-BD59-A6C34878D82A}">
-                    <a16:rowId xmlns:a16="http://schemas.microsoft.com/office/drawing/2014/main" xmlns="" val="10001"/>
+                    <a16:rowId xmlns="" xmlns:a16="http://schemas.microsoft.com/office/drawing/2014/main" val="10001"/>
                   </a:ext>
                 </a:extLst>
               </a:tr>
@@ -13070,7 +13053,7 @@
                 </a:tc>
                 <a:extLst>
                   <a:ext uri="{0D108BD9-81ED-4DB2-BD59-A6C34878D82A}">
-                    <a16:rowId xmlns:a16="http://schemas.microsoft.com/office/drawing/2014/main" xmlns="" val="10002"/>
+                    <a16:rowId xmlns="" xmlns:a16="http://schemas.microsoft.com/office/drawing/2014/main" val="10002"/>
                   </a:ext>
                 </a:extLst>
               </a:tr>
@@ -13083,7 +13066,7 @@
           <p:cNvPr id="3" name="24 Tabla">
             <a:extLst>
               <a:ext uri="{FF2B5EF4-FFF2-40B4-BE49-F238E27FC236}">
-                <a16:creationId xmlns:a16="http://schemas.microsoft.com/office/drawing/2014/main" xmlns="" id="{F6A8AF39-2787-44F7-B4F6-72ABA8FD81D3}"/>
+                <a16:creationId xmlns="" xmlns:a16="http://schemas.microsoft.com/office/drawing/2014/main" id="{F6A8AF39-2787-44F7-B4F6-72ABA8FD81D3}"/>
               </a:ext>
             </a:extLst>
           </p:cNvPr>
@@ -13112,7 +13095,7 @@
                 <a:gridCol w="1463824">
                   <a:extLst>
                     <a:ext uri="{9D8B030D-6E8A-4147-A177-3AD203B41FA5}">
-                      <a16:colId xmlns:a16="http://schemas.microsoft.com/office/drawing/2014/main" xmlns="" val="20000"/>
+                      <a16:colId xmlns="" xmlns:a16="http://schemas.microsoft.com/office/drawing/2014/main" val="20000"/>
                     </a:ext>
                   </a:extLst>
                 </a:gridCol>
@@ -13134,7 +13117,7 @@
                 </a:tc>
                 <a:extLst>
                   <a:ext uri="{0D108BD9-81ED-4DB2-BD59-A6C34878D82A}">
-                    <a16:rowId xmlns:a16="http://schemas.microsoft.com/office/drawing/2014/main" xmlns="" val="10000"/>
+                    <a16:rowId xmlns="" xmlns:a16="http://schemas.microsoft.com/office/drawing/2014/main" val="10000"/>
                   </a:ext>
                 </a:extLst>
               </a:tr>
@@ -13154,7 +13137,7 @@
                 </a:tc>
                 <a:extLst>
                   <a:ext uri="{0D108BD9-81ED-4DB2-BD59-A6C34878D82A}">
-                    <a16:rowId xmlns:a16="http://schemas.microsoft.com/office/drawing/2014/main" xmlns="" val="10001"/>
+                    <a16:rowId xmlns="" xmlns:a16="http://schemas.microsoft.com/office/drawing/2014/main" val="10001"/>
                   </a:ext>
                 </a:extLst>
               </a:tr>
@@ -13175,7 +13158,7 @@
                 </a:tc>
                 <a:extLst>
                   <a:ext uri="{0D108BD9-81ED-4DB2-BD59-A6C34878D82A}">
-                    <a16:rowId xmlns:a16="http://schemas.microsoft.com/office/drawing/2014/main" xmlns="" val="10002"/>
+                    <a16:rowId xmlns="" xmlns:a16="http://schemas.microsoft.com/office/drawing/2014/main" val="10002"/>
                   </a:ext>
                 </a:extLst>
               </a:tr>
@@ -13188,7 +13171,7 @@
           <p:cNvPr id="4" name="24 Tabla">
             <a:extLst>
               <a:ext uri="{FF2B5EF4-FFF2-40B4-BE49-F238E27FC236}">
-                <a16:creationId xmlns:a16="http://schemas.microsoft.com/office/drawing/2014/main" xmlns="" id="{F6A8AF39-2787-44F7-B4F6-72ABA8FD81D3}"/>
+                <a16:creationId xmlns="" xmlns:a16="http://schemas.microsoft.com/office/drawing/2014/main" id="{F6A8AF39-2787-44F7-B4F6-72ABA8FD81D3}"/>
               </a:ext>
             </a:extLst>
           </p:cNvPr>
@@ -13217,7 +13200,7 @@
                 <a:gridCol w="1463824">
                   <a:extLst>
                     <a:ext uri="{9D8B030D-6E8A-4147-A177-3AD203B41FA5}">
-                      <a16:colId xmlns:a16="http://schemas.microsoft.com/office/drawing/2014/main" xmlns="" val="20000"/>
+                      <a16:colId xmlns="" xmlns:a16="http://schemas.microsoft.com/office/drawing/2014/main" val="20000"/>
                     </a:ext>
                   </a:extLst>
                 </a:gridCol>
@@ -13239,7 +13222,7 @@
                 </a:tc>
                 <a:extLst>
                   <a:ext uri="{0D108BD9-81ED-4DB2-BD59-A6C34878D82A}">
-                    <a16:rowId xmlns:a16="http://schemas.microsoft.com/office/drawing/2014/main" xmlns="" val="10000"/>
+                    <a16:rowId xmlns="" xmlns:a16="http://schemas.microsoft.com/office/drawing/2014/main" val="10000"/>
                   </a:ext>
                 </a:extLst>
               </a:tr>
@@ -13260,7 +13243,7 @@
                 </a:tc>
                 <a:extLst>
                   <a:ext uri="{0D108BD9-81ED-4DB2-BD59-A6C34878D82A}">
-                    <a16:rowId xmlns:a16="http://schemas.microsoft.com/office/drawing/2014/main" xmlns="" val="10001"/>
+                    <a16:rowId xmlns="" xmlns:a16="http://schemas.microsoft.com/office/drawing/2014/main" val="10001"/>
                   </a:ext>
                 </a:extLst>
               </a:tr>
@@ -13281,7 +13264,7 @@
                 </a:tc>
                 <a:extLst>
                   <a:ext uri="{0D108BD9-81ED-4DB2-BD59-A6C34878D82A}">
-                    <a16:rowId xmlns:a16="http://schemas.microsoft.com/office/drawing/2014/main" xmlns="" val="10002"/>
+                    <a16:rowId xmlns="" xmlns:a16="http://schemas.microsoft.com/office/drawing/2014/main" val="10002"/>
                   </a:ext>
                 </a:extLst>
               </a:tr>
@@ -13352,7 +13335,7 @@
           <p:cNvPr id="9" name="36 Tabla">
             <a:extLst>
               <a:ext uri="{FF2B5EF4-FFF2-40B4-BE49-F238E27FC236}">
-                <a16:creationId xmlns:a16="http://schemas.microsoft.com/office/drawing/2014/main" xmlns="" id="{74E71F2C-CF67-4AFF-8B3F-B7DD43BBFA8A}"/>
+                <a16:creationId xmlns="" xmlns:a16="http://schemas.microsoft.com/office/drawing/2014/main" id="{74E71F2C-CF67-4AFF-8B3F-B7DD43BBFA8A}"/>
               </a:ext>
             </a:extLst>
           </p:cNvPr>
@@ -13381,7 +13364,7 @@
                 <a:gridCol w="1463824">
                   <a:extLst>
                     <a:ext uri="{9D8B030D-6E8A-4147-A177-3AD203B41FA5}">
-                      <a16:colId xmlns:a16="http://schemas.microsoft.com/office/drawing/2014/main" xmlns="" val="20000"/>
+                      <a16:colId xmlns="" xmlns:a16="http://schemas.microsoft.com/office/drawing/2014/main" val="20000"/>
                     </a:ext>
                   </a:extLst>
                 </a:gridCol>
@@ -13402,7 +13385,7 @@
                 </a:tc>
                 <a:extLst>
                   <a:ext uri="{0D108BD9-81ED-4DB2-BD59-A6C34878D82A}">
-                    <a16:rowId xmlns:a16="http://schemas.microsoft.com/office/drawing/2014/main" xmlns="" val="10000"/>
+                    <a16:rowId xmlns="" xmlns:a16="http://schemas.microsoft.com/office/drawing/2014/main" val="10000"/>
                   </a:ext>
                 </a:extLst>
               </a:tr>
@@ -13423,7 +13406,7 @@
                 </a:tc>
                 <a:extLst>
                   <a:ext uri="{0D108BD9-81ED-4DB2-BD59-A6C34878D82A}">
-                    <a16:rowId xmlns:a16="http://schemas.microsoft.com/office/drawing/2014/main" xmlns="" val="10001"/>
+                    <a16:rowId xmlns="" xmlns:a16="http://schemas.microsoft.com/office/drawing/2014/main" val="10001"/>
                   </a:ext>
                 </a:extLst>
               </a:tr>
@@ -13451,7 +13434,7 @@
                 </a:tc>
                 <a:extLst>
                   <a:ext uri="{0D108BD9-81ED-4DB2-BD59-A6C34878D82A}">
-                    <a16:rowId xmlns:a16="http://schemas.microsoft.com/office/drawing/2014/main" xmlns="" val="10002"/>
+                    <a16:rowId xmlns="" xmlns:a16="http://schemas.microsoft.com/office/drawing/2014/main" val="10002"/>
                   </a:ext>
                 </a:extLst>
               </a:tr>
@@ -13487,7 +13470,7 @@
                 <a:gridCol w="1463824">
                   <a:extLst>
                     <a:ext uri="{9D8B030D-6E8A-4147-A177-3AD203B41FA5}">
-                      <a16:colId xmlns:a16="http://schemas.microsoft.com/office/drawing/2014/main" xmlns="" val="20000"/>
+                      <a16:colId xmlns="" xmlns:a16="http://schemas.microsoft.com/office/drawing/2014/main" val="20000"/>
                     </a:ext>
                   </a:extLst>
                 </a:gridCol>
@@ -13508,7 +13491,7 @@
                 </a:tc>
                 <a:extLst>
                   <a:ext uri="{0D108BD9-81ED-4DB2-BD59-A6C34878D82A}">
-                    <a16:rowId xmlns:a16="http://schemas.microsoft.com/office/drawing/2014/main" xmlns="" val="10000"/>
+                    <a16:rowId xmlns="" xmlns:a16="http://schemas.microsoft.com/office/drawing/2014/main" val="10000"/>
                   </a:ext>
                 </a:extLst>
               </a:tr>
@@ -13529,7 +13512,7 @@
                 </a:tc>
                 <a:extLst>
                   <a:ext uri="{0D108BD9-81ED-4DB2-BD59-A6C34878D82A}">
-                    <a16:rowId xmlns:a16="http://schemas.microsoft.com/office/drawing/2014/main" xmlns="" val="10001"/>
+                    <a16:rowId xmlns="" xmlns:a16="http://schemas.microsoft.com/office/drawing/2014/main" val="10001"/>
                   </a:ext>
                 </a:extLst>
               </a:tr>
@@ -13550,7 +13533,7 @@
                 </a:tc>
                 <a:extLst>
                   <a:ext uri="{0D108BD9-81ED-4DB2-BD59-A6C34878D82A}">
-                    <a16:rowId xmlns:a16="http://schemas.microsoft.com/office/drawing/2014/main" xmlns="" val="10002"/>
+                    <a16:rowId xmlns="" xmlns:a16="http://schemas.microsoft.com/office/drawing/2014/main" val="10002"/>
                   </a:ext>
                 </a:extLst>
               </a:tr>
@@ -13615,7 +13598,7 @@
                 <a:gridCol w="1463824">
                   <a:extLst>
                     <a:ext uri="{9D8B030D-6E8A-4147-A177-3AD203B41FA5}">
-                      <a16:colId xmlns:a16="http://schemas.microsoft.com/office/drawing/2014/main" xmlns="" val="20000"/>
+                      <a16:colId xmlns="" xmlns:a16="http://schemas.microsoft.com/office/drawing/2014/main" val="20000"/>
                     </a:ext>
                   </a:extLst>
                 </a:gridCol>
@@ -13636,7 +13619,7 @@
                 </a:tc>
                 <a:extLst>
                   <a:ext uri="{0D108BD9-81ED-4DB2-BD59-A6C34878D82A}">
-                    <a16:rowId xmlns:a16="http://schemas.microsoft.com/office/drawing/2014/main" xmlns="" val="10000"/>
+                    <a16:rowId xmlns="" xmlns:a16="http://schemas.microsoft.com/office/drawing/2014/main" val="10000"/>
                   </a:ext>
                 </a:extLst>
               </a:tr>
@@ -13657,7 +13640,7 @@
                 </a:tc>
                 <a:extLst>
                   <a:ext uri="{0D108BD9-81ED-4DB2-BD59-A6C34878D82A}">
-                    <a16:rowId xmlns:a16="http://schemas.microsoft.com/office/drawing/2014/main" xmlns="" val="10001"/>
+                    <a16:rowId xmlns="" xmlns:a16="http://schemas.microsoft.com/office/drawing/2014/main" val="10001"/>
                   </a:ext>
                 </a:extLst>
               </a:tr>
@@ -13678,7 +13661,7 @@
                 </a:tc>
                 <a:extLst>
                   <a:ext uri="{0D108BD9-81ED-4DB2-BD59-A6C34878D82A}">
-                    <a16:rowId xmlns:a16="http://schemas.microsoft.com/office/drawing/2014/main" xmlns="" val="10002"/>
+                    <a16:rowId xmlns="" xmlns:a16="http://schemas.microsoft.com/office/drawing/2014/main" val="10002"/>
                   </a:ext>
                 </a:extLst>
               </a:tr>
@@ -13714,7 +13697,7 @@
                 <a:gridCol w="1463824">
                   <a:extLst>
                     <a:ext uri="{9D8B030D-6E8A-4147-A177-3AD203B41FA5}">
-                      <a16:colId xmlns:a16="http://schemas.microsoft.com/office/drawing/2014/main" xmlns="" val="20000"/>
+                      <a16:colId xmlns="" xmlns:a16="http://schemas.microsoft.com/office/drawing/2014/main" val="20000"/>
                     </a:ext>
                   </a:extLst>
                 </a:gridCol>
@@ -13735,7 +13718,7 @@
                 </a:tc>
                 <a:extLst>
                   <a:ext uri="{0D108BD9-81ED-4DB2-BD59-A6C34878D82A}">
-                    <a16:rowId xmlns:a16="http://schemas.microsoft.com/office/drawing/2014/main" xmlns="" val="10000"/>
+                    <a16:rowId xmlns="" xmlns:a16="http://schemas.microsoft.com/office/drawing/2014/main" val="10000"/>
                   </a:ext>
                 </a:extLst>
               </a:tr>
@@ -13756,7 +13739,7 @@
                 </a:tc>
                 <a:extLst>
                   <a:ext uri="{0D108BD9-81ED-4DB2-BD59-A6C34878D82A}">
-                    <a16:rowId xmlns:a16="http://schemas.microsoft.com/office/drawing/2014/main" xmlns="" val="10001"/>
+                    <a16:rowId xmlns="" xmlns:a16="http://schemas.microsoft.com/office/drawing/2014/main" val="10001"/>
                   </a:ext>
                 </a:extLst>
               </a:tr>
@@ -13777,7 +13760,7 @@
                 </a:tc>
                 <a:extLst>
                   <a:ext uri="{0D108BD9-81ED-4DB2-BD59-A6C34878D82A}">
-                    <a16:rowId xmlns:a16="http://schemas.microsoft.com/office/drawing/2014/main" xmlns="" val="10002"/>
+                    <a16:rowId xmlns="" xmlns:a16="http://schemas.microsoft.com/office/drawing/2014/main" val="10002"/>
                   </a:ext>
                 </a:extLst>
               </a:tr>
@@ -13813,7 +13796,7 @@
                 <a:gridCol w="1463824">
                   <a:extLst>
                     <a:ext uri="{9D8B030D-6E8A-4147-A177-3AD203B41FA5}">
-                      <a16:colId xmlns:a16="http://schemas.microsoft.com/office/drawing/2014/main" xmlns="" val="20000"/>
+                      <a16:colId xmlns="" xmlns:a16="http://schemas.microsoft.com/office/drawing/2014/main" val="20000"/>
                     </a:ext>
                   </a:extLst>
                 </a:gridCol>
@@ -13834,7 +13817,7 @@
                 </a:tc>
                 <a:extLst>
                   <a:ext uri="{0D108BD9-81ED-4DB2-BD59-A6C34878D82A}">
-                    <a16:rowId xmlns:a16="http://schemas.microsoft.com/office/drawing/2014/main" xmlns="" val="10000"/>
+                    <a16:rowId xmlns="" xmlns:a16="http://schemas.microsoft.com/office/drawing/2014/main" val="10000"/>
                   </a:ext>
                 </a:extLst>
               </a:tr>
@@ -13855,7 +13838,7 @@
                 </a:tc>
                 <a:extLst>
                   <a:ext uri="{0D108BD9-81ED-4DB2-BD59-A6C34878D82A}">
-                    <a16:rowId xmlns:a16="http://schemas.microsoft.com/office/drawing/2014/main" xmlns="" val="10001"/>
+                    <a16:rowId xmlns="" xmlns:a16="http://schemas.microsoft.com/office/drawing/2014/main" val="10001"/>
                   </a:ext>
                 </a:extLst>
               </a:tr>
@@ -13876,7 +13859,7 @@
                 </a:tc>
                 <a:extLst>
                   <a:ext uri="{0D108BD9-81ED-4DB2-BD59-A6C34878D82A}">
-                    <a16:rowId xmlns:a16="http://schemas.microsoft.com/office/drawing/2014/main" xmlns="" val="10002"/>
+                    <a16:rowId xmlns="" xmlns:a16="http://schemas.microsoft.com/office/drawing/2014/main" val="10002"/>
                   </a:ext>
                 </a:extLst>
               </a:tr>
@@ -13912,7 +13895,7 @@
                 <a:gridCol w="1463824">
                   <a:extLst>
                     <a:ext uri="{9D8B030D-6E8A-4147-A177-3AD203B41FA5}">
-                      <a16:colId xmlns:a16="http://schemas.microsoft.com/office/drawing/2014/main" xmlns="" val="20000"/>
+                      <a16:colId xmlns="" xmlns:a16="http://schemas.microsoft.com/office/drawing/2014/main" val="20000"/>
                     </a:ext>
                   </a:extLst>
                 </a:gridCol>
@@ -13933,7 +13916,7 @@
                 </a:tc>
                 <a:extLst>
                   <a:ext uri="{0D108BD9-81ED-4DB2-BD59-A6C34878D82A}">
-                    <a16:rowId xmlns:a16="http://schemas.microsoft.com/office/drawing/2014/main" xmlns="" val="10000"/>
+                    <a16:rowId xmlns="" xmlns:a16="http://schemas.microsoft.com/office/drawing/2014/main" val="10000"/>
                   </a:ext>
                 </a:extLst>
               </a:tr>
@@ -13954,7 +13937,7 @@
                 </a:tc>
                 <a:extLst>
                   <a:ext uri="{0D108BD9-81ED-4DB2-BD59-A6C34878D82A}">
-                    <a16:rowId xmlns:a16="http://schemas.microsoft.com/office/drawing/2014/main" xmlns="" val="10001"/>
+                    <a16:rowId xmlns="" xmlns:a16="http://schemas.microsoft.com/office/drawing/2014/main" val="10001"/>
                   </a:ext>
                 </a:extLst>
               </a:tr>
@@ -13975,7 +13958,7 @@
                 </a:tc>
                 <a:extLst>
                   <a:ext uri="{0D108BD9-81ED-4DB2-BD59-A6C34878D82A}">
-                    <a16:rowId xmlns:a16="http://schemas.microsoft.com/office/drawing/2014/main" xmlns="" val="10002"/>
+                    <a16:rowId xmlns="" xmlns:a16="http://schemas.microsoft.com/office/drawing/2014/main" val="10002"/>
                   </a:ext>
                 </a:extLst>
               </a:tr>
@@ -14129,7 +14112,7 @@
                 <a:gridCol w="1463824">
                   <a:extLst>
                     <a:ext uri="{9D8B030D-6E8A-4147-A177-3AD203B41FA5}">
-                      <a16:colId xmlns:a16="http://schemas.microsoft.com/office/drawing/2014/main" xmlns="" val="20000"/>
+                      <a16:colId xmlns="" xmlns:a16="http://schemas.microsoft.com/office/drawing/2014/main" val="20000"/>
                     </a:ext>
                   </a:extLst>
                 </a:gridCol>
@@ -14151,7 +14134,7 @@
                 </a:tc>
                 <a:extLst>
                   <a:ext uri="{0D108BD9-81ED-4DB2-BD59-A6C34878D82A}">
-                    <a16:rowId xmlns:a16="http://schemas.microsoft.com/office/drawing/2014/main" xmlns="" val="10000"/>
+                    <a16:rowId xmlns="" xmlns:a16="http://schemas.microsoft.com/office/drawing/2014/main" val="10000"/>
                   </a:ext>
                 </a:extLst>
               </a:tr>
@@ -14172,7 +14155,7 @@
                 </a:tc>
                 <a:extLst>
                   <a:ext uri="{0D108BD9-81ED-4DB2-BD59-A6C34878D82A}">
-                    <a16:rowId xmlns:a16="http://schemas.microsoft.com/office/drawing/2014/main" xmlns="" val="10001"/>
+                    <a16:rowId xmlns="" xmlns:a16="http://schemas.microsoft.com/office/drawing/2014/main" val="10001"/>
                   </a:ext>
                 </a:extLst>
               </a:tr>
@@ -14193,7 +14176,7 @@
                 </a:tc>
                 <a:extLst>
                   <a:ext uri="{0D108BD9-81ED-4DB2-BD59-A6C34878D82A}">
-                    <a16:rowId xmlns:a16="http://schemas.microsoft.com/office/drawing/2014/main" xmlns="" val="10002"/>
+                    <a16:rowId xmlns="" xmlns:a16="http://schemas.microsoft.com/office/drawing/2014/main" val="10002"/>
                   </a:ext>
                 </a:extLst>
               </a:tr>
@@ -14229,7 +14212,7 @@
                 <a:gridCol w="1463824">
                   <a:extLst>
                     <a:ext uri="{9D8B030D-6E8A-4147-A177-3AD203B41FA5}">
-                      <a16:colId xmlns:a16="http://schemas.microsoft.com/office/drawing/2014/main" xmlns="" val="20000"/>
+                      <a16:colId xmlns="" xmlns:a16="http://schemas.microsoft.com/office/drawing/2014/main" val="20000"/>
                     </a:ext>
                   </a:extLst>
                 </a:gridCol>
@@ -14251,7 +14234,7 @@
                 </a:tc>
                 <a:extLst>
                   <a:ext uri="{0D108BD9-81ED-4DB2-BD59-A6C34878D82A}">
-                    <a16:rowId xmlns:a16="http://schemas.microsoft.com/office/drawing/2014/main" xmlns="" val="10000"/>
+                    <a16:rowId xmlns="" xmlns:a16="http://schemas.microsoft.com/office/drawing/2014/main" val="10000"/>
                   </a:ext>
                 </a:extLst>
               </a:tr>
@@ -14272,7 +14255,7 @@
                 </a:tc>
                 <a:extLst>
                   <a:ext uri="{0D108BD9-81ED-4DB2-BD59-A6C34878D82A}">
-                    <a16:rowId xmlns:a16="http://schemas.microsoft.com/office/drawing/2014/main" xmlns="" val="10001"/>
+                    <a16:rowId xmlns="" xmlns:a16="http://schemas.microsoft.com/office/drawing/2014/main" val="10001"/>
                   </a:ext>
                 </a:extLst>
               </a:tr>
@@ -14293,7 +14276,7 @@
                 </a:tc>
                 <a:extLst>
                   <a:ext uri="{0D108BD9-81ED-4DB2-BD59-A6C34878D82A}">
-                    <a16:rowId xmlns:a16="http://schemas.microsoft.com/office/drawing/2014/main" xmlns="" val="10002"/>
+                    <a16:rowId xmlns="" xmlns:a16="http://schemas.microsoft.com/office/drawing/2014/main" val="10002"/>
                   </a:ext>
                 </a:extLst>
               </a:tr>

</xml_diff>

<commit_message>
Nueva version BBDD incluyendo tablas adicionales
Nueva versión BBDD y correcciones al documento de análisis.
</commit_message>
<xml_diff>
--- a/Documentación Soporte/Documento Tablas - Relaciones Borrador.pptx
+++ b/Documentación Soporte/Documento Tablas - Relaciones Borrador.pptx
@@ -110,7 +110,7 @@
   </p:defaultTextStyle>
   <p:extLst>
     <p:ext uri="{EFAFB233-063F-42B5-8137-9DF3F51BA10A}">
-      <p15:sldGuideLst xmlns="" xmlns:p15="http://schemas.microsoft.com/office/powerpoint/2012/main">
+      <p15:sldGuideLst xmlns:p15="http://schemas.microsoft.com/office/powerpoint/2012/main" xmlns="">
         <p15:guide id="1" orient="horz" pos="2160">
           <p15:clr>
             <a:srgbClr val="A4A3A4"/>
@@ -306,7 +306,7 @@
           <a:p>
             <a:fld id="{4BC66413-18F1-4893-88B2-0A18709E0B52}" type="datetimeFigureOut">
               <a:rPr lang="es-ES" smtClean="0"/>
-              <a:t>04/06/2020</a:t>
+              <a:t>05/06/2020</a:t>
             </a:fld>
             <a:endParaRPr lang="es-ES"/>
           </a:p>
@@ -474,7 +474,7 @@
           <a:p>
             <a:fld id="{4BC66413-18F1-4893-88B2-0A18709E0B52}" type="datetimeFigureOut">
               <a:rPr lang="es-ES" smtClean="0"/>
-              <a:t>04/06/2020</a:t>
+              <a:t>05/06/2020</a:t>
             </a:fld>
             <a:endParaRPr lang="es-ES"/>
           </a:p>
@@ -652,7 +652,7 @@
           <a:p>
             <a:fld id="{4BC66413-18F1-4893-88B2-0A18709E0B52}" type="datetimeFigureOut">
               <a:rPr lang="es-ES" smtClean="0"/>
-              <a:t>04/06/2020</a:t>
+              <a:t>05/06/2020</a:t>
             </a:fld>
             <a:endParaRPr lang="es-ES"/>
           </a:p>
@@ -820,7 +820,7 @@
           <a:p>
             <a:fld id="{4BC66413-18F1-4893-88B2-0A18709E0B52}" type="datetimeFigureOut">
               <a:rPr lang="es-ES" smtClean="0"/>
-              <a:t>04/06/2020</a:t>
+              <a:t>05/06/2020</a:t>
             </a:fld>
             <a:endParaRPr lang="es-ES"/>
           </a:p>
@@ -1065,7 +1065,7 @@
           <a:p>
             <a:fld id="{4BC66413-18F1-4893-88B2-0A18709E0B52}" type="datetimeFigureOut">
               <a:rPr lang="es-ES" smtClean="0"/>
-              <a:t>04/06/2020</a:t>
+              <a:t>05/06/2020</a:t>
             </a:fld>
             <a:endParaRPr lang="es-ES"/>
           </a:p>
@@ -1350,7 +1350,7 @@
           <a:p>
             <a:fld id="{4BC66413-18F1-4893-88B2-0A18709E0B52}" type="datetimeFigureOut">
               <a:rPr lang="es-ES" smtClean="0"/>
-              <a:t>04/06/2020</a:t>
+              <a:t>05/06/2020</a:t>
             </a:fld>
             <a:endParaRPr lang="es-ES"/>
           </a:p>
@@ -1769,7 +1769,7 @@
           <a:p>
             <a:fld id="{4BC66413-18F1-4893-88B2-0A18709E0B52}" type="datetimeFigureOut">
               <a:rPr lang="es-ES" smtClean="0"/>
-              <a:t>04/06/2020</a:t>
+              <a:t>05/06/2020</a:t>
             </a:fld>
             <a:endParaRPr lang="es-ES"/>
           </a:p>
@@ -1886,7 +1886,7 @@
           <a:p>
             <a:fld id="{4BC66413-18F1-4893-88B2-0A18709E0B52}" type="datetimeFigureOut">
               <a:rPr lang="es-ES" smtClean="0"/>
-              <a:t>04/06/2020</a:t>
+              <a:t>05/06/2020</a:t>
             </a:fld>
             <a:endParaRPr lang="es-ES"/>
           </a:p>
@@ -1981,7 +1981,7 @@
           <a:p>
             <a:fld id="{4BC66413-18F1-4893-88B2-0A18709E0B52}" type="datetimeFigureOut">
               <a:rPr lang="es-ES" smtClean="0"/>
-              <a:t>04/06/2020</a:t>
+              <a:t>05/06/2020</a:t>
             </a:fld>
             <a:endParaRPr lang="es-ES"/>
           </a:p>
@@ -2256,7 +2256,7 @@
           <a:p>
             <a:fld id="{4BC66413-18F1-4893-88B2-0A18709E0B52}" type="datetimeFigureOut">
               <a:rPr lang="es-ES" smtClean="0"/>
-              <a:t>04/06/2020</a:t>
+              <a:t>05/06/2020</a:t>
             </a:fld>
             <a:endParaRPr lang="es-ES"/>
           </a:p>
@@ -2508,7 +2508,7 @@
           <a:p>
             <a:fld id="{4BC66413-18F1-4893-88B2-0A18709E0B52}" type="datetimeFigureOut">
               <a:rPr lang="es-ES" smtClean="0"/>
-              <a:t>04/06/2020</a:t>
+              <a:t>05/06/2020</a:t>
             </a:fld>
             <a:endParaRPr lang="es-ES"/>
           </a:p>
@@ -2719,7 +2719,7 @@
           <a:p>
             <a:fld id="{4BC66413-18F1-4893-88B2-0A18709E0B52}" type="datetimeFigureOut">
               <a:rPr lang="es-ES" smtClean="0"/>
-              <a:t>04/06/2020</a:t>
+              <a:t>05/06/2020</a:t>
             </a:fld>
             <a:endParaRPr lang="es-ES"/>
           </a:p>
@@ -3122,7 +3122,7 @@
                 <a:gridCol w="1463824">
                   <a:extLst>
                     <a:ext uri="{9D8B030D-6E8A-4147-A177-3AD203B41FA5}">
-                      <a16:colId xmlns="" xmlns:a16="http://schemas.microsoft.com/office/drawing/2014/main" val="20000"/>
+                      <a16:colId xmlns:a16="http://schemas.microsoft.com/office/drawing/2014/main" xmlns="" val="20000"/>
                     </a:ext>
                   </a:extLst>
                 </a:gridCol>
@@ -3144,7 +3144,7 @@
                 </a:tc>
                 <a:extLst>
                   <a:ext uri="{0D108BD9-81ED-4DB2-BD59-A6C34878D82A}">
-                    <a16:rowId xmlns="" xmlns:a16="http://schemas.microsoft.com/office/drawing/2014/main" val="10000"/>
+                    <a16:rowId xmlns:a16="http://schemas.microsoft.com/office/drawing/2014/main" xmlns="" val="10000"/>
                   </a:ext>
                 </a:extLst>
               </a:tr>
@@ -3212,7 +3212,7 @@
                 </a:tc>
                 <a:extLst>
                   <a:ext uri="{0D108BD9-81ED-4DB2-BD59-A6C34878D82A}">
-                    <a16:rowId xmlns="" xmlns:a16="http://schemas.microsoft.com/office/drawing/2014/main" val="10001"/>
+                    <a16:rowId xmlns:a16="http://schemas.microsoft.com/office/drawing/2014/main" xmlns="" val="10001"/>
                   </a:ext>
                 </a:extLst>
               </a:tr>
@@ -3245,7 +3245,7 @@
                 </a:tc>
                 <a:extLst>
                   <a:ext uri="{0D108BD9-81ED-4DB2-BD59-A6C34878D82A}">
-                    <a16:rowId xmlns="" xmlns:a16="http://schemas.microsoft.com/office/drawing/2014/main" val="10002"/>
+                    <a16:rowId xmlns:a16="http://schemas.microsoft.com/office/drawing/2014/main" xmlns="" val="10002"/>
                   </a:ext>
                 </a:extLst>
               </a:tr>
@@ -3281,7 +3281,7 @@
                 <a:gridCol w="1463824">
                   <a:extLst>
                     <a:ext uri="{9D8B030D-6E8A-4147-A177-3AD203B41FA5}">
-                      <a16:colId xmlns="" xmlns:a16="http://schemas.microsoft.com/office/drawing/2014/main" val="20000"/>
+                      <a16:colId xmlns:a16="http://schemas.microsoft.com/office/drawing/2014/main" xmlns="" val="20000"/>
                     </a:ext>
                   </a:extLst>
                 </a:gridCol>
@@ -3303,7 +3303,7 @@
                 </a:tc>
                 <a:extLst>
                   <a:ext uri="{0D108BD9-81ED-4DB2-BD59-A6C34878D82A}">
-                    <a16:rowId xmlns="" xmlns:a16="http://schemas.microsoft.com/office/drawing/2014/main" val="10000"/>
+                    <a16:rowId xmlns:a16="http://schemas.microsoft.com/office/drawing/2014/main" xmlns="" val="10000"/>
                   </a:ext>
                 </a:extLst>
               </a:tr>
@@ -3324,7 +3324,7 @@
                 </a:tc>
                 <a:extLst>
                   <a:ext uri="{0D108BD9-81ED-4DB2-BD59-A6C34878D82A}">
-                    <a16:rowId xmlns="" xmlns:a16="http://schemas.microsoft.com/office/drawing/2014/main" val="10001"/>
+                    <a16:rowId xmlns:a16="http://schemas.microsoft.com/office/drawing/2014/main" xmlns="" val="10001"/>
                   </a:ext>
                 </a:extLst>
               </a:tr>
@@ -3537,7 +3537,7 @@
                 </a:tc>
                 <a:extLst>
                   <a:ext uri="{0D108BD9-81ED-4DB2-BD59-A6C34878D82A}">
-                    <a16:rowId xmlns="" xmlns:a16="http://schemas.microsoft.com/office/drawing/2014/main" val="10002"/>
+                    <a16:rowId xmlns:a16="http://schemas.microsoft.com/office/drawing/2014/main" xmlns="" val="10002"/>
                   </a:ext>
                 </a:extLst>
               </a:tr>
@@ -3573,7 +3573,7 @@
                 <a:gridCol w="1463824">
                   <a:extLst>
                     <a:ext uri="{9D8B030D-6E8A-4147-A177-3AD203B41FA5}">
-                      <a16:colId xmlns="" xmlns:a16="http://schemas.microsoft.com/office/drawing/2014/main" val="20000"/>
+                      <a16:colId xmlns:a16="http://schemas.microsoft.com/office/drawing/2014/main" xmlns="" val="20000"/>
                     </a:ext>
                   </a:extLst>
                 </a:gridCol>
@@ -3595,7 +3595,7 @@
                 </a:tc>
                 <a:extLst>
                   <a:ext uri="{0D108BD9-81ED-4DB2-BD59-A6C34878D82A}">
-                    <a16:rowId xmlns="" xmlns:a16="http://schemas.microsoft.com/office/drawing/2014/main" val="10000"/>
+                    <a16:rowId xmlns:a16="http://schemas.microsoft.com/office/drawing/2014/main" xmlns="" val="10000"/>
                   </a:ext>
                 </a:extLst>
               </a:tr>
@@ -3616,7 +3616,7 @@
                 </a:tc>
                 <a:extLst>
                   <a:ext uri="{0D108BD9-81ED-4DB2-BD59-A6C34878D82A}">
-                    <a16:rowId xmlns="" xmlns:a16="http://schemas.microsoft.com/office/drawing/2014/main" val="10001"/>
+                    <a16:rowId xmlns:a16="http://schemas.microsoft.com/office/drawing/2014/main" xmlns="" val="10001"/>
                   </a:ext>
                 </a:extLst>
               </a:tr>
@@ -3780,7 +3780,7 @@
                 </a:tc>
                 <a:extLst>
                   <a:ext uri="{0D108BD9-81ED-4DB2-BD59-A6C34878D82A}">
-                    <a16:rowId xmlns="" xmlns:a16="http://schemas.microsoft.com/office/drawing/2014/main" val="10002"/>
+                    <a16:rowId xmlns:a16="http://schemas.microsoft.com/office/drawing/2014/main" xmlns="" val="10002"/>
                   </a:ext>
                 </a:extLst>
               </a:tr>
@@ -3816,7 +3816,7 @@
                 <a:gridCol w="1332402">
                   <a:extLst>
                     <a:ext uri="{9D8B030D-6E8A-4147-A177-3AD203B41FA5}">
-                      <a16:colId xmlns="" xmlns:a16="http://schemas.microsoft.com/office/drawing/2014/main" val="20000"/>
+                      <a16:colId xmlns:a16="http://schemas.microsoft.com/office/drawing/2014/main" xmlns="" val="20000"/>
                     </a:ext>
                   </a:extLst>
                 </a:gridCol>
@@ -3837,7 +3837,7 @@
                 </a:tc>
                 <a:extLst>
                   <a:ext uri="{0D108BD9-81ED-4DB2-BD59-A6C34878D82A}">
-                    <a16:rowId xmlns="" xmlns:a16="http://schemas.microsoft.com/office/drawing/2014/main" val="10000"/>
+                    <a16:rowId xmlns:a16="http://schemas.microsoft.com/office/drawing/2014/main" xmlns="" val="10000"/>
                   </a:ext>
                 </a:extLst>
               </a:tr>
@@ -3864,7 +3864,7 @@
                 </a:tc>
                 <a:extLst>
                   <a:ext uri="{0D108BD9-81ED-4DB2-BD59-A6C34878D82A}">
-                    <a16:rowId xmlns="" xmlns:a16="http://schemas.microsoft.com/office/drawing/2014/main" val="10001"/>
+                    <a16:rowId xmlns:a16="http://schemas.microsoft.com/office/drawing/2014/main" xmlns="" val="10001"/>
                   </a:ext>
                 </a:extLst>
               </a:tr>
@@ -3951,7 +3951,7 @@
                 </a:tc>
                 <a:extLst>
                   <a:ext uri="{0D108BD9-81ED-4DB2-BD59-A6C34878D82A}">
-                    <a16:rowId xmlns="" xmlns:a16="http://schemas.microsoft.com/office/drawing/2014/main" val="10002"/>
+                    <a16:rowId xmlns:a16="http://schemas.microsoft.com/office/drawing/2014/main" xmlns="" val="10002"/>
                   </a:ext>
                 </a:extLst>
               </a:tr>
@@ -3987,7 +3987,7 @@
                 <a:gridCol w="1296144">
                   <a:extLst>
                     <a:ext uri="{9D8B030D-6E8A-4147-A177-3AD203B41FA5}">
-                      <a16:colId xmlns="" xmlns:a16="http://schemas.microsoft.com/office/drawing/2014/main" val="20000"/>
+                      <a16:colId xmlns:a16="http://schemas.microsoft.com/office/drawing/2014/main" xmlns="" val="20000"/>
                     </a:ext>
                   </a:extLst>
                 </a:gridCol>
@@ -4013,7 +4013,7 @@
                 </a:tc>
                 <a:extLst>
                   <a:ext uri="{0D108BD9-81ED-4DB2-BD59-A6C34878D82A}">
-                    <a16:rowId xmlns="" xmlns:a16="http://schemas.microsoft.com/office/drawing/2014/main" val="10000"/>
+                    <a16:rowId xmlns:a16="http://schemas.microsoft.com/office/drawing/2014/main" xmlns="" val="10000"/>
                   </a:ext>
                 </a:extLst>
               </a:tr>
@@ -4039,7 +4039,7 @@
                 </a:tc>
                 <a:extLst>
                   <a:ext uri="{0D108BD9-81ED-4DB2-BD59-A6C34878D82A}">
-                    <a16:rowId xmlns="" xmlns:a16="http://schemas.microsoft.com/office/drawing/2014/main" val="10001"/>
+                    <a16:rowId xmlns:a16="http://schemas.microsoft.com/office/drawing/2014/main" xmlns="" val="10001"/>
                   </a:ext>
                 </a:extLst>
               </a:tr>
@@ -4066,7 +4066,7 @@
                 </a:tc>
                 <a:extLst>
                   <a:ext uri="{0D108BD9-81ED-4DB2-BD59-A6C34878D82A}">
-                    <a16:rowId xmlns="" xmlns:a16="http://schemas.microsoft.com/office/drawing/2014/main" val="10002"/>
+                    <a16:rowId xmlns:a16="http://schemas.microsoft.com/office/drawing/2014/main" xmlns="" val="10002"/>
                   </a:ext>
                 </a:extLst>
               </a:tr>
@@ -4102,7 +4102,7 @@
                 <a:gridCol w="1317165">
                   <a:extLst>
                     <a:ext uri="{9D8B030D-6E8A-4147-A177-3AD203B41FA5}">
-                      <a16:colId xmlns="" xmlns:a16="http://schemas.microsoft.com/office/drawing/2014/main" val="20000"/>
+                      <a16:colId xmlns:a16="http://schemas.microsoft.com/office/drawing/2014/main" xmlns="" val="20000"/>
                     </a:ext>
                   </a:extLst>
                 </a:gridCol>
@@ -4124,7 +4124,7 @@
                 </a:tc>
                 <a:extLst>
                   <a:ext uri="{0D108BD9-81ED-4DB2-BD59-A6C34878D82A}">
-                    <a16:rowId xmlns="" xmlns:a16="http://schemas.microsoft.com/office/drawing/2014/main" val="10000"/>
+                    <a16:rowId xmlns:a16="http://schemas.microsoft.com/office/drawing/2014/main" xmlns="" val="10000"/>
                   </a:ext>
                 </a:extLst>
               </a:tr>
@@ -4145,7 +4145,7 @@
                 </a:tc>
                 <a:extLst>
                   <a:ext uri="{0D108BD9-81ED-4DB2-BD59-A6C34878D82A}">
-                    <a16:rowId xmlns="" xmlns:a16="http://schemas.microsoft.com/office/drawing/2014/main" val="10001"/>
+                    <a16:rowId xmlns:a16="http://schemas.microsoft.com/office/drawing/2014/main" xmlns="" val="10001"/>
                   </a:ext>
                 </a:extLst>
               </a:tr>
@@ -4251,7 +4251,7 @@
                 </a:tc>
                 <a:extLst>
                   <a:ext uri="{0D108BD9-81ED-4DB2-BD59-A6C34878D82A}">
-                    <a16:rowId xmlns="" xmlns:a16="http://schemas.microsoft.com/office/drawing/2014/main" val="10002"/>
+                    <a16:rowId xmlns:a16="http://schemas.microsoft.com/office/drawing/2014/main" xmlns="" val="10002"/>
                   </a:ext>
                 </a:extLst>
               </a:tr>
@@ -4287,7 +4287,7 @@
                 <a:gridCol w="1080120">
                   <a:extLst>
                     <a:ext uri="{9D8B030D-6E8A-4147-A177-3AD203B41FA5}">
-                      <a16:colId xmlns="" xmlns:a16="http://schemas.microsoft.com/office/drawing/2014/main" val="20000"/>
+                      <a16:colId xmlns:a16="http://schemas.microsoft.com/office/drawing/2014/main" xmlns="" val="20000"/>
                     </a:ext>
                   </a:extLst>
                 </a:gridCol>
@@ -4309,7 +4309,7 @@
                 </a:tc>
                 <a:extLst>
                   <a:ext uri="{0D108BD9-81ED-4DB2-BD59-A6C34878D82A}">
-                    <a16:rowId xmlns="" xmlns:a16="http://schemas.microsoft.com/office/drawing/2014/main" val="10000"/>
+                    <a16:rowId xmlns:a16="http://schemas.microsoft.com/office/drawing/2014/main" xmlns="" val="10000"/>
                   </a:ext>
                 </a:extLst>
               </a:tr>
@@ -4342,7 +4342,7 @@
                 </a:tc>
                 <a:extLst>
                   <a:ext uri="{0D108BD9-81ED-4DB2-BD59-A6C34878D82A}">
-                    <a16:rowId xmlns="" xmlns:a16="http://schemas.microsoft.com/office/drawing/2014/main" val="10001"/>
+                    <a16:rowId xmlns:a16="http://schemas.microsoft.com/office/drawing/2014/main" xmlns="" val="10001"/>
                   </a:ext>
                 </a:extLst>
               </a:tr>
@@ -4375,7 +4375,7 @@
                 </a:tc>
                 <a:extLst>
                   <a:ext uri="{0D108BD9-81ED-4DB2-BD59-A6C34878D82A}">
-                    <a16:rowId xmlns="" xmlns:a16="http://schemas.microsoft.com/office/drawing/2014/main" val="10002"/>
+                    <a16:rowId xmlns:a16="http://schemas.microsoft.com/office/drawing/2014/main" xmlns="" val="10002"/>
                   </a:ext>
                 </a:extLst>
               </a:tr>
@@ -4392,14 +4392,14 @@
           <p:nvPr>
             <p:extLst>
               <p:ext uri="{D42A27DB-BD31-4B8C-83A1-F6EECF244321}">
-                <p14:modId xmlns:p14="http://schemas.microsoft.com/office/powerpoint/2010/main" val="680192760"/>
+                <p14:modId xmlns:p14="http://schemas.microsoft.com/office/powerpoint/2010/main" val="2340703283"/>
               </p:ext>
             </p:extLst>
           </p:nvPr>
         </p:nvGraphicFramePr>
         <p:xfrm>
           <a:off x="3923928" y="4581128"/>
-          <a:ext cx="1512168" cy="1371600"/>
+          <a:ext cx="1512168" cy="1493520"/>
         </p:xfrm>
         <a:graphic>
           <a:graphicData uri="http://schemas.openxmlformats.org/drawingml/2006/table">
@@ -4411,7 +4411,7 @@
                 <a:gridCol w="1512168">
                   <a:extLst>
                     <a:ext uri="{9D8B030D-6E8A-4147-A177-3AD203B41FA5}">
-                      <a16:colId xmlns="" xmlns:a16="http://schemas.microsoft.com/office/drawing/2014/main" val="20000"/>
+                      <a16:colId xmlns:a16="http://schemas.microsoft.com/office/drawing/2014/main" xmlns="" val="20000"/>
                     </a:ext>
                   </a:extLst>
                 </a:gridCol>
@@ -4433,7 +4433,7 @@
                 </a:tc>
                 <a:extLst>
                   <a:ext uri="{0D108BD9-81ED-4DB2-BD59-A6C34878D82A}">
-                    <a16:rowId xmlns="" xmlns:a16="http://schemas.microsoft.com/office/drawing/2014/main" val="10000"/>
+                    <a16:rowId xmlns:a16="http://schemas.microsoft.com/office/drawing/2014/main" xmlns="" val="10000"/>
                   </a:ext>
                 </a:extLst>
               </a:tr>
@@ -4445,7 +4445,7 @@
                     <a:p>
                       <a:r>
                         <a:rPr lang="es-ES" sz="800" dirty="0" smtClean="0"/>
-                        <a:t>EVENTO</a:t>
+                        <a:t>ID_EVENTO</a:t>
                       </a:r>
                       <a:endParaRPr lang="es-ES" sz="800" dirty="0"/>
                     </a:p>
@@ -4454,7 +4454,7 @@
                 </a:tc>
                 <a:extLst>
                   <a:ext uri="{0D108BD9-81ED-4DB2-BD59-A6C34878D82A}">
-                    <a16:rowId xmlns="" xmlns:a16="http://schemas.microsoft.com/office/drawing/2014/main" val="10001"/>
+                    <a16:rowId xmlns:a16="http://schemas.microsoft.com/office/drawing/2014/main" xmlns="" val="10001"/>
                   </a:ext>
                 </a:extLst>
               </a:tr>
@@ -4512,12 +4512,9 @@
                       </a:pPr>
                       <a:r>
                         <a:rPr lang="es-ES" sz="800" dirty="0" smtClean="0"/>
-                        <a:t>FECHA</a:t>
-                      </a:r>
-                      <a:r>
-                        <a:rPr lang="es-ES" sz="800" baseline="0" dirty="0" smtClean="0"/>
-                        <a:t>_INICIO</a:t>
-                      </a:r>
+                        <a:t>DESCRIPCION</a:t>
+                      </a:r>
+                      <a:endParaRPr lang="es-ES" sz="800" dirty="0" smtClean="0"/>
                     </a:p>
                     <a:p>
                       <a:pPr marL="0" marR="0" indent="0" algn="l" defTabSz="914400" rtl="0" eaLnBrk="1" fontAlgn="auto" latinLnBrk="0" hangingPunct="1">
@@ -4538,8 +4535,12 @@
                         <a:defRPr/>
                       </a:pPr>
                       <a:r>
+                        <a:rPr lang="es-ES" sz="800" dirty="0" smtClean="0"/>
+                        <a:t>FECHA</a:t>
+                      </a:r>
+                      <a:r>
                         <a:rPr lang="es-ES" sz="800" baseline="0" dirty="0" smtClean="0"/>
-                        <a:t>FECHA_ESPERADA_FIN</a:t>
+                        <a:t>_INICIO</a:t>
                       </a:r>
                     </a:p>
                     <a:p>
@@ -4562,6 +4563,29 @@
                       </a:pPr>
                       <a:r>
                         <a:rPr lang="es-ES" sz="800" baseline="0" dirty="0" smtClean="0"/>
+                        <a:t>FECHA_ESPERADA_FIN</a:t>
+                      </a:r>
+                    </a:p>
+                    <a:p>
+                      <a:pPr marL="0" marR="0" indent="0" algn="l" defTabSz="914400" rtl="0" eaLnBrk="1" fontAlgn="auto" latinLnBrk="0" hangingPunct="1">
+                        <a:lnSpc>
+                          <a:spcPct val="100000"/>
+                        </a:lnSpc>
+                        <a:spcBef>
+                          <a:spcPts val="0"/>
+                        </a:spcBef>
+                        <a:spcAft>
+                          <a:spcPts val="0"/>
+                        </a:spcAft>
+                        <a:buClrTx/>
+                        <a:buSzTx/>
+                        <a:buFontTx/>
+                        <a:buNone/>
+                        <a:tabLst/>
+                        <a:defRPr/>
+                      </a:pPr>
+                      <a:r>
+                        <a:rPr lang="es-ES" sz="800" baseline="0" dirty="0" smtClean="0"/>
                         <a:t>ID_TRAMITADOR</a:t>
                       </a:r>
                       <a:endParaRPr lang="es-ES" sz="800" dirty="0" smtClean="0"/>
@@ -4584,7 +4608,7 @@
                 </a:tc>
                 <a:extLst>
                   <a:ext uri="{0D108BD9-81ED-4DB2-BD59-A6C34878D82A}">
-                    <a16:rowId xmlns="" xmlns:a16="http://schemas.microsoft.com/office/drawing/2014/main" val="10002"/>
+                    <a16:rowId xmlns:a16="http://schemas.microsoft.com/office/drawing/2014/main" xmlns="" val="10002"/>
                   </a:ext>
                 </a:extLst>
               </a:tr>
@@ -4620,7 +4644,7 @@
                 <a:gridCol w="1463824">
                   <a:extLst>
                     <a:ext uri="{9D8B030D-6E8A-4147-A177-3AD203B41FA5}">
-                      <a16:colId xmlns="" xmlns:a16="http://schemas.microsoft.com/office/drawing/2014/main" val="20000"/>
+                      <a16:colId xmlns:a16="http://schemas.microsoft.com/office/drawing/2014/main" xmlns="" val="20000"/>
                     </a:ext>
                   </a:extLst>
                 </a:gridCol>
@@ -4642,7 +4666,7 @@
                 </a:tc>
                 <a:extLst>
                   <a:ext uri="{0D108BD9-81ED-4DB2-BD59-A6C34878D82A}">
-                    <a16:rowId xmlns="" xmlns:a16="http://schemas.microsoft.com/office/drawing/2014/main" val="10000"/>
+                    <a16:rowId xmlns:a16="http://schemas.microsoft.com/office/drawing/2014/main" xmlns="" val="10000"/>
                   </a:ext>
                 </a:extLst>
               </a:tr>
@@ -4669,7 +4693,7 @@
                 </a:tc>
                 <a:extLst>
                   <a:ext uri="{0D108BD9-81ED-4DB2-BD59-A6C34878D82A}">
-                    <a16:rowId xmlns="" xmlns:a16="http://schemas.microsoft.com/office/drawing/2014/main" val="10001"/>
+                    <a16:rowId xmlns:a16="http://schemas.microsoft.com/office/drawing/2014/main" xmlns="" val="10001"/>
                   </a:ext>
                 </a:extLst>
               </a:tr>
@@ -4690,7 +4714,7 @@
                 </a:tc>
                 <a:extLst>
                   <a:ext uri="{0D108BD9-81ED-4DB2-BD59-A6C34878D82A}">
-                    <a16:rowId xmlns="" xmlns:a16="http://schemas.microsoft.com/office/drawing/2014/main" val="10002"/>
+                    <a16:rowId xmlns:a16="http://schemas.microsoft.com/office/drawing/2014/main" xmlns="" val="10002"/>
                   </a:ext>
                 </a:extLst>
               </a:tr>
@@ -5033,7 +5057,7 @@
                 <a:gridCol w="1080120">
                   <a:extLst>
                     <a:ext uri="{9D8B030D-6E8A-4147-A177-3AD203B41FA5}">
-                      <a16:colId xmlns="" xmlns:a16="http://schemas.microsoft.com/office/drawing/2014/main" val="20000"/>
+                      <a16:colId xmlns:a16="http://schemas.microsoft.com/office/drawing/2014/main" xmlns="" val="20000"/>
                     </a:ext>
                   </a:extLst>
                 </a:gridCol>
@@ -5055,7 +5079,7 @@
                 </a:tc>
                 <a:extLst>
                   <a:ext uri="{0D108BD9-81ED-4DB2-BD59-A6C34878D82A}">
-                    <a16:rowId xmlns="" xmlns:a16="http://schemas.microsoft.com/office/drawing/2014/main" val="10000"/>
+                    <a16:rowId xmlns:a16="http://schemas.microsoft.com/office/drawing/2014/main" xmlns="" val="10000"/>
                   </a:ext>
                 </a:extLst>
               </a:tr>
@@ -5082,7 +5106,7 @@
                 </a:tc>
                 <a:extLst>
                   <a:ext uri="{0D108BD9-81ED-4DB2-BD59-A6C34878D82A}">
-                    <a16:rowId xmlns="" xmlns:a16="http://schemas.microsoft.com/office/drawing/2014/main" val="10001"/>
+                    <a16:rowId xmlns:a16="http://schemas.microsoft.com/office/drawing/2014/main" xmlns="" val="10001"/>
                   </a:ext>
                 </a:extLst>
               </a:tr>
@@ -5115,7 +5139,7 @@
                 </a:tc>
                 <a:extLst>
                   <a:ext uri="{0D108BD9-81ED-4DB2-BD59-A6C34878D82A}">
-                    <a16:rowId xmlns="" xmlns:a16="http://schemas.microsoft.com/office/drawing/2014/main" val="10002"/>
+                    <a16:rowId xmlns:a16="http://schemas.microsoft.com/office/drawing/2014/main" xmlns="" val="10002"/>
                   </a:ext>
                 </a:extLst>
               </a:tr>
@@ -5191,7 +5215,7 @@
                 <a:gridCol w="1368152">
                   <a:extLst>
                     <a:ext uri="{9D8B030D-6E8A-4147-A177-3AD203B41FA5}">
-                      <a16:colId xmlns="" xmlns:a16="http://schemas.microsoft.com/office/drawing/2014/main" val="20000"/>
+                      <a16:colId xmlns:a16="http://schemas.microsoft.com/office/drawing/2014/main" xmlns="" val="20000"/>
                     </a:ext>
                   </a:extLst>
                 </a:gridCol>
@@ -5213,7 +5237,7 @@
                 </a:tc>
                 <a:extLst>
                   <a:ext uri="{0D108BD9-81ED-4DB2-BD59-A6C34878D82A}">
-                    <a16:rowId xmlns="" xmlns:a16="http://schemas.microsoft.com/office/drawing/2014/main" val="10000"/>
+                    <a16:rowId xmlns:a16="http://schemas.microsoft.com/office/drawing/2014/main" xmlns="" val="10000"/>
                   </a:ext>
                 </a:extLst>
               </a:tr>
@@ -5282,7 +5306,7 @@
                 </a:tc>
                 <a:extLst>
                   <a:ext uri="{0D108BD9-81ED-4DB2-BD59-A6C34878D82A}">
-                    <a16:rowId xmlns="" xmlns:a16="http://schemas.microsoft.com/office/drawing/2014/main" val="10001"/>
+                    <a16:rowId xmlns:a16="http://schemas.microsoft.com/office/drawing/2014/main" xmlns="" val="10001"/>
                   </a:ext>
                 </a:extLst>
               </a:tr>
@@ -5315,7 +5339,7 @@
                 </a:tc>
                 <a:extLst>
                   <a:ext uri="{0D108BD9-81ED-4DB2-BD59-A6C34878D82A}">
-                    <a16:rowId xmlns="" xmlns:a16="http://schemas.microsoft.com/office/drawing/2014/main" val="10002"/>
+                    <a16:rowId xmlns:a16="http://schemas.microsoft.com/office/drawing/2014/main" xmlns="" val="10002"/>
                   </a:ext>
                 </a:extLst>
               </a:tr>
@@ -5368,7 +5392,7 @@
           <p:cNvPr id="20" name="CuadroTexto 19">
             <a:extLst>
               <a:ext uri="{FF2B5EF4-FFF2-40B4-BE49-F238E27FC236}">
-                <a16:creationId xmlns="" xmlns:a16="http://schemas.microsoft.com/office/drawing/2014/main" id="{58ABF96F-D80D-4391-85D2-883FE28F91A0}"/>
+                <a16:creationId xmlns:a16="http://schemas.microsoft.com/office/drawing/2014/main" xmlns="" id="{58ABF96F-D80D-4391-85D2-883FE28F91A0}"/>
               </a:ext>
             </a:extLst>
           </p:cNvPr>
@@ -5403,7 +5427,7 @@
           <p:cNvPr id="39" name="CuadroTexto 38">
             <a:extLst>
               <a:ext uri="{FF2B5EF4-FFF2-40B4-BE49-F238E27FC236}">
-                <a16:creationId xmlns="" xmlns:a16="http://schemas.microsoft.com/office/drawing/2014/main" id="{6B08FE2C-B795-482D-8B2D-91CAB6048C42}"/>
+                <a16:creationId xmlns:a16="http://schemas.microsoft.com/office/drawing/2014/main" xmlns="" id="{6B08FE2C-B795-482D-8B2D-91CAB6048C42}"/>
               </a:ext>
             </a:extLst>
           </p:cNvPr>
@@ -5438,7 +5462,7 @@
           <p:cNvPr id="42" name="CuadroTexto 41">
             <a:extLst>
               <a:ext uri="{FF2B5EF4-FFF2-40B4-BE49-F238E27FC236}">
-                <a16:creationId xmlns="" xmlns:a16="http://schemas.microsoft.com/office/drawing/2014/main" id="{D4BD3DB6-0773-492F-8371-E4DBF04AB502}"/>
+                <a16:creationId xmlns:a16="http://schemas.microsoft.com/office/drawing/2014/main" xmlns="" id="{D4BD3DB6-0773-492F-8371-E4DBF04AB502}"/>
               </a:ext>
             </a:extLst>
           </p:cNvPr>
@@ -5474,7 +5498,7 @@
           <p:cNvPr id="43" name="CuadroTexto 42">
             <a:extLst>
               <a:ext uri="{FF2B5EF4-FFF2-40B4-BE49-F238E27FC236}">
-                <a16:creationId xmlns="" xmlns:a16="http://schemas.microsoft.com/office/drawing/2014/main" id="{319322CE-E44B-4D1D-8E0E-B3B87AE651CB}"/>
+                <a16:creationId xmlns:a16="http://schemas.microsoft.com/office/drawing/2014/main" xmlns="" id="{319322CE-E44B-4D1D-8E0E-B3B87AE651CB}"/>
               </a:ext>
             </a:extLst>
           </p:cNvPr>
@@ -5509,7 +5533,7 @@
           <p:cNvPr id="45" name="CuadroTexto 44">
             <a:extLst>
               <a:ext uri="{FF2B5EF4-FFF2-40B4-BE49-F238E27FC236}">
-                <a16:creationId xmlns="" xmlns:a16="http://schemas.microsoft.com/office/drawing/2014/main" id="{58DDF0F6-557A-42E3-87C5-C25B3173C4ED}"/>
+                <a16:creationId xmlns:a16="http://schemas.microsoft.com/office/drawing/2014/main" xmlns="" id="{58DDF0F6-557A-42E3-87C5-C25B3173C4ED}"/>
               </a:ext>
             </a:extLst>
           </p:cNvPr>
@@ -5544,7 +5568,7 @@
           <p:cNvPr id="46" name="CuadroTexto 45">
             <a:extLst>
               <a:ext uri="{FF2B5EF4-FFF2-40B4-BE49-F238E27FC236}">
-                <a16:creationId xmlns="" xmlns:a16="http://schemas.microsoft.com/office/drawing/2014/main" id="{55F53D7F-2119-4913-AA53-D870B574148E}"/>
+                <a16:creationId xmlns:a16="http://schemas.microsoft.com/office/drawing/2014/main" xmlns="" id="{55F53D7F-2119-4913-AA53-D870B574148E}"/>
               </a:ext>
             </a:extLst>
           </p:cNvPr>
@@ -5579,7 +5603,7 @@
           <p:cNvPr id="52" name="CuadroTexto 51">
             <a:extLst>
               <a:ext uri="{FF2B5EF4-FFF2-40B4-BE49-F238E27FC236}">
-                <a16:creationId xmlns="" xmlns:a16="http://schemas.microsoft.com/office/drawing/2014/main" id="{B6D70908-F77F-48B9-9026-68A9D9B4D50E}"/>
+                <a16:creationId xmlns:a16="http://schemas.microsoft.com/office/drawing/2014/main" xmlns="" id="{B6D70908-F77F-48B9-9026-68A9D9B4D50E}"/>
               </a:ext>
             </a:extLst>
           </p:cNvPr>
@@ -5614,7 +5638,7 @@
           <p:cNvPr id="53" name="CuadroTexto 52">
             <a:extLst>
               <a:ext uri="{FF2B5EF4-FFF2-40B4-BE49-F238E27FC236}">
-                <a16:creationId xmlns="" xmlns:a16="http://schemas.microsoft.com/office/drawing/2014/main" id="{753AD79F-CA2B-4809-8F9C-D46F075A8F66}"/>
+                <a16:creationId xmlns:a16="http://schemas.microsoft.com/office/drawing/2014/main" xmlns="" id="{753AD79F-CA2B-4809-8F9C-D46F075A8F66}"/>
               </a:ext>
             </a:extLst>
           </p:cNvPr>
@@ -5649,7 +5673,7 @@
           <p:cNvPr id="57" name="CuadroTexto 56">
             <a:extLst>
               <a:ext uri="{FF2B5EF4-FFF2-40B4-BE49-F238E27FC236}">
-                <a16:creationId xmlns="" xmlns:a16="http://schemas.microsoft.com/office/drawing/2014/main" id="{D5180711-4B86-4B2F-956C-8DDD8710CE54}"/>
+                <a16:creationId xmlns:a16="http://schemas.microsoft.com/office/drawing/2014/main" xmlns="" id="{D5180711-4B86-4B2F-956C-8DDD8710CE54}"/>
               </a:ext>
             </a:extLst>
           </p:cNvPr>
@@ -5684,7 +5708,7 @@
           <p:cNvPr id="58" name="CuadroTexto 57">
             <a:extLst>
               <a:ext uri="{FF2B5EF4-FFF2-40B4-BE49-F238E27FC236}">
-                <a16:creationId xmlns="" xmlns:a16="http://schemas.microsoft.com/office/drawing/2014/main" id="{D7B2DB04-F793-460A-B7CB-1510DCB68D1D}"/>
+                <a16:creationId xmlns:a16="http://schemas.microsoft.com/office/drawing/2014/main" xmlns="" id="{D7B2DB04-F793-460A-B7CB-1510DCB68D1D}"/>
               </a:ext>
             </a:extLst>
           </p:cNvPr>
@@ -5719,7 +5743,7 @@
           <p:cNvPr id="66" name="18 Tabla">
             <a:extLst>
               <a:ext uri="{FF2B5EF4-FFF2-40B4-BE49-F238E27FC236}">
-                <a16:creationId xmlns="" xmlns:a16="http://schemas.microsoft.com/office/drawing/2014/main" id="{05566C85-30C2-4CE1-8CE7-EDB88250823F}"/>
+                <a16:creationId xmlns:a16="http://schemas.microsoft.com/office/drawing/2014/main" xmlns="" id="{05566C85-30C2-4CE1-8CE7-EDB88250823F}"/>
               </a:ext>
             </a:extLst>
           </p:cNvPr>
@@ -5748,7 +5772,7 @@
                 <a:gridCol w="1920581">
                   <a:extLst>
                     <a:ext uri="{9D8B030D-6E8A-4147-A177-3AD203B41FA5}">
-                      <a16:colId xmlns="" xmlns:a16="http://schemas.microsoft.com/office/drawing/2014/main" val="20000"/>
+                      <a16:colId xmlns:a16="http://schemas.microsoft.com/office/drawing/2014/main" xmlns="" val="20000"/>
                     </a:ext>
                   </a:extLst>
                 </a:gridCol>
@@ -5770,7 +5794,7 @@
                 </a:tc>
                 <a:extLst>
                   <a:ext uri="{0D108BD9-81ED-4DB2-BD59-A6C34878D82A}">
-                    <a16:rowId xmlns="" xmlns:a16="http://schemas.microsoft.com/office/drawing/2014/main" val="10000"/>
+                    <a16:rowId xmlns:a16="http://schemas.microsoft.com/office/drawing/2014/main" xmlns="" val="10000"/>
                   </a:ext>
                 </a:extLst>
               </a:tr>
@@ -5803,7 +5827,7 @@
                 </a:tc>
                 <a:extLst>
                   <a:ext uri="{0D108BD9-81ED-4DB2-BD59-A6C34878D82A}">
-                    <a16:rowId xmlns="" xmlns:a16="http://schemas.microsoft.com/office/drawing/2014/main" val="10001"/>
+                    <a16:rowId xmlns:a16="http://schemas.microsoft.com/office/drawing/2014/main" xmlns="" val="10001"/>
                   </a:ext>
                 </a:extLst>
               </a:tr>
@@ -5824,7 +5848,7 @@
                 </a:tc>
                 <a:extLst>
                   <a:ext uri="{0D108BD9-81ED-4DB2-BD59-A6C34878D82A}">
-                    <a16:rowId xmlns="" xmlns:a16="http://schemas.microsoft.com/office/drawing/2014/main" val="10002"/>
+                    <a16:rowId xmlns:a16="http://schemas.microsoft.com/office/drawing/2014/main" xmlns="" val="10002"/>
                   </a:ext>
                 </a:extLst>
               </a:tr>
@@ -5837,7 +5861,7 @@
           <p:cNvPr id="67" name="23 Conector angular">
             <a:extLst>
               <a:ext uri="{FF2B5EF4-FFF2-40B4-BE49-F238E27FC236}">
-                <a16:creationId xmlns="" xmlns:a16="http://schemas.microsoft.com/office/drawing/2014/main" id="{651FD637-AEF2-4614-B81D-AA28E6099CB3}"/>
+                <a16:creationId xmlns:a16="http://schemas.microsoft.com/office/drawing/2014/main" xmlns="" id="{651FD637-AEF2-4614-B81D-AA28E6099CB3}"/>
               </a:ext>
             </a:extLst>
           </p:cNvPr>
@@ -5880,7 +5904,7 @@
           <p:cNvPr id="68" name="CuadroTexto 67">
             <a:extLst>
               <a:ext uri="{FF2B5EF4-FFF2-40B4-BE49-F238E27FC236}">
-                <a16:creationId xmlns="" xmlns:a16="http://schemas.microsoft.com/office/drawing/2014/main" id="{A558D5E9-768D-44B0-A51D-DF01F25E9C04}"/>
+                <a16:creationId xmlns:a16="http://schemas.microsoft.com/office/drawing/2014/main" xmlns="" id="{A558D5E9-768D-44B0-A51D-DF01F25E9C04}"/>
               </a:ext>
             </a:extLst>
           </p:cNvPr>
@@ -5938,7 +5962,7 @@
                 <a:gridCol w="756085">
                   <a:extLst>
                     <a:ext uri="{9D8B030D-6E8A-4147-A177-3AD203B41FA5}">
-                      <a16:colId xmlns="" xmlns:a16="http://schemas.microsoft.com/office/drawing/2014/main" val="20000"/>
+                      <a16:colId xmlns:a16="http://schemas.microsoft.com/office/drawing/2014/main" xmlns="" val="20000"/>
                     </a:ext>
                   </a:extLst>
                 </a:gridCol>
@@ -5960,7 +5984,7 @@
                 </a:tc>
                 <a:extLst>
                   <a:ext uri="{0D108BD9-81ED-4DB2-BD59-A6C34878D82A}">
-                    <a16:rowId xmlns="" xmlns:a16="http://schemas.microsoft.com/office/drawing/2014/main" val="10000"/>
+                    <a16:rowId xmlns:a16="http://schemas.microsoft.com/office/drawing/2014/main" xmlns="" val="10000"/>
                   </a:ext>
                 </a:extLst>
               </a:tr>
@@ -5981,7 +6005,7 @@
                 </a:tc>
                 <a:extLst>
                   <a:ext uri="{0D108BD9-81ED-4DB2-BD59-A6C34878D82A}">
-                    <a16:rowId xmlns="" xmlns:a16="http://schemas.microsoft.com/office/drawing/2014/main" val="10001"/>
+                    <a16:rowId xmlns:a16="http://schemas.microsoft.com/office/drawing/2014/main" xmlns="" val="10001"/>
                   </a:ext>
                 </a:extLst>
               </a:tr>
@@ -6008,7 +6032,7 @@
                 </a:tc>
                 <a:extLst>
                   <a:ext uri="{0D108BD9-81ED-4DB2-BD59-A6C34878D82A}">
-                    <a16:rowId xmlns="" xmlns:a16="http://schemas.microsoft.com/office/drawing/2014/main" val="10002"/>
+                    <a16:rowId xmlns:a16="http://schemas.microsoft.com/office/drawing/2014/main" xmlns="" val="10002"/>
                   </a:ext>
                 </a:extLst>
               </a:tr>
@@ -6060,7 +6084,7 @@
           <p:cNvPr id="70" name="CuadroTexto 38">
             <a:extLst>
               <a:ext uri="{FF2B5EF4-FFF2-40B4-BE49-F238E27FC236}">
-                <a16:creationId xmlns="" xmlns:a16="http://schemas.microsoft.com/office/drawing/2014/main" id="{6B08FE2C-B795-482D-8B2D-91CAB6048C42}"/>
+                <a16:creationId xmlns:a16="http://schemas.microsoft.com/office/drawing/2014/main" xmlns="" id="{6B08FE2C-B795-482D-8B2D-91CAB6048C42}"/>
               </a:ext>
             </a:extLst>
           </p:cNvPr>
@@ -6148,7 +6172,7 @@
                 <a:gridCol w="1296144">
                   <a:extLst>
                     <a:ext uri="{9D8B030D-6E8A-4147-A177-3AD203B41FA5}">
-                      <a16:colId xmlns="" xmlns:a16="http://schemas.microsoft.com/office/drawing/2014/main" val="20000"/>
+                      <a16:colId xmlns:a16="http://schemas.microsoft.com/office/drawing/2014/main" xmlns="" val="20000"/>
                     </a:ext>
                   </a:extLst>
                 </a:gridCol>
@@ -6170,7 +6194,7 @@
                 </a:tc>
                 <a:extLst>
                   <a:ext uri="{0D108BD9-81ED-4DB2-BD59-A6C34878D82A}">
-                    <a16:rowId xmlns="" xmlns:a16="http://schemas.microsoft.com/office/drawing/2014/main" val="10000"/>
+                    <a16:rowId xmlns:a16="http://schemas.microsoft.com/office/drawing/2014/main" xmlns="" val="10000"/>
                   </a:ext>
                 </a:extLst>
               </a:tr>
@@ -6233,7 +6257,7 @@
                 </a:tc>
                 <a:extLst>
                   <a:ext uri="{0D108BD9-81ED-4DB2-BD59-A6C34878D82A}">
-                    <a16:rowId xmlns="" xmlns:a16="http://schemas.microsoft.com/office/drawing/2014/main" val="10001"/>
+                    <a16:rowId xmlns:a16="http://schemas.microsoft.com/office/drawing/2014/main" xmlns="" val="10001"/>
                   </a:ext>
                 </a:extLst>
               </a:tr>
@@ -6270,7 +6294,7 @@
                 </a:tc>
                 <a:extLst>
                   <a:ext uri="{0D108BD9-81ED-4DB2-BD59-A6C34878D82A}">
-                    <a16:rowId xmlns="" xmlns:a16="http://schemas.microsoft.com/office/drawing/2014/main" val="10002"/>
+                    <a16:rowId xmlns:a16="http://schemas.microsoft.com/office/drawing/2014/main" xmlns="" val="10002"/>
                   </a:ext>
                 </a:extLst>
               </a:tr>
@@ -6322,7 +6346,7 @@
           <p:cNvPr id="61" name="CuadroTexto 67">
             <a:extLst>
               <a:ext uri="{FF2B5EF4-FFF2-40B4-BE49-F238E27FC236}">
-                <a16:creationId xmlns="" xmlns:a16="http://schemas.microsoft.com/office/drawing/2014/main" id="{A558D5E9-768D-44B0-A51D-DF01F25E9C04}"/>
+                <a16:creationId xmlns:a16="http://schemas.microsoft.com/office/drawing/2014/main" xmlns="" id="{A558D5E9-768D-44B0-A51D-DF01F25E9C04}"/>
               </a:ext>
             </a:extLst>
           </p:cNvPr>
@@ -6357,7 +6381,7 @@
           <p:cNvPr id="62" name="CuadroTexto 67">
             <a:extLst>
               <a:ext uri="{FF2B5EF4-FFF2-40B4-BE49-F238E27FC236}">
-                <a16:creationId xmlns="" xmlns:a16="http://schemas.microsoft.com/office/drawing/2014/main" id="{A558D5E9-768D-44B0-A51D-DF01F25E9C04}"/>
+                <a16:creationId xmlns:a16="http://schemas.microsoft.com/office/drawing/2014/main" xmlns="" id="{A558D5E9-768D-44B0-A51D-DF01F25E9C04}"/>
               </a:ext>
             </a:extLst>
           </p:cNvPr>
@@ -6415,7 +6439,7 @@
                 <a:gridCol w="756085">
                   <a:extLst>
                     <a:ext uri="{9D8B030D-6E8A-4147-A177-3AD203B41FA5}">
-                      <a16:colId xmlns="" xmlns:a16="http://schemas.microsoft.com/office/drawing/2014/main" val="20000"/>
+                      <a16:colId xmlns:a16="http://schemas.microsoft.com/office/drawing/2014/main" xmlns="" val="20000"/>
                     </a:ext>
                   </a:extLst>
                 </a:gridCol>
@@ -6437,7 +6461,7 @@
                 </a:tc>
                 <a:extLst>
                   <a:ext uri="{0D108BD9-81ED-4DB2-BD59-A6C34878D82A}">
-                    <a16:rowId xmlns="" xmlns:a16="http://schemas.microsoft.com/office/drawing/2014/main" val="10000"/>
+                    <a16:rowId xmlns:a16="http://schemas.microsoft.com/office/drawing/2014/main" xmlns="" val="10000"/>
                   </a:ext>
                 </a:extLst>
               </a:tr>
@@ -6458,7 +6482,7 @@
                 </a:tc>
                 <a:extLst>
                   <a:ext uri="{0D108BD9-81ED-4DB2-BD59-A6C34878D82A}">
-                    <a16:rowId xmlns="" xmlns:a16="http://schemas.microsoft.com/office/drawing/2014/main" val="10001"/>
+                    <a16:rowId xmlns:a16="http://schemas.microsoft.com/office/drawing/2014/main" xmlns="" val="10001"/>
                   </a:ext>
                 </a:extLst>
               </a:tr>
@@ -6485,7 +6509,7 @@
                 </a:tc>
                 <a:extLst>
                   <a:ext uri="{0D108BD9-81ED-4DB2-BD59-A6C34878D82A}">
-                    <a16:rowId xmlns="" xmlns:a16="http://schemas.microsoft.com/office/drawing/2014/main" val="10002"/>
+                    <a16:rowId xmlns:a16="http://schemas.microsoft.com/office/drawing/2014/main" xmlns="" val="10002"/>
                   </a:ext>
                 </a:extLst>
               </a:tr>
@@ -6537,7 +6561,7 @@
           <p:cNvPr id="63" name="CuadroTexto 38">
             <a:extLst>
               <a:ext uri="{FF2B5EF4-FFF2-40B4-BE49-F238E27FC236}">
-                <a16:creationId xmlns="" xmlns:a16="http://schemas.microsoft.com/office/drawing/2014/main" id="{6B08FE2C-B795-482D-8B2D-91CAB6048C42}"/>
+                <a16:creationId xmlns:a16="http://schemas.microsoft.com/office/drawing/2014/main" xmlns="" id="{6B08FE2C-B795-482D-8B2D-91CAB6048C42}"/>
               </a:ext>
             </a:extLst>
           </p:cNvPr>
@@ -6595,7 +6619,7 @@
                 <a:gridCol w="1317165">
                   <a:extLst>
                     <a:ext uri="{9D8B030D-6E8A-4147-A177-3AD203B41FA5}">
-                      <a16:colId xmlns="" xmlns:a16="http://schemas.microsoft.com/office/drawing/2014/main" val="20000"/>
+                      <a16:colId xmlns:a16="http://schemas.microsoft.com/office/drawing/2014/main" xmlns="" val="20000"/>
                     </a:ext>
                   </a:extLst>
                 </a:gridCol>
@@ -6625,7 +6649,7 @@
                 </a:tc>
                 <a:extLst>
                   <a:ext uri="{0D108BD9-81ED-4DB2-BD59-A6C34878D82A}">
-                    <a16:rowId xmlns="" xmlns:a16="http://schemas.microsoft.com/office/drawing/2014/main" val="10000"/>
+                    <a16:rowId xmlns:a16="http://schemas.microsoft.com/office/drawing/2014/main" xmlns="" val="10000"/>
                   </a:ext>
                 </a:extLst>
               </a:tr>
@@ -6646,7 +6670,7 @@
                 </a:tc>
                 <a:extLst>
                   <a:ext uri="{0D108BD9-81ED-4DB2-BD59-A6C34878D82A}">
-                    <a16:rowId xmlns="" xmlns:a16="http://schemas.microsoft.com/office/drawing/2014/main" val="10001"/>
+                    <a16:rowId xmlns:a16="http://schemas.microsoft.com/office/drawing/2014/main" xmlns="" val="10001"/>
                   </a:ext>
                 </a:extLst>
               </a:tr>
@@ -6679,7 +6703,7 @@
                 </a:tc>
                 <a:extLst>
                   <a:ext uri="{0D108BD9-81ED-4DB2-BD59-A6C34878D82A}">
-                    <a16:rowId xmlns="" xmlns:a16="http://schemas.microsoft.com/office/drawing/2014/main" val="10002"/>
+                    <a16:rowId xmlns:a16="http://schemas.microsoft.com/office/drawing/2014/main" xmlns="" val="10002"/>
                   </a:ext>
                 </a:extLst>
               </a:tr>
@@ -6730,7 +6754,7 @@
           <p:cNvPr id="72" name="CuadroTexto 67">
             <a:extLst>
               <a:ext uri="{FF2B5EF4-FFF2-40B4-BE49-F238E27FC236}">
-                <a16:creationId xmlns="" xmlns:a16="http://schemas.microsoft.com/office/drawing/2014/main" id="{A558D5E9-768D-44B0-A51D-DF01F25E9C04}"/>
+                <a16:creationId xmlns:a16="http://schemas.microsoft.com/office/drawing/2014/main" xmlns="" id="{A558D5E9-768D-44B0-A51D-DF01F25E9C04}"/>
               </a:ext>
             </a:extLst>
           </p:cNvPr>
@@ -6769,14 +6793,14 @@
           <p:nvPr>
             <p:extLst>
               <p:ext uri="{D42A27DB-BD31-4B8C-83A1-F6EECF244321}">
-                <p14:modId xmlns:p14="http://schemas.microsoft.com/office/powerpoint/2010/main" val="3888312338"/>
+                <p14:modId xmlns:p14="http://schemas.microsoft.com/office/powerpoint/2010/main" val="3717548075"/>
               </p:ext>
             </p:extLst>
           </p:nvPr>
         </p:nvGraphicFramePr>
         <p:xfrm>
           <a:off x="8532694" y="5710918"/>
-          <a:ext cx="1688172" cy="1371600"/>
+          <a:ext cx="1688172" cy="1493520"/>
         </p:xfrm>
         <a:graphic>
           <a:graphicData uri="http://schemas.openxmlformats.org/drawingml/2006/table">
@@ -6788,7 +6812,7 @@
                 <a:gridCol w="1688172">
                   <a:extLst>
                     <a:ext uri="{9D8B030D-6E8A-4147-A177-3AD203B41FA5}">
-                      <a16:colId xmlns="" xmlns:a16="http://schemas.microsoft.com/office/drawing/2014/main" val="20000"/>
+                      <a16:colId xmlns:a16="http://schemas.microsoft.com/office/drawing/2014/main" xmlns="" val="20000"/>
                     </a:ext>
                   </a:extLst>
                 </a:gridCol>
@@ -6810,7 +6834,7 @@
                 </a:tc>
                 <a:extLst>
                   <a:ext uri="{0D108BD9-81ED-4DB2-BD59-A6C34878D82A}">
-                    <a16:rowId xmlns="" xmlns:a16="http://schemas.microsoft.com/office/drawing/2014/main" val="10000"/>
+                    <a16:rowId xmlns:a16="http://schemas.microsoft.com/office/drawing/2014/main" xmlns="" val="10000"/>
                   </a:ext>
                 </a:extLst>
               </a:tr>
@@ -6822,7 +6846,7 @@
                     <a:p>
                       <a:r>
                         <a:rPr lang="es-ES" sz="800" dirty="0" smtClean="0"/>
-                        <a:t>EVENTO</a:t>
+                        <a:t>ID_EVENTO</a:t>
                       </a:r>
                       <a:endParaRPr lang="es-ES" sz="800" dirty="0"/>
                     </a:p>
@@ -6831,7 +6855,7 @@
                 </a:tc>
                 <a:extLst>
                   <a:ext uri="{0D108BD9-81ED-4DB2-BD59-A6C34878D82A}">
-                    <a16:rowId xmlns="" xmlns:a16="http://schemas.microsoft.com/office/drawing/2014/main" val="10001"/>
+                    <a16:rowId xmlns:a16="http://schemas.microsoft.com/office/drawing/2014/main" xmlns="" val="10001"/>
                   </a:ext>
                 </a:extLst>
               </a:tr>
@@ -6889,12 +6913,9 @@
                       </a:pPr>
                       <a:r>
                         <a:rPr lang="es-ES" sz="800" dirty="0" smtClean="0"/>
-                        <a:t>FECHA</a:t>
-                      </a:r>
-                      <a:r>
-                        <a:rPr lang="es-ES" sz="800" baseline="0" dirty="0" smtClean="0"/>
-                        <a:t>_INICIO</a:t>
-                      </a:r>
+                        <a:t>DESCRIPCION</a:t>
+                      </a:r>
+                      <a:endParaRPr lang="es-ES" sz="800" dirty="0" smtClean="0"/>
                     </a:p>
                     <a:p>
                       <a:pPr marL="0" marR="0" indent="0" algn="l" defTabSz="914400" rtl="0" eaLnBrk="1" fontAlgn="auto" latinLnBrk="0" hangingPunct="1">
@@ -6915,8 +6936,12 @@
                         <a:defRPr/>
                       </a:pPr>
                       <a:r>
+                        <a:rPr lang="es-ES" sz="800" dirty="0" smtClean="0"/>
+                        <a:t>FECHA</a:t>
+                      </a:r>
+                      <a:r>
                         <a:rPr lang="es-ES" sz="800" baseline="0" dirty="0" smtClean="0"/>
-                        <a:t>FECHA_ESPERADA_FIN</a:t>
+                        <a:t>_INICIO</a:t>
                       </a:r>
                     </a:p>
                     <a:p>
@@ -6939,6 +6964,29 @@
                       </a:pPr>
                       <a:r>
                         <a:rPr lang="es-ES" sz="800" baseline="0" dirty="0" smtClean="0"/>
+                        <a:t>FECHA_ESPERADA_FIN</a:t>
+                      </a:r>
+                    </a:p>
+                    <a:p>
+                      <a:pPr marL="0" marR="0" indent="0" algn="l" defTabSz="914400" rtl="0" eaLnBrk="1" fontAlgn="auto" latinLnBrk="0" hangingPunct="1">
+                        <a:lnSpc>
+                          <a:spcPct val="100000"/>
+                        </a:lnSpc>
+                        <a:spcBef>
+                          <a:spcPts val="0"/>
+                        </a:spcBef>
+                        <a:spcAft>
+                          <a:spcPts val="0"/>
+                        </a:spcAft>
+                        <a:buClrTx/>
+                        <a:buSzTx/>
+                        <a:buFontTx/>
+                        <a:buNone/>
+                        <a:tabLst/>
+                        <a:defRPr/>
+                      </a:pPr>
+                      <a:r>
+                        <a:rPr lang="es-ES" sz="800" baseline="0" dirty="0" smtClean="0"/>
                         <a:t>ID_TRAMITADOR</a:t>
                       </a:r>
                       <a:endParaRPr lang="es-ES" sz="800" dirty="0" smtClean="0"/>
@@ -6960,7 +7008,7 @@
                 </a:tc>
                 <a:extLst>
                   <a:ext uri="{0D108BD9-81ED-4DB2-BD59-A6C34878D82A}">
-                    <a16:rowId xmlns="" xmlns:a16="http://schemas.microsoft.com/office/drawing/2014/main" val="10002"/>
+                    <a16:rowId xmlns:a16="http://schemas.microsoft.com/office/drawing/2014/main" xmlns="" val="10002"/>
                   </a:ext>
                 </a:extLst>
               </a:tr>
@@ -6981,7 +7029,7 @@
         <p:spPr>
           <a:xfrm>
             <a:off x="8121413" y="5471648"/>
-            <a:ext cx="411281" cy="925070"/>
+            <a:ext cx="411281" cy="986030"/>
           </a:xfrm>
           <a:prstGeom prst="bentConnector3">
             <a:avLst>
@@ -7013,7 +7061,7 @@
           <p:cNvPr id="75" name="CuadroTexto 67">
             <a:extLst>
               <a:ext uri="{FF2B5EF4-FFF2-40B4-BE49-F238E27FC236}">
-                <a16:creationId xmlns="" xmlns:a16="http://schemas.microsoft.com/office/drawing/2014/main" id="{A558D5E9-768D-44B0-A51D-DF01F25E9C04}"/>
+                <a16:creationId xmlns:a16="http://schemas.microsoft.com/office/drawing/2014/main" xmlns="" id="{A558D5E9-768D-44B0-A51D-DF01F25E9C04}"/>
               </a:ext>
             </a:extLst>
           </p:cNvPr>
@@ -7052,14 +7100,14 @@
           <p:nvPr>
             <p:extLst>
               <p:ext uri="{D42A27DB-BD31-4B8C-83A1-F6EECF244321}">
-                <p14:modId xmlns:p14="http://schemas.microsoft.com/office/powerpoint/2010/main" val="3086599979"/>
+                <p14:modId xmlns:p14="http://schemas.microsoft.com/office/powerpoint/2010/main" val="2373444688"/>
               </p:ext>
             </p:extLst>
           </p:nvPr>
         </p:nvGraphicFramePr>
         <p:xfrm>
           <a:off x="98591" y="3796212"/>
-          <a:ext cx="1512168" cy="1371600"/>
+          <a:ext cx="1512168" cy="1493520"/>
         </p:xfrm>
         <a:graphic>
           <a:graphicData uri="http://schemas.openxmlformats.org/drawingml/2006/table">
@@ -7071,7 +7119,7 @@
                 <a:gridCol w="1512168">
                   <a:extLst>
                     <a:ext uri="{9D8B030D-6E8A-4147-A177-3AD203B41FA5}">
-                      <a16:colId xmlns="" xmlns:a16="http://schemas.microsoft.com/office/drawing/2014/main" val="20000"/>
+                      <a16:colId xmlns:a16="http://schemas.microsoft.com/office/drawing/2014/main" xmlns="" val="20000"/>
                     </a:ext>
                   </a:extLst>
                 </a:gridCol>
@@ -7093,7 +7141,7 @@
                 </a:tc>
                 <a:extLst>
                   <a:ext uri="{0D108BD9-81ED-4DB2-BD59-A6C34878D82A}">
-                    <a16:rowId xmlns="" xmlns:a16="http://schemas.microsoft.com/office/drawing/2014/main" val="10000"/>
+                    <a16:rowId xmlns:a16="http://schemas.microsoft.com/office/drawing/2014/main" xmlns="" val="10000"/>
                   </a:ext>
                 </a:extLst>
               </a:tr>
@@ -7105,7 +7153,7 @@
                     <a:p>
                       <a:r>
                         <a:rPr lang="es-ES" sz="800" dirty="0" smtClean="0"/>
-                        <a:t>EVENTO</a:t>
+                        <a:t>ID_EVENTO</a:t>
                       </a:r>
                       <a:endParaRPr lang="es-ES" sz="800" dirty="0"/>
                     </a:p>
@@ -7114,7 +7162,7 @@
                 </a:tc>
                 <a:extLst>
                   <a:ext uri="{0D108BD9-81ED-4DB2-BD59-A6C34878D82A}">
-                    <a16:rowId xmlns="" xmlns:a16="http://schemas.microsoft.com/office/drawing/2014/main" val="10001"/>
+                    <a16:rowId xmlns:a16="http://schemas.microsoft.com/office/drawing/2014/main" xmlns="" val="10001"/>
                   </a:ext>
                 </a:extLst>
               </a:tr>
@@ -7172,11 +7220,7 @@
                       </a:pPr>
                       <a:r>
                         <a:rPr lang="es-ES" sz="800" dirty="0" smtClean="0"/>
-                        <a:t>FECHA</a:t>
-                      </a:r>
-                      <a:r>
-                        <a:rPr lang="es-ES" sz="800" baseline="0" dirty="0" smtClean="0"/>
-                        <a:t>_INICIO</a:t>
+                        <a:t>DESCRIPCION</a:t>
                       </a:r>
                     </a:p>
                     <a:p>
@@ -7198,9 +7242,14 @@
                         <a:defRPr/>
                       </a:pPr>
                       <a:r>
+                        <a:rPr lang="es-ES" sz="800" dirty="0" smtClean="0"/>
+                        <a:t>FECHA</a:t>
+                      </a:r>
+                      <a:r>
                         <a:rPr lang="es-ES" sz="800" baseline="0" dirty="0" smtClean="0"/>
-                        <a:t>FECHA_ESPERADA_FIN</a:t>
-                      </a:r>
+                        <a:t>_INICIO</a:t>
+                      </a:r>
+                      <a:endParaRPr lang="es-ES" sz="800" baseline="0" dirty="0" smtClean="0"/>
                     </a:p>
                     <a:p>
                       <a:pPr marL="0" marR="0" indent="0" algn="l" defTabSz="914400" rtl="0" eaLnBrk="1" fontAlgn="auto" latinLnBrk="0" hangingPunct="1">
@@ -7222,6 +7271,29 @@
                       </a:pPr>
                       <a:r>
                         <a:rPr lang="es-ES" sz="800" baseline="0" dirty="0" smtClean="0"/>
+                        <a:t>FECHA_ESPERADA_FIN</a:t>
+                      </a:r>
+                    </a:p>
+                    <a:p>
+                      <a:pPr marL="0" marR="0" indent="0" algn="l" defTabSz="914400" rtl="0" eaLnBrk="1" fontAlgn="auto" latinLnBrk="0" hangingPunct="1">
+                        <a:lnSpc>
+                          <a:spcPct val="100000"/>
+                        </a:lnSpc>
+                        <a:spcBef>
+                          <a:spcPts val="0"/>
+                        </a:spcBef>
+                        <a:spcAft>
+                          <a:spcPts val="0"/>
+                        </a:spcAft>
+                        <a:buClrTx/>
+                        <a:buSzTx/>
+                        <a:buFontTx/>
+                        <a:buNone/>
+                        <a:tabLst/>
+                        <a:defRPr/>
+                      </a:pPr>
+                      <a:r>
+                        <a:rPr lang="es-ES" sz="800" baseline="0" dirty="0" smtClean="0"/>
                         <a:t>ID_TRAMITADOR</a:t>
                       </a:r>
                       <a:endParaRPr lang="es-ES" sz="800" dirty="0" smtClean="0"/>
@@ -7244,7 +7316,7 @@
                 </a:tc>
                 <a:extLst>
                   <a:ext uri="{0D108BD9-81ED-4DB2-BD59-A6C34878D82A}">
-                    <a16:rowId xmlns="" xmlns:a16="http://schemas.microsoft.com/office/drawing/2014/main" val="10002"/>
+                    <a16:rowId xmlns:a16="http://schemas.microsoft.com/office/drawing/2014/main" xmlns="" val="10002"/>
                   </a:ext>
                 </a:extLst>
               </a:tr>
@@ -7264,7 +7336,7 @@
         <p:spPr>
           <a:xfrm flipV="1">
             <a:off x="1610759" y="3497198"/>
-            <a:ext cx="1304803" cy="984814"/>
+            <a:ext cx="1304803" cy="1045774"/>
           </a:xfrm>
           <a:prstGeom prst="bentConnector2">
             <a:avLst/>
@@ -7294,7 +7366,7 @@
           <p:cNvPr id="78" name="CuadroTexto 38">
             <a:extLst>
               <a:ext uri="{FF2B5EF4-FFF2-40B4-BE49-F238E27FC236}">
-                <a16:creationId xmlns="" xmlns:a16="http://schemas.microsoft.com/office/drawing/2014/main" id="{6B08FE2C-B795-482D-8B2D-91CAB6048C42}"/>
+                <a16:creationId xmlns:a16="http://schemas.microsoft.com/office/drawing/2014/main" xmlns="" id="{6B08FE2C-B795-482D-8B2D-91CAB6048C42}"/>
               </a:ext>
             </a:extLst>
           </p:cNvPr>
@@ -7382,7 +7454,7 @@
                 <a:gridCol w="1446076">
                   <a:extLst>
                     <a:ext uri="{9D8B030D-6E8A-4147-A177-3AD203B41FA5}">
-                      <a16:colId xmlns="" xmlns:a16="http://schemas.microsoft.com/office/drawing/2014/main" val="20000"/>
+                      <a16:colId xmlns:a16="http://schemas.microsoft.com/office/drawing/2014/main" xmlns="" val="20000"/>
                     </a:ext>
                   </a:extLst>
                 </a:gridCol>
@@ -7408,7 +7480,7 @@
                 </a:tc>
                 <a:extLst>
                   <a:ext uri="{0D108BD9-81ED-4DB2-BD59-A6C34878D82A}">
-                    <a16:rowId xmlns="" xmlns:a16="http://schemas.microsoft.com/office/drawing/2014/main" val="10000"/>
+                    <a16:rowId xmlns:a16="http://schemas.microsoft.com/office/drawing/2014/main" xmlns="" val="10000"/>
                   </a:ext>
                 </a:extLst>
               </a:tr>
@@ -7429,7 +7501,7 @@
                 </a:tc>
                 <a:extLst>
                   <a:ext uri="{0D108BD9-81ED-4DB2-BD59-A6C34878D82A}">
-                    <a16:rowId xmlns="" xmlns:a16="http://schemas.microsoft.com/office/drawing/2014/main" val="10001"/>
+                    <a16:rowId xmlns:a16="http://schemas.microsoft.com/office/drawing/2014/main" xmlns="" val="10001"/>
                   </a:ext>
                 </a:extLst>
               </a:tr>
@@ -7510,7 +7582,7 @@
                 </a:tc>
                 <a:extLst>
                   <a:ext uri="{0D108BD9-81ED-4DB2-BD59-A6C34878D82A}">
-                    <a16:rowId xmlns="" xmlns:a16="http://schemas.microsoft.com/office/drawing/2014/main" val="10002"/>
+                    <a16:rowId xmlns:a16="http://schemas.microsoft.com/office/drawing/2014/main" xmlns="" val="10002"/>
                   </a:ext>
                 </a:extLst>
               </a:tr>
@@ -7546,7 +7618,7 @@
                 <a:gridCol w="1620780">
                   <a:extLst>
                     <a:ext uri="{9D8B030D-6E8A-4147-A177-3AD203B41FA5}">
-                      <a16:colId xmlns="" xmlns:a16="http://schemas.microsoft.com/office/drawing/2014/main" val="20000"/>
+                      <a16:colId xmlns:a16="http://schemas.microsoft.com/office/drawing/2014/main" xmlns="" val="20000"/>
                     </a:ext>
                   </a:extLst>
                 </a:gridCol>
@@ -7567,7 +7639,7 @@
                 </a:tc>
                 <a:extLst>
                   <a:ext uri="{0D108BD9-81ED-4DB2-BD59-A6C34878D82A}">
-                    <a16:rowId xmlns="" xmlns:a16="http://schemas.microsoft.com/office/drawing/2014/main" val="10000"/>
+                    <a16:rowId xmlns:a16="http://schemas.microsoft.com/office/drawing/2014/main" xmlns="" val="10000"/>
                   </a:ext>
                 </a:extLst>
               </a:tr>
@@ -7588,7 +7660,7 @@
                 </a:tc>
                 <a:extLst>
                   <a:ext uri="{0D108BD9-81ED-4DB2-BD59-A6C34878D82A}">
-                    <a16:rowId xmlns="" xmlns:a16="http://schemas.microsoft.com/office/drawing/2014/main" val="10001"/>
+                    <a16:rowId xmlns:a16="http://schemas.microsoft.com/office/drawing/2014/main" xmlns="" val="10001"/>
                   </a:ext>
                 </a:extLst>
               </a:tr>
@@ -7737,7 +7809,7 @@
                 </a:tc>
                 <a:extLst>
                   <a:ext uri="{0D108BD9-81ED-4DB2-BD59-A6C34878D82A}">
-                    <a16:rowId xmlns="" xmlns:a16="http://schemas.microsoft.com/office/drawing/2014/main" val="10002"/>
+                    <a16:rowId xmlns:a16="http://schemas.microsoft.com/office/drawing/2014/main" xmlns="" val="10002"/>
                   </a:ext>
                 </a:extLst>
               </a:tr>
@@ -7773,7 +7845,7 @@
                 <a:gridCol w="1528262">
                   <a:extLst>
                     <a:ext uri="{9D8B030D-6E8A-4147-A177-3AD203B41FA5}">
-                      <a16:colId xmlns="" xmlns:a16="http://schemas.microsoft.com/office/drawing/2014/main" val="20000"/>
+                      <a16:colId xmlns:a16="http://schemas.microsoft.com/office/drawing/2014/main" xmlns="" val="20000"/>
                     </a:ext>
                   </a:extLst>
                 </a:gridCol>
@@ -7795,7 +7867,7 @@
                 </a:tc>
                 <a:extLst>
                   <a:ext uri="{0D108BD9-81ED-4DB2-BD59-A6C34878D82A}">
-                    <a16:rowId xmlns="" xmlns:a16="http://schemas.microsoft.com/office/drawing/2014/main" val="10000"/>
+                    <a16:rowId xmlns:a16="http://schemas.microsoft.com/office/drawing/2014/main" xmlns="" val="10000"/>
                   </a:ext>
                 </a:extLst>
               </a:tr>
@@ -7816,7 +7888,7 @@
                 </a:tc>
                 <a:extLst>
                   <a:ext uri="{0D108BD9-81ED-4DB2-BD59-A6C34878D82A}">
-                    <a16:rowId xmlns="" xmlns:a16="http://schemas.microsoft.com/office/drawing/2014/main" val="10001"/>
+                    <a16:rowId xmlns:a16="http://schemas.microsoft.com/office/drawing/2014/main" xmlns="" val="10001"/>
                   </a:ext>
                 </a:extLst>
               </a:tr>
@@ -7909,7 +7981,7 @@
                 </a:tc>
                 <a:extLst>
                   <a:ext uri="{0D108BD9-81ED-4DB2-BD59-A6C34878D82A}">
-                    <a16:rowId xmlns="" xmlns:a16="http://schemas.microsoft.com/office/drawing/2014/main" val="10002"/>
+                    <a16:rowId xmlns:a16="http://schemas.microsoft.com/office/drawing/2014/main" xmlns="" val="10002"/>
                   </a:ext>
                 </a:extLst>
               </a:tr>
@@ -8041,7 +8113,7 @@
           <p:cNvPr id="59" name="CuadroTexto 59">
             <a:extLst>
               <a:ext uri="{FF2B5EF4-FFF2-40B4-BE49-F238E27FC236}">
-                <a16:creationId xmlns="" xmlns:a16="http://schemas.microsoft.com/office/drawing/2014/main" id="{E3E4B657-CF4C-4A80-9E44-4A0317C54F9E}"/>
+                <a16:creationId xmlns:a16="http://schemas.microsoft.com/office/drawing/2014/main" xmlns="" id="{E3E4B657-CF4C-4A80-9E44-4A0317C54F9E}"/>
               </a:ext>
             </a:extLst>
           </p:cNvPr>
@@ -8077,7 +8149,7 @@
           <p:cNvPr id="61" name="CuadroTexto 59">
             <a:extLst>
               <a:ext uri="{FF2B5EF4-FFF2-40B4-BE49-F238E27FC236}">
-                <a16:creationId xmlns="" xmlns:a16="http://schemas.microsoft.com/office/drawing/2014/main" id="{E3E4B657-CF4C-4A80-9E44-4A0317C54F9E}"/>
+                <a16:creationId xmlns:a16="http://schemas.microsoft.com/office/drawing/2014/main" xmlns="" id="{E3E4B657-CF4C-4A80-9E44-4A0317C54F9E}"/>
               </a:ext>
             </a:extLst>
           </p:cNvPr>
@@ -8112,7 +8184,7 @@
           <p:cNvPr id="62" name="CuadroTexto 59">
             <a:extLst>
               <a:ext uri="{FF2B5EF4-FFF2-40B4-BE49-F238E27FC236}">
-                <a16:creationId xmlns="" xmlns:a16="http://schemas.microsoft.com/office/drawing/2014/main" id="{E3E4B657-CF4C-4A80-9E44-4A0317C54F9E}"/>
+                <a16:creationId xmlns:a16="http://schemas.microsoft.com/office/drawing/2014/main" xmlns="" id="{E3E4B657-CF4C-4A80-9E44-4A0317C54F9E}"/>
               </a:ext>
             </a:extLst>
           </p:cNvPr>
@@ -8170,7 +8242,7 @@
                 <a:gridCol w="1512168">
                   <a:extLst>
                     <a:ext uri="{9D8B030D-6E8A-4147-A177-3AD203B41FA5}">
-                      <a16:colId xmlns="" xmlns:a16="http://schemas.microsoft.com/office/drawing/2014/main" val="20000"/>
+                      <a16:colId xmlns:a16="http://schemas.microsoft.com/office/drawing/2014/main" xmlns="" val="20000"/>
                     </a:ext>
                   </a:extLst>
                 </a:gridCol>
@@ -8192,7 +8264,7 @@
                 </a:tc>
                 <a:extLst>
                   <a:ext uri="{0D108BD9-81ED-4DB2-BD59-A6C34878D82A}">
-                    <a16:rowId xmlns="" xmlns:a16="http://schemas.microsoft.com/office/drawing/2014/main" val="10000"/>
+                    <a16:rowId xmlns:a16="http://schemas.microsoft.com/office/drawing/2014/main" xmlns="" val="10000"/>
                   </a:ext>
                 </a:extLst>
               </a:tr>
@@ -8219,7 +8291,7 @@
                 </a:tc>
                 <a:extLst>
                   <a:ext uri="{0D108BD9-81ED-4DB2-BD59-A6C34878D82A}">
-                    <a16:rowId xmlns="" xmlns:a16="http://schemas.microsoft.com/office/drawing/2014/main" val="10001"/>
+                    <a16:rowId xmlns:a16="http://schemas.microsoft.com/office/drawing/2014/main" xmlns="" val="10001"/>
                   </a:ext>
                 </a:extLst>
               </a:tr>
@@ -8252,7 +8324,7 @@
                 </a:tc>
                 <a:extLst>
                   <a:ext uri="{0D108BD9-81ED-4DB2-BD59-A6C34878D82A}">
-                    <a16:rowId xmlns="" xmlns:a16="http://schemas.microsoft.com/office/drawing/2014/main" val="10002"/>
+                    <a16:rowId xmlns:a16="http://schemas.microsoft.com/office/drawing/2014/main" xmlns="" val="10002"/>
                   </a:ext>
                 </a:extLst>
               </a:tr>
@@ -8304,7 +8376,7 @@
           <p:cNvPr id="65" name="CuadroTexto 59">
             <a:extLst>
               <a:ext uri="{FF2B5EF4-FFF2-40B4-BE49-F238E27FC236}">
-                <a16:creationId xmlns="" xmlns:a16="http://schemas.microsoft.com/office/drawing/2014/main" id="{E3E4B657-CF4C-4A80-9E44-4A0317C54F9E}"/>
+                <a16:creationId xmlns:a16="http://schemas.microsoft.com/office/drawing/2014/main" xmlns="" id="{E3E4B657-CF4C-4A80-9E44-4A0317C54F9E}"/>
               </a:ext>
             </a:extLst>
           </p:cNvPr>
@@ -8343,7 +8415,7 @@
           <p:nvPr>
             <p:extLst>
               <p:ext uri="{D42A27DB-BD31-4B8C-83A1-F6EECF244321}">
-                <p14:modId xmlns:p14="http://schemas.microsoft.com/office/powerpoint/2010/main" val="2622469881"/>
+                <p14:modId xmlns:p14="http://schemas.microsoft.com/office/powerpoint/2010/main" val="1156262724"/>
               </p:ext>
             </p:extLst>
           </p:nvPr>
@@ -8362,7 +8434,7 @@
                 <a:gridCol w="1404155">
                   <a:extLst>
                     <a:ext uri="{9D8B030D-6E8A-4147-A177-3AD203B41FA5}">
-                      <a16:colId xmlns="" xmlns:a16="http://schemas.microsoft.com/office/drawing/2014/main" val="20000"/>
+                      <a16:colId xmlns:a16="http://schemas.microsoft.com/office/drawing/2014/main" xmlns="" val="20000"/>
                     </a:ext>
                   </a:extLst>
                 </a:gridCol>
@@ -8388,7 +8460,7 @@
                 </a:tc>
                 <a:extLst>
                   <a:ext uri="{0D108BD9-81ED-4DB2-BD59-A6C34878D82A}">
-                    <a16:rowId xmlns="" xmlns:a16="http://schemas.microsoft.com/office/drawing/2014/main" val="10000"/>
+                    <a16:rowId xmlns:a16="http://schemas.microsoft.com/office/drawing/2014/main" xmlns="" val="10000"/>
                   </a:ext>
                 </a:extLst>
               </a:tr>
@@ -8409,7 +8481,7 @@
                 </a:tc>
                 <a:extLst>
                   <a:ext uri="{0D108BD9-81ED-4DB2-BD59-A6C34878D82A}">
-                    <a16:rowId xmlns="" xmlns:a16="http://schemas.microsoft.com/office/drawing/2014/main" val="10001"/>
+                    <a16:rowId xmlns:a16="http://schemas.microsoft.com/office/drawing/2014/main" xmlns="" val="10001"/>
                   </a:ext>
                 </a:extLst>
               </a:tr>
@@ -8481,7 +8553,7 @@
                     <a:p>
                       <a:r>
                         <a:rPr lang="es-ES" sz="800" dirty="0" smtClean="0"/>
-                        <a:t>DOCUMENTO</a:t>
+                        <a:t>DOCUMENTACION</a:t>
                       </a:r>
                       <a:endParaRPr lang="es-ES" sz="800" dirty="0"/>
                     </a:p>
@@ -8490,7 +8562,7 @@
                 </a:tc>
                 <a:extLst>
                   <a:ext uri="{0D108BD9-81ED-4DB2-BD59-A6C34878D82A}">
-                    <a16:rowId xmlns="" xmlns:a16="http://schemas.microsoft.com/office/drawing/2014/main" val="10002"/>
+                    <a16:rowId xmlns:a16="http://schemas.microsoft.com/office/drawing/2014/main" xmlns="" val="10002"/>
                   </a:ext>
                 </a:extLst>
               </a:tr>
@@ -8526,7 +8598,7 @@
                 <a:gridCol w="1547919">
                   <a:extLst>
                     <a:ext uri="{9D8B030D-6E8A-4147-A177-3AD203B41FA5}">
-                      <a16:colId xmlns="" xmlns:a16="http://schemas.microsoft.com/office/drawing/2014/main" val="20000"/>
+                      <a16:colId xmlns:a16="http://schemas.microsoft.com/office/drawing/2014/main" xmlns="" val="20000"/>
                     </a:ext>
                   </a:extLst>
                 </a:gridCol>
@@ -8548,7 +8620,7 @@
                 </a:tc>
                 <a:extLst>
                   <a:ext uri="{0D108BD9-81ED-4DB2-BD59-A6C34878D82A}">
-                    <a16:rowId xmlns="" xmlns:a16="http://schemas.microsoft.com/office/drawing/2014/main" val="10000"/>
+                    <a16:rowId xmlns:a16="http://schemas.microsoft.com/office/drawing/2014/main" xmlns="" val="10000"/>
                   </a:ext>
                 </a:extLst>
               </a:tr>
@@ -8569,7 +8641,7 @@
                 </a:tc>
                 <a:extLst>
                   <a:ext uri="{0D108BD9-81ED-4DB2-BD59-A6C34878D82A}">
-                    <a16:rowId xmlns="" xmlns:a16="http://schemas.microsoft.com/office/drawing/2014/main" val="10001"/>
+                    <a16:rowId xmlns:a16="http://schemas.microsoft.com/office/drawing/2014/main" xmlns="" val="10001"/>
                   </a:ext>
                 </a:extLst>
               </a:tr>
@@ -8626,7 +8698,7 @@
                 </a:tc>
                 <a:extLst>
                   <a:ext uri="{0D108BD9-81ED-4DB2-BD59-A6C34878D82A}">
-                    <a16:rowId xmlns="" xmlns:a16="http://schemas.microsoft.com/office/drawing/2014/main" val="10002"/>
+                    <a16:rowId xmlns:a16="http://schemas.microsoft.com/office/drawing/2014/main" xmlns="" val="10002"/>
                   </a:ext>
                 </a:extLst>
               </a:tr>
@@ -8679,7 +8751,7 @@
           <p:cNvPr id="71" name="CuadroTexto 59">
             <a:extLst>
               <a:ext uri="{FF2B5EF4-FFF2-40B4-BE49-F238E27FC236}">
-                <a16:creationId xmlns="" xmlns:a16="http://schemas.microsoft.com/office/drawing/2014/main" id="{E3E4B657-CF4C-4A80-9E44-4A0317C54F9E}"/>
+                <a16:creationId xmlns:a16="http://schemas.microsoft.com/office/drawing/2014/main" xmlns="" id="{E3E4B657-CF4C-4A80-9E44-4A0317C54F9E}"/>
               </a:ext>
             </a:extLst>
           </p:cNvPr>
@@ -8753,7 +8825,7 @@
           <p:cNvPr id="73" name="CuadroTexto 59">
             <a:extLst>
               <a:ext uri="{FF2B5EF4-FFF2-40B4-BE49-F238E27FC236}">
-                <a16:creationId xmlns="" xmlns:a16="http://schemas.microsoft.com/office/drawing/2014/main" id="{E3E4B657-CF4C-4A80-9E44-4A0317C54F9E}"/>
+                <a16:creationId xmlns:a16="http://schemas.microsoft.com/office/drawing/2014/main" xmlns="" id="{E3E4B657-CF4C-4A80-9E44-4A0317C54F9E}"/>
               </a:ext>
             </a:extLst>
           </p:cNvPr>
@@ -8876,7 +8948,7 @@
                 <a:gridCol w="1080120">
                   <a:extLst>
                     <a:ext uri="{9D8B030D-6E8A-4147-A177-3AD203B41FA5}">
-                      <a16:colId xmlns="" xmlns:a16="http://schemas.microsoft.com/office/drawing/2014/main" val="20000"/>
+                      <a16:colId xmlns:a16="http://schemas.microsoft.com/office/drawing/2014/main" xmlns="" val="20000"/>
                     </a:ext>
                   </a:extLst>
                 </a:gridCol>
@@ -8898,7 +8970,7 @@
                 </a:tc>
                 <a:extLst>
                   <a:ext uri="{0D108BD9-81ED-4DB2-BD59-A6C34878D82A}">
-                    <a16:rowId xmlns="" xmlns:a16="http://schemas.microsoft.com/office/drawing/2014/main" val="10000"/>
+                    <a16:rowId xmlns:a16="http://schemas.microsoft.com/office/drawing/2014/main" xmlns="" val="10000"/>
                   </a:ext>
                 </a:extLst>
               </a:tr>
@@ -8960,7 +9032,7 @@
                 </a:tc>
                 <a:extLst>
                   <a:ext uri="{0D108BD9-81ED-4DB2-BD59-A6C34878D82A}">
-                    <a16:rowId xmlns="" xmlns:a16="http://schemas.microsoft.com/office/drawing/2014/main" val="10001"/>
+                    <a16:rowId xmlns:a16="http://schemas.microsoft.com/office/drawing/2014/main" xmlns="" val="10001"/>
                   </a:ext>
                 </a:extLst>
               </a:tr>
@@ -8993,7 +9065,7 @@
                 </a:tc>
                 <a:extLst>
                   <a:ext uri="{0D108BD9-81ED-4DB2-BD59-A6C34878D82A}">
-                    <a16:rowId xmlns="" xmlns:a16="http://schemas.microsoft.com/office/drawing/2014/main" val="10002"/>
+                    <a16:rowId xmlns:a16="http://schemas.microsoft.com/office/drawing/2014/main" xmlns="" val="10002"/>
                   </a:ext>
                 </a:extLst>
               </a:tr>
@@ -9060,7 +9132,7 @@
                 <a:gridCol w="1463824">
                   <a:extLst>
                     <a:ext uri="{9D8B030D-6E8A-4147-A177-3AD203B41FA5}">
-                      <a16:colId xmlns="" xmlns:a16="http://schemas.microsoft.com/office/drawing/2014/main" val="20000"/>
+                      <a16:colId xmlns:a16="http://schemas.microsoft.com/office/drawing/2014/main" xmlns="" val="20000"/>
                     </a:ext>
                   </a:extLst>
                 </a:gridCol>
@@ -9082,7 +9154,7 @@
                 </a:tc>
                 <a:extLst>
                   <a:ext uri="{0D108BD9-81ED-4DB2-BD59-A6C34878D82A}">
-                    <a16:rowId xmlns="" xmlns:a16="http://schemas.microsoft.com/office/drawing/2014/main" val="10000"/>
+                    <a16:rowId xmlns:a16="http://schemas.microsoft.com/office/drawing/2014/main" xmlns="" val="10000"/>
                   </a:ext>
                 </a:extLst>
               </a:tr>
@@ -9103,7 +9175,7 @@
                 </a:tc>
                 <a:extLst>
                   <a:ext uri="{0D108BD9-81ED-4DB2-BD59-A6C34878D82A}">
-                    <a16:rowId xmlns="" xmlns:a16="http://schemas.microsoft.com/office/drawing/2014/main" val="10001"/>
+                    <a16:rowId xmlns:a16="http://schemas.microsoft.com/office/drawing/2014/main" xmlns="" val="10001"/>
                   </a:ext>
                 </a:extLst>
               </a:tr>
@@ -9160,7 +9232,7 @@
                 </a:tc>
                 <a:extLst>
                   <a:ext uri="{0D108BD9-81ED-4DB2-BD59-A6C34878D82A}">
-                    <a16:rowId xmlns="" xmlns:a16="http://schemas.microsoft.com/office/drawing/2014/main" val="10002"/>
+                    <a16:rowId xmlns:a16="http://schemas.microsoft.com/office/drawing/2014/main" xmlns="" val="10002"/>
                   </a:ext>
                 </a:extLst>
               </a:tr>
@@ -9177,7 +9249,7 @@
           <p:nvPr>
             <p:extLst>
               <p:ext uri="{D42A27DB-BD31-4B8C-83A1-F6EECF244321}">
-                <p14:modId xmlns:p14="http://schemas.microsoft.com/office/powerpoint/2010/main" val="3840765184"/>
+                <p14:modId xmlns:p14="http://schemas.microsoft.com/office/powerpoint/2010/main" val="3184558151"/>
               </p:ext>
             </p:extLst>
           </p:nvPr>
@@ -9196,7 +9268,7 @@
                 <a:gridCol w="1440160">
                   <a:extLst>
                     <a:ext uri="{9D8B030D-6E8A-4147-A177-3AD203B41FA5}">
-                      <a16:colId xmlns="" xmlns:a16="http://schemas.microsoft.com/office/drawing/2014/main" val="20000"/>
+                      <a16:colId xmlns:a16="http://schemas.microsoft.com/office/drawing/2014/main" xmlns="" val="20000"/>
                     </a:ext>
                   </a:extLst>
                 </a:gridCol>
@@ -9218,7 +9290,7 @@
                 </a:tc>
                 <a:extLst>
                   <a:ext uri="{0D108BD9-81ED-4DB2-BD59-A6C34878D82A}">
-                    <a16:rowId xmlns="" xmlns:a16="http://schemas.microsoft.com/office/drawing/2014/main" val="10000"/>
+                    <a16:rowId xmlns:a16="http://schemas.microsoft.com/office/drawing/2014/main" xmlns="" val="10000"/>
                   </a:ext>
                 </a:extLst>
               </a:tr>
@@ -9236,7 +9308,7 @@
                     <a:p>
                       <a:r>
                         <a:rPr lang="es-ES" sz="800" dirty="0" smtClean="0"/>
-                        <a:t>NUM_DOCUMENTO</a:t>
+                        <a:t>NOMBRE</a:t>
                       </a:r>
                       <a:endParaRPr lang="es-ES" sz="800" dirty="0"/>
                     </a:p>
@@ -9245,7 +9317,7 @@
                 </a:tc>
                 <a:extLst>
                   <a:ext uri="{0D108BD9-81ED-4DB2-BD59-A6C34878D82A}">
-                    <a16:rowId xmlns="" xmlns:a16="http://schemas.microsoft.com/office/drawing/2014/main" val="10001"/>
+                    <a16:rowId xmlns:a16="http://schemas.microsoft.com/office/drawing/2014/main" xmlns="" val="10001"/>
                   </a:ext>
                 </a:extLst>
               </a:tr>
@@ -9263,8 +9335,9 @@
                     <a:p>
                       <a:r>
                         <a:rPr lang="es-ES" sz="800" dirty="0" smtClean="0"/>
-                        <a:t>DOCUMENTACION (FICH)</a:t>
-                      </a:r>
+                        <a:t>FICHERO</a:t>
+                      </a:r>
+                      <a:endParaRPr lang="es-ES" sz="800" dirty="0" smtClean="0"/>
                     </a:p>
                     <a:p>
                       <a:r>
@@ -9278,7 +9351,7 @@
                 </a:tc>
                 <a:extLst>
                   <a:ext uri="{0D108BD9-81ED-4DB2-BD59-A6C34878D82A}">
-                    <a16:rowId xmlns="" xmlns:a16="http://schemas.microsoft.com/office/drawing/2014/main" val="10002"/>
+                    <a16:rowId xmlns:a16="http://schemas.microsoft.com/office/drawing/2014/main" xmlns="" val="10002"/>
                   </a:ext>
                 </a:extLst>
               </a:tr>
@@ -9289,15 +9362,12 @@
       <p:cxnSp>
         <p:nvCxnSpPr>
           <p:cNvPr id="71" name="70 Conector angular"/>
-          <p:cNvCxnSpPr>
-            <a:stCxn id="69" idx="3"/>
-            <a:endCxn id="70" idx="1"/>
-          </p:cNvCxnSpPr>
+          <p:cNvCxnSpPr/>
           <p:nvPr/>
         </p:nvCxnSpPr>
         <p:spPr>
           <a:xfrm flipV="1">
-            <a:off x="5315744" y="1648038"/>
+            <a:off x="5315744" y="5373216"/>
             <a:ext cx="1344488" cy="170941"/>
           </a:xfrm>
           <a:prstGeom prst="bentConnector3">
@@ -9330,7 +9400,7 @@
           <p:cNvPr id="72" name="CuadroTexto 44">
             <a:extLst>
               <a:ext uri="{FF2B5EF4-FFF2-40B4-BE49-F238E27FC236}">
-                <a16:creationId xmlns="" xmlns:a16="http://schemas.microsoft.com/office/drawing/2014/main" id="{58DDF0F6-557A-42E3-87C5-C25B3173C4ED}"/>
+                <a16:creationId xmlns:a16="http://schemas.microsoft.com/office/drawing/2014/main" xmlns="" id="{58DDF0F6-557A-42E3-87C5-C25B3173C4ED}"/>
               </a:ext>
             </a:extLst>
           </p:cNvPr>
@@ -9339,7 +9409,7 @@
         </p:nvSpPr>
         <p:spPr>
           <a:xfrm>
-            <a:off x="6084168" y="1432594"/>
+            <a:off x="6084168" y="5157772"/>
             <a:ext cx="432556" cy="215444"/>
           </a:xfrm>
           <a:prstGeom prst="rect">
@@ -9363,14 +9433,12 @@
       <p:cxnSp>
         <p:nvCxnSpPr>
           <p:cNvPr id="73" name="72 Conector angular"/>
-          <p:cNvCxnSpPr>
-            <a:stCxn id="10" idx="3"/>
-          </p:cNvCxnSpPr>
+          <p:cNvCxnSpPr/>
           <p:nvPr/>
         </p:nvCxnSpPr>
         <p:spPr>
           <a:xfrm flipV="1">
-            <a:off x="2843808" y="1648038"/>
+            <a:off x="2843808" y="5373216"/>
             <a:ext cx="1056456" cy="234514"/>
           </a:xfrm>
           <a:prstGeom prst="bentConnector3">
@@ -9403,7 +9471,7 @@
           <p:cNvPr id="74" name="CuadroTexto 44">
             <a:extLst>
               <a:ext uri="{FF2B5EF4-FFF2-40B4-BE49-F238E27FC236}">
-                <a16:creationId xmlns="" xmlns:a16="http://schemas.microsoft.com/office/drawing/2014/main" id="{58DDF0F6-557A-42E3-87C5-C25B3173C4ED}"/>
+                <a16:creationId xmlns:a16="http://schemas.microsoft.com/office/drawing/2014/main" xmlns="" id="{58DDF0F6-557A-42E3-87C5-C25B3173C4ED}"/>
               </a:ext>
             </a:extLst>
           </p:cNvPr>
@@ -9412,7 +9480,7 @@
         </p:nvSpPr>
         <p:spPr>
           <a:xfrm>
-            <a:off x="3372036" y="1462980"/>
+            <a:off x="3372036" y="5188158"/>
             <a:ext cx="432556" cy="215444"/>
           </a:xfrm>
           <a:prstGeom prst="rect">
@@ -9430,37 +9498,6 @@
               <a:rPr lang="es-ES" sz="800" dirty="0"/>
               <a:t>1…*</a:t>
             </a:r>
-          </a:p>
-        </p:txBody>
-      </p:sp>
-      <p:sp>
-        <p:nvSpPr>
-          <p:cNvPr id="75" name="74 CuadroTexto"/>
-          <p:cNvSpPr txBox="1"/>
-          <p:nvPr/>
-        </p:nvSpPr>
-        <p:spPr>
-          <a:xfrm>
-            <a:off x="3352250" y="2636912"/>
-            <a:ext cx="2756090" cy="646331"/>
-          </a:xfrm>
-          <a:prstGeom prst="rect">
-            <a:avLst/>
-          </a:prstGeom>
-          <a:noFill/>
-        </p:spPr>
-        <p:txBody>
-          <a:bodyPr wrap="square" rtlCol="0">
-            <a:spAutoFit/>
-          </a:bodyPr>
-          <a:lstStyle/>
-          <a:p>
-            <a:pPr algn="ctr"/>
-            <a:r>
-              <a:rPr lang="es-ES" dirty="0" smtClean="0"/>
-              <a:t>Pendiente de revisar los datos caja fija</a:t>
-            </a:r>
-            <a:endParaRPr lang="es-ES" dirty="0"/>
           </a:p>
         </p:txBody>
       </p:sp>
@@ -9523,7 +9560,7 @@
                 <a:gridCol w="1440160">
                   <a:extLst>
                     <a:ext uri="{9D8B030D-6E8A-4147-A177-3AD203B41FA5}">
-                      <a16:colId xmlns="" xmlns:a16="http://schemas.microsoft.com/office/drawing/2014/main" val="20000"/>
+                      <a16:colId xmlns:a16="http://schemas.microsoft.com/office/drawing/2014/main" xmlns="" val="20000"/>
                     </a:ext>
                   </a:extLst>
                 </a:gridCol>
@@ -9545,7 +9582,7 @@
                 </a:tc>
                 <a:extLst>
                   <a:ext uri="{0D108BD9-81ED-4DB2-BD59-A6C34878D82A}">
-                    <a16:rowId xmlns="" xmlns:a16="http://schemas.microsoft.com/office/drawing/2014/main" val="10000"/>
+                    <a16:rowId xmlns:a16="http://schemas.microsoft.com/office/drawing/2014/main" xmlns="" val="10000"/>
                   </a:ext>
                 </a:extLst>
               </a:tr>
@@ -9589,7 +9626,7 @@
                 </a:tc>
                 <a:extLst>
                   <a:ext uri="{0D108BD9-81ED-4DB2-BD59-A6C34878D82A}">
-                    <a16:rowId xmlns="" xmlns:a16="http://schemas.microsoft.com/office/drawing/2014/main" val="10001"/>
+                    <a16:rowId xmlns:a16="http://schemas.microsoft.com/office/drawing/2014/main" xmlns="" val="10001"/>
                   </a:ext>
                 </a:extLst>
               </a:tr>
@@ -9616,7 +9653,7 @@
                 </a:tc>
                 <a:extLst>
                   <a:ext uri="{0D108BD9-81ED-4DB2-BD59-A6C34878D82A}">
-                    <a16:rowId xmlns="" xmlns:a16="http://schemas.microsoft.com/office/drawing/2014/main" val="10002"/>
+                    <a16:rowId xmlns:a16="http://schemas.microsoft.com/office/drawing/2014/main" xmlns="" val="10002"/>
                   </a:ext>
                 </a:extLst>
               </a:tr>
@@ -9633,7 +9670,7 @@
           <p:nvPr>
             <p:extLst>
               <p:ext uri="{D42A27DB-BD31-4B8C-83A1-F6EECF244321}">
-                <p14:modId xmlns:p14="http://schemas.microsoft.com/office/powerpoint/2010/main" val="3065606920"/>
+                <p14:modId xmlns:p14="http://schemas.microsoft.com/office/powerpoint/2010/main" val="691449639"/>
               </p:ext>
             </p:extLst>
           </p:nvPr>
@@ -9652,7 +9689,7 @@
                 <a:gridCol w="1463824">
                   <a:extLst>
                     <a:ext uri="{9D8B030D-6E8A-4147-A177-3AD203B41FA5}">
-                      <a16:colId xmlns="" xmlns:a16="http://schemas.microsoft.com/office/drawing/2014/main" val="20000"/>
+                      <a16:colId xmlns:a16="http://schemas.microsoft.com/office/drawing/2014/main" xmlns="" val="20000"/>
                     </a:ext>
                   </a:extLst>
                 </a:gridCol>
@@ -9674,7 +9711,7 @@
                 </a:tc>
                 <a:extLst>
                   <a:ext uri="{0D108BD9-81ED-4DB2-BD59-A6C34878D82A}">
-                    <a16:rowId xmlns="" xmlns:a16="http://schemas.microsoft.com/office/drawing/2014/main" val="10000"/>
+                    <a16:rowId xmlns:a16="http://schemas.microsoft.com/office/drawing/2014/main" xmlns="" val="10000"/>
                   </a:ext>
                 </a:extLst>
               </a:tr>
@@ -9695,7 +9732,7 @@
                 </a:tc>
                 <a:extLst>
                   <a:ext uri="{0D108BD9-81ED-4DB2-BD59-A6C34878D82A}">
-                    <a16:rowId xmlns="" xmlns:a16="http://schemas.microsoft.com/office/drawing/2014/main" val="10001"/>
+                    <a16:rowId xmlns:a16="http://schemas.microsoft.com/office/drawing/2014/main" xmlns="" val="10001"/>
                   </a:ext>
                 </a:extLst>
               </a:tr>
@@ -9709,6 +9746,13 @@
                         <a:rPr lang="es-ES" sz="800" dirty="0" smtClean="0"/>
                         <a:t>NOMBRE</a:t>
                       </a:r>
+                    </a:p>
+                    <a:p>
+                      <a:r>
+                        <a:rPr lang="es-ES" sz="800" dirty="0" smtClean="0"/>
+                        <a:t>TIPO_MODELO</a:t>
+                      </a:r>
+                      <a:endParaRPr lang="es-ES" sz="800" dirty="0" smtClean="0"/>
                     </a:p>
                     <a:p>
                       <a:r>
@@ -9722,7 +9766,7 @@
                 </a:tc>
                 <a:extLst>
                   <a:ext uri="{0D108BD9-81ED-4DB2-BD59-A6C34878D82A}">
-                    <a16:rowId xmlns="" xmlns:a16="http://schemas.microsoft.com/office/drawing/2014/main" val="10002"/>
+                    <a16:rowId xmlns:a16="http://schemas.microsoft.com/office/drawing/2014/main" xmlns="" val="10002"/>
                   </a:ext>
                 </a:extLst>
               </a:tr>
@@ -9730,36 +9774,112 @@
           </a:graphicData>
         </a:graphic>
       </p:graphicFrame>
-      <p:sp>
-        <p:nvSpPr>
-          <p:cNvPr id="17" name="16 CuadroTexto"/>
-          <p:cNvSpPr txBox="1"/>
-          <p:nvPr/>
-        </p:nvSpPr>
-        <p:spPr>
-          <a:xfrm>
-            <a:off x="801286" y="5373216"/>
-            <a:ext cx="2756090" cy="646331"/>
-          </a:xfrm>
-          <a:prstGeom prst="rect">
-            <a:avLst/>
-          </a:prstGeom>
-          <a:noFill/>
-        </p:spPr>
-        <p:txBody>
-          <a:bodyPr wrap="square" rtlCol="0">
-            <a:spAutoFit/>
-          </a:bodyPr>
-          <a:lstStyle/>
-          <a:p>
-            <a:r>
-              <a:rPr lang="es-ES" dirty="0" smtClean="0"/>
-              <a:t>Pendiente de revisar los datos modelos</a:t>
-            </a:r>
-            <a:endParaRPr lang="es-ES" dirty="0"/>
-          </a:p>
-        </p:txBody>
-      </p:sp>
+      <p:graphicFrame>
+        <p:nvGraphicFramePr>
+          <p:cNvPr id="15" name="14 Tabla"/>
+          <p:cNvGraphicFramePr>
+            <a:graphicFrameLocks noGrp="1"/>
+          </p:cNvGraphicFramePr>
+          <p:nvPr>
+            <p:extLst>
+              <p:ext uri="{D42A27DB-BD31-4B8C-83A1-F6EECF244321}">
+                <p14:modId xmlns:p14="http://schemas.microsoft.com/office/powerpoint/2010/main" val="2183849624"/>
+              </p:ext>
+            </p:extLst>
+          </p:nvPr>
+        </p:nvGraphicFramePr>
+        <p:xfrm>
+          <a:off x="1547664" y="5094827"/>
+          <a:ext cx="1463824" cy="898660"/>
+        </p:xfrm>
+        <a:graphic>
+          <a:graphicData uri="http://schemas.openxmlformats.org/drawingml/2006/table">
+            <a:tbl>
+              <a:tblPr firstRow="1" bandRow="1">
+                <a:tableStyleId>{5C22544A-7EE6-4342-B048-85BDC9FD1C3A}</a:tableStyleId>
+              </a:tblPr>
+              <a:tblGrid>
+                <a:gridCol w="1463824">
+                  <a:extLst>
+                    <a:ext uri="{9D8B030D-6E8A-4147-A177-3AD203B41FA5}">
+                      <a16:colId xmlns:a16="http://schemas.microsoft.com/office/drawing/2014/main" xmlns="" val="20000"/>
+                    </a:ext>
+                  </a:extLst>
+                </a:gridCol>
+              </a:tblGrid>
+              <a:tr h="155428">
+                <a:tc>
+                  <a:txBody>
+                    <a:bodyPr/>
+                    <a:lstStyle/>
+                    <a:p>
+                      <a:r>
+                        <a:rPr lang="es-ES" sz="800" i="1" dirty="0" smtClean="0"/>
+                        <a:t>TIPOS_MODELO</a:t>
+                      </a:r>
+                      <a:endParaRPr lang="es-ES" sz="800" i="1" dirty="0"/>
+                    </a:p>
+                  </a:txBody>
+                  <a:tcPr/>
+                </a:tc>
+                <a:extLst>
+                  <a:ext uri="{0D108BD9-81ED-4DB2-BD59-A6C34878D82A}">
+                    <a16:rowId xmlns:a16="http://schemas.microsoft.com/office/drawing/2014/main" xmlns="" val="10000"/>
+                  </a:ext>
+                </a:extLst>
+              </a:tr>
+              <a:tr h="155428">
+                <a:tc>
+                  <a:txBody>
+                    <a:bodyPr/>
+                    <a:lstStyle/>
+                    <a:p>
+                      <a:r>
+                        <a:rPr lang="es-ES" sz="800" dirty="0" smtClean="0"/>
+                        <a:t>TIPO_MODELO</a:t>
+                      </a:r>
+                      <a:endParaRPr lang="es-ES" sz="800" dirty="0"/>
+                    </a:p>
+                  </a:txBody>
+                  <a:tcPr/>
+                </a:tc>
+                <a:extLst>
+                  <a:ext uri="{0D108BD9-81ED-4DB2-BD59-A6C34878D82A}">
+                    <a16:rowId xmlns:a16="http://schemas.microsoft.com/office/drawing/2014/main" xmlns="" val="10001"/>
+                  </a:ext>
+                </a:extLst>
+              </a:tr>
+              <a:tr h="471940">
+                <a:tc>
+                  <a:txBody>
+                    <a:bodyPr/>
+                    <a:lstStyle/>
+                    <a:p>
+                      <a:r>
+                        <a:rPr lang="es-ES" sz="800" dirty="0" smtClean="0"/>
+                        <a:t>NOMBRE</a:t>
+                      </a:r>
+                    </a:p>
+                    <a:p>
+                      <a:r>
+                        <a:rPr lang="es-ES" sz="800" baseline="0" dirty="0" smtClean="0"/>
+                        <a:t>DESCRIPCIÓN</a:t>
+                      </a:r>
+                      <a:endParaRPr lang="es-ES" sz="800" baseline="0" dirty="0"/>
+                    </a:p>
+                  </a:txBody>
+                  <a:tcPr/>
+                </a:tc>
+                <a:extLst>
+                  <a:ext uri="{0D108BD9-81ED-4DB2-BD59-A6C34878D82A}">
+                    <a16:rowId xmlns:a16="http://schemas.microsoft.com/office/drawing/2014/main" xmlns="" val="10002"/>
+                  </a:ext>
+                </a:extLst>
+              </a:tr>
+            </a:tbl>
+          </a:graphicData>
+        </a:graphic>
+      </p:graphicFrame>
     </p:spTree>
     <p:extLst>
       <p:ext uri="{BB962C8B-B14F-4D97-AF65-F5344CB8AC3E}">
@@ -9818,7 +9938,7 @@
                 <a:gridCol w="1463824">
                   <a:extLst>
                     <a:ext uri="{9D8B030D-6E8A-4147-A177-3AD203B41FA5}">
-                      <a16:colId xmlns="" xmlns:a16="http://schemas.microsoft.com/office/drawing/2014/main" val="20000"/>
+                      <a16:colId xmlns:a16="http://schemas.microsoft.com/office/drawing/2014/main" xmlns="" val="20000"/>
                     </a:ext>
                   </a:extLst>
                 </a:gridCol>
@@ -9839,7 +9959,7 @@
                 </a:tc>
                 <a:extLst>
                   <a:ext uri="{0D108BD9-81ED-4DB2-BD59-A6C34878D82A}">
-                    <a16:rowId xmlns="" xmlns:a16="http://schemas.microsoft.com/office/drawing/2014/main" val="10000"/>
+                    <a16:rowId xmlns:a16="http://schemas.microsoft.com/office/drawing/2014/main" xmlns="" val="10000"/>
                   </a:ext>
                 </a:extLst>
               </a:tr>
@@ -9860,7 +9980,7 @@
                 </a:tc>
                 <a:extLst>
                   <a:ext uri="{0D108BD9-81ED-4DB2-BD59-A6C34878D82A}">
-                    <a16:rowId xmlns="" xmlns:a16="http://schemas.microsoft.com/office/drawing/2014/main" val="10001"/>
+                    <a16:rowId xmlns:a16="http://schemas.microsoft.com/office/drawing/2014/main" xmlns="" val="10001"/>
                   </a:ext>
                 </a:extLst>
               </a:tr>
@@ -9968,7 +10088,7 @@
                 </a:tc>
                 <a:extLst>
                   <a:ext uri="{0D108BD9-81ED-4DB2-BD59-A6C34878D82A}">
-                    <a16:rowId xmlns="" xmlns:a16="http://schemas.microsoft.com/office/drawing/2014/main" val="10002"/>
+                    <a16:rowId xmlns:a16="http://schemas.microsoft.com/office/drawing/2014/main" xmlns="" val="10002"/>
                   </a:ext>
                 </a:extLst>
               </a:tr>
@@ -10004,7 +10124,7 @@
                 <a:gridCol w="1463824">
                   <a:extLst>
                     <a:ext uri="{9D8B030D-6E8A-4147-A177-3AD203B41FA5}">
-                      <a16:colId xmlns="" xmlns:a16="http://schemas.microsoft.com/office/drawing/2014/main" val="20000"/>
+                      <a16:colId xmlns:a16="http://schemas.microsoft.com/office/drawing/2014/main" xmlns="" val="20000"/>
                     </a:ext>
                   </a:extLst>
                 </a:gridCol>
@@ -10026,7 +10146,7 @@
                 </a:tc>
                 <a:extLst>
                   <a:ext uri="{0D108BD9-81ED-4DB2-BD59-A6C34878D82A}">
-                    <a16:rowId xmlns="" xmlns:a16="http://schemas.microsoft.com/office/drawing/2014/main" val="10000"/>
+                    <a16:rowId xmlns:a16="http://schemas.microsoft.com/office/drawing/2014/main" xmlns="" val="10000"/>
                   </a:ext>
                 </a:extLst>
               </a:tr>
@@ -10047,7 +10167,7 @@
                 </a:tc>
                 <a:extLst>
                   <a:ext uri="{0D108BD9-81ED-4DB2-BD59-A6C34878D82A}">
-                    <a16:rowId xmlns="" xmlns:a16="http://schemas.microsoft.com/office/drawing/2014/main" val="10001"/>
+                    <a16:rowId xmlns:a16="http://schemas.microsoft.com/office/drawing/2014/main" xmlns="" val="10001"/>
                   </a:ext>
                 </a:extLst>
               </a:tr>
@@ -10086,7 +10206,7 @@
                 </a:tc>
                 <a:extLst>
                   <a:ext uri="{0D108BD9-81ED-4DB2-BD59-A6C34878D82A}">
-                    <a16:rowId xmlns="" xmlns:a16="http://schemas.microsoft.com/office/drawing/2014/main" val="10002"/>
+                    <a16:rowId xmlns:a16="http://schemas.microsoft.com/office/drawing/2014/main" xmlns="" val="10002"/>
                   </a:ext>
                 </a:extLst>
               </a:tr>
@@ -10122,7 +10242,7 @@
                 <a:gridCol w="720080">
                   <a:extLst>
                     <a:ext uri="{9D8B030D-6E8A-4147-A177-3AD203B41FA5}">
-                      <a16:colId xmlns="" xmlns:a16="http://schemas.microsoft.com/office/drawing/2014/main" val="20000"/>
+                      <a16:colId xmlns:a16="http://schemas.microsoft.com/office/drawing/2014/main" xmlns="" val="20000"/>
                     </a:ext>
                   </a:extLst>
                 </a:gridCol>
@@ -10143,7 +10263,7 @@
                 </a:tc>
                 <a:extLst>
                   <a:ext uri="{0D108BD9-81ED-4DB2-BD59-A6C34878D82A}">
-                    <a16:rowId xmlns="" xmlns:a16="http://schemas.microsoft.com/office/drawing/2014/main" val="10000"/>
+                    <a16:rowId xmlns:a16="http://schemas.microsoft.com/office/drawing/2014/main" xmlns="" val="10000"/>
                   </a:ext>
                 </a:extLst>
               </a:tr>
@@ -10164,7 +10284,7 @@
                 </a:tc>
                 <a:extLst>
                   <a:ext uri="{0D108BD9-81ED-4DB2-BD59-A6C34878D82A}">
-                    <a16:rowId xmlns="" xmlns:a16="http://schemas.microsoft.com/office/drawing/2014/main" val="10001"/>
+                    <a16:rowId xmlns:a16="http://schemas.microsoft.com/office/drawing/2014/main" xmlns="" val="10001"/>
                   </a:ext>
                 </a:extLst>
               </a:tr>
@@ -10184,7 +10304,7 @@
                 </a:tc>
                 <a:extLst>
                   <a:ext uri="{0D108BD9-81ED-4DB2-BD59-A6C34878D82A}">
-                    <a16:rowId xmlns="" xmlns:a16="http://schemas.microsoft.com/office/drawing/2014/main" val="10002"/>
+                    <a16:rowId xmlns:a16="http://schemas.microsoft.com/office/drawing/2014/main" xmlns="" val="10002"/>
                   </a:ext>
                 </a:extLst>
               </a:tr>
@@ -10220,7 +10340,7 @@
                 <a:gridCol w="1368152">
                   <a:extLst>
                     <a:ext uri="{9D8B030D-6E8A-4147-A177-3AD203B41FA5}">
-                      <a16:colId xmlns="" xmlns:a16="http://schemas.microsoft.com/office/drawing/2014/main" val="20000"/>
+                      <a16:colId xmlns:a16="http://schemas.microsoft.com/office/drawing/2014/main" xmlns="" val="20000"/>
                     </a:ext>
                   </a:extLst>
                 </a:gridCol>
@@ -10241,7 +10361,7 @@
                 </a:tc>
                 <a:extLst>
                   <a:ext uri="{0D108BD9-81ED-4DB2-BD59-A6C34878D82A}">
-                    <a16:rowId xmlns="" xmlns:a16="http://schemas.microsoft.com/office/drawing/2014/main" val="10000"/>
+                    <a16:rowId xmlns:a16="http://schemas.microsoft.com/office/drawing/2014/main" xmlns="" val="10000"/>
                   </a:ext>
                 </a:extLst>
               </a:tr>
@@ -10268,7 +10388,7 @@
                 </a:tc>
                 <a:extLst>
                   <a:ext uri="{0D108BD9-81ED-4DB2-BD59-A6C34878D82A}">
-                    <a16:rowId xmlns="" xmlns:a16="http://schemas.microsoft.com/office/drawing/2014/main" val="10001"/>
+                    <a16:rowId xmlns:a16="http://schemas.microsoft.com/office/drawing/2014/main" xmlns="" val="10001"/>
                   </a:ext>
                 </a:extLst>
               </a:tr>
@@ -10288,7 +10408,7 @@
                 </a:tc>
                 <a:extLst>
                   <a:ext uri="{0D108BD9-81ED-4DB2-BD59-A6C34878D82A}">
-                    <a16:rowId xmlns="" xmlns:a16="http://schemas.microsoft.com/office/drawing/2014/main" val="10002"/>
+                    <a16:rowId xmlns:a16="http://schemas.microsoft.com/office/drawing/2014/main" xmlns="" val="10002"/>
                   </a:ext>
                 </a:extLst>
               </a:tr>
@@ -10324,7 +10444,7 @@
                 <a:gridCol w="1368152">
                   <a:extLst>
                     <a:ext uri="{9D8B030D-6E8A-4147-A177-3AD203B41FA5}">
-                      <a16:colId xmlns="" xmlns:a16="http://schemas.microsoft.com/office/drawing/2014/main" val="20000"/>
+                      <a16:colId xmlns:a16="http://schemas.microsoft.com/office/drawing/2014/main" xmlns="" val="20000"/>
                     </a:ext>
                   </a:extLst>
                 </a:gridCol>
@@ -10345,7 +10465,7 @@
                 </a:tc>
                 <a:extLst>
                   <a:ext uri="{0D108BD9-81ED-4DB2-BD59-A6C34878D82A}">
-                    <a16:rowId xmlns="" xmlns:a16="http://schemas.microsoft.com/office/drawing/2014/main" val="10000"/>
+                    <a16:rowId xmlns:a16="http://schemas.microsoft.com/office/drawing/2014/main" xmlns="" val="10000"/>
                   </a:ext>
                 </a:extLst>
               </a:tr>
@@ -10365,7 +10485,7 @@
                 </a:tc>
                 <a:extLst>
                   <a:ext uri="{0D108BD9-81ED-4DB2-BD59-A6C34878D82A}">
-                    <a16:rowId xmlns="" xmlns:a16="http://schemas.microsoft.com/office/drawing/2014/main" val="10001"/>
+                    <a16:rowId xmlns:a16="http://schemas.microsoft.com/office/drawing/2014/main" xmlns="" val="10001"/>
                   </a:ext>
                 </a:extLst>
               </a:tr>
@@ -10393,7 +10513,7 @@
                 </a:tc>
                 <a:extLst>
                   <a:ext uri="{0D108BD9-81ED-4DB2-BD59-A6C34878D82A}">
-                    <a16:rowId xmlns="" xmlns:a16="http://schemas.microsoft.com/office/drawing/2014/main" val="10002"/>
+                    <a16:rowId xmlns:a16="http://schemas.microsoft.com/office/drawing/2014/main" xmlns="" val="10002"/>
                   </a:ext>
                 </a:extLst>
               </a:tr>
@@ -10429,7 +10549,7 @@
                 <a:gridCol w="1463824">
                   <a:extLst>
                     <a:ext uri="{9D8B030D-6E8A-4147-A177-3AD203B41FA5}">
-                      <a16:colId xmlns="" xmlns:a16="http://schemas.microsoft.com/office/drawing/2014/main" val="20000"/>
+                      <a16:colId xmlns:a16="http://schemas.microsoft.com/office/drawing/2014/main" xmlns="" val="20000"/>
                     </a:ext>
                   </a:extLst>
                 </a:gridCol>
@@ -10450,7 +10570,7 @@
                 </a:tc>
                 <a:extLst>
                   <a:ext uri="{0D108BD9-81ED-4DB2-BD59-A6C34878D82A}">
-                    <a16:rowId xmlns="" xmlns:a16="http://schemas.microsoft.com/office/drawing/2014/main" val="10000"/>
+                    <a16:rowId xmlns:a16="http://schemas.microsoft.com/office/drawing/2014/main" xmlns="" val="10000"/>
                   </a:ext>
                 </a:extLst>
               </a:tr>
@@ -10470,7 +10590,7 @@
                 </a:tc>
                 <a:extLst>
                   <a:ext uri="{0D108BD9-81ED-4DB2-BD59-A6C34878D82A}">
-                    <a16:rowId xmlns="" xmlns:a16="http://schemas.microsoft.com/office/drawing/2014/main" val="10001"/>
+                    <a16:rowId xmlns:a16="http://schemas.microsoft.com/office/drawing/2014/main" xmlns="" val="10001"/>
                   </a:ext>
                 </a:extLst>
               </a:tr>
@@ -10497,7 +10617,7 @@
                 </a:tc>
                 <a:extLst>
                   <a:ext uri="{0D108BD9-81ED-4DB2-BD59-A6C34878D82A}">
-                    <a16:rowId xmlns="" xmlns:a16="http://schemas.microsoft.com/office/drawing/2014/main" val="10002"/>
+                    <a16:rowId xmlns:a16="http://schemas.microsoft.com/office/drawing/2014/main" xmlns="" val="10002"/>
                   </a:ext>
                 </a:extLst>
               </a:tr>
@@ -10533,7 +10653,7 @@
                 <a:gridCol w="1463824">
                   <a:extLst>
                     <a:ext uri="{9D8B030D-6E8A-4147-A177-3AD203B41FA5}">
-                      <a16:colId xmlns="" xmlns:a16="http://schemas.microsoft.com/office/drawing/2014/main" val="20000"/>
+                      <a16:colId xmlns:a16="http://schemas.microsoft.com/office/drawing/2014/main" xmlns="" val="20000"/>
                     </a:ext>
                   </a:extLst>
                 </a:gridCol>
@@ -10555,7 +10675,7 @@
                 </a:tc>
                 <a:extLst>
                   <a:ext uri="{0D108BD9-81ED-4DB2-BD59-A6C34878D82A}">
-                    <a16:rowId xmlns="" xmlns:a16="http://schemas.microsoft.com/office/drawing/2014/main" val="10000"/>
+                    <a16:rowId xmlns:a16="http://schemas.microsoft.com/office/drawing/2014/main" xmlns="" val="10000"/>
                   </a:ext>
                 </a:extLst>
               </a:tr>
@@ -10576,7 +10696,7 @@
                 </a:tc>
                 <a:extLst>
                   <a:ext uri="{0D108BD9-81ED-4DB2-BD59-A6C34878D82A}">
-                    <a16:rowId xmlns="" xmlns:a16="http://schemas.microsoft.com/office/drawing/2014/main" val="10001"/>
+                    <a16:rowId xmlns:a16="http://schemas.microsoft.com/office/drawing/2014/main" xmlns="" val="10001"/>
                   </a:ext>
                 </a:extLst>
               </a:tr>
@@ -10625,7 +10745,7 @@
                 </a:tc>
                 <a:extLst>
                   <a:ext uri="{0D108BD9-81ED-4DB2-BD59-A6C34878D82A}">
-                    <a16:rowId xmlns="" xmlns:a16="http://schemas.microsoft.com/office/drawing/2014/main" val="10002"/>
+                    <a16:rowId xmlns:a16="http://schemas.microsoft.com/office/drawing/2014/main" xmlns="" val="10002"/>
                   </a:ext>
                 </a:extLst>
               </a:tr>
@@ -10661,7 +10781,7 @@
                 <a:gridCol w="1463824">
                   <a:extLst>
                     <a:ext uri="{9D8B030D-6E8A-4147-A177-3AD203B41FA5}">
-                      <a16:colId xmlns="" xmlns:a16="http://schemas.microsoft.com/office/drawing/2014/main" val="20000"/>
+                      <a16:colId xmlns:a16="http://schemas.microsoft.com/office/drawing/2014/main" xmlns="" val="20000"/>
                     </a:ext>
                   </a:extLst>
                 </a:gridCol>
@@ -10682,7 +10802,7 @@
                 </a:tc>
                 <a:extLst>
                   <a:ext uri="{0D108BD9-81ED-4DB2-BD59-A6C34878D82A}">
-                    <a16:rowId xmlns="" xmlns:a16="http://schemas.microsoft.com/office/drawing/2014/main" val="10000"/>
+                    <a16:rowId xmlns:a16="http://schemas.microsoft.com/office/drawing/2014/main" xmlns="" val="10000"/>
                   </a:ext>
                 </a:extLst>
               </a:tr>
@@ -10703,7 +10823,7 @@
                 </a:tc>
                 <a:extLst>
                   <a:ext uri="{0D108BD9-81ED-4DB2-BD59-A6C34878D82A}">
-                    <a16:rowId xmlns="" xmlns:a16="http://schemas.microsoft.com/office/drawing/2014/main" val="10001"/>
+                    <a16:rowId xmlns:a16="http://schemas.microsoft.com/office/drawing/2014/main" xmlns="" val="10001"/>
                   </a:ext>
                 </a:extLst>
               </a:tr>
@@ -10724,7 +10844,7 @@
                 </a:tc>
                 <a:extLst>
                   <a:ext uri="{0D108BD9-81ED-4DB2-BD59-A6C34878D82A}">
-                    <a16:rowId xmlns="" xmlns:a16="http://schemas.microsoft.com/office/drawing/2014/main" val="10002"/>
+                    <a16:rowId xmlns:a16="http://schemas.microsoft.com/office/drawing/2014/main" xmlns="" val="10002"/>
                   </a:ext>
                 </a:extLst>
               </a:tr>
@@ -10760,7 +10880,7 @@
                 <a:gridCol w="1728192">
                   <a:extLst>
                     <a:ext uri="{9D8B030D-6E8A-4147-A177-3AD203B41FA5}">
-                      <a16:colId xmlns="" xmlns:a16="http://schemas.microsoft.com/office/drawing/2014/main" val="20000"/>
+                      <a16:colId xmlns:a16="http://schemas.microsoft.com/office/drawing/2014/main" xmlns="" val="20000"/>
                     </a:ext>
                   </a:extLst>
                 </a:gridCol>
@@ -10782,7 +10902,7 @@
                 </a:tc>
                 <a:extLst>
                   <a:ext uri="{0D108BD9-81ED-4DB2-BD59-A6C34878D82A}">
-                    <a16:rowId xmlns="" xmlns:a16="http://schemas.microsoft.com/office/drawing/2014/main" val="10000"/>
+                    <a16:rowId xmlns:a16="http://schemas.microsoft.com/office/drawing/2014/main" xmlns="" val="10000"/>
                   </a:ext>
                 </a:extLst>
               </a:tr>
@@ -10803,7 +10923,7 @@
                 </a:tc>
                 <a:extLst>
                   <a:ext uri="{0D108BD9-81ED-4DB2-BD59-A6C34878D82A}">
-                    <a16:rowId xmlns="" xmlns:a16="http://schemas.microsoft.com/office/drawing/2014/main" val="10001"/>
+                    <a16:rowId xmlns:a16="http://schemas.microsoft.com/office/drawing/2014/main" xmlns="" val="10001"/>
                   </a:ext>
                 </a:extLst>
               </a:tr>
@@ -10824,7 +10944,7 @@
                 </a:tc>
                 <a:extLst>
                   <a:ext uri="{0D108BD9-81ED-4DB2-BD59-A6C34878D82A}">
-                    <a16:rowId xmlns="" xmlns:a16="http://schemas.microsoft.com/office/drawing/2014/main" val="10002"/>
+                    <a16:rowId xmlns:a16="http://schemas.microsoft.com/office/drawing/2014/main" xmlns="" val="10002"/>
                   </a:ext>
                 </a:extLst>
               </a:tr>
@@ -10860,7 +10980,7 @@
                 <a:gridCol w="1728192">
                   <a:extLst>
                     <a:ext uri="{9D8B030D-6E8A-4147-A177-3AD203B41FA5}">
-                      <a16:colId xmlns="" xmlns:a16="http://schemas.microsoft.com/office/drawing/2014/main" val="20000"/>
+                      <a16:colId xmlns:a16="http://schemas.microsoft.com/office/drawing/2014/main" xmlns="" val="20000"/>
                     </a:ext>
                   </a:extLst>
                 </a:gridCol>
@@ -10882,7 +11002,7 @@
                 </a:tc>
                 <a:extLst>
                   <a:ext uri="{0D108BD9-81ED-4DB2-BD59-A6C34878D82A}">
-                    <a16:rowId xmlns="" xmlns:a16="http://schemas.microsoft.com/office/drawing/2014/main" val="10000"/>
+                    <a16:rowId xmlns:a16="http://schemas.microsoft.com/office/drawing/2014/main" xmlns="" val="10000"/>
                   </a:ext>
                 </a:extLst>
               </a:tr>
@@ -10903,7 +11023,7 @@
                 </a:tc>
                 <a:extLst>
                   <a:ext uri="{0D108BD9-81ED-4DB2-BD59-A6C34878D82A}">
-                    <a16:rowId xmlns="" xmlns:a16="http://schemas.microsoft.com/office/drawing/2014/main" val="10001"/>
+                    <a16:rowId xmlns:a16="http://schemas.microsoft.com/office/drawing/2014/main" xmlns="" val="10001"/>
                   </a:ext>
                 </a:extLst>
               </a:tr>
@@ -10924,7 +11044,7 @@
                 </a:tc>
                 <a:extLst>
                   <a:ext uri="{0D108BD9-81ED-4DB2-BD59-A6C34878D82A}">
-                    <a16:rowId xmlns="" xmlns:a16="http://schemas.microsoft.com/office/drawing/2014/main" val="10002"/>
+                    <a16:rowId xmlns:a16="http://schemas.microsoft.com/office/drawing/2014/main" xmlns="" val="10002"/>
                   </a:ext>
                 </a:extLst>
               </a:tr>
@@ -10960,7 +11080,7 @@
                 <a:gridCol w="1463824">
                   <a:extLst>
                     <a:ext uri="{9D8B030D-6E8A-4147-A177-3AD203B41FA5}">
-                      <a16:colId xmlns="" xmlns:a16="http://schemas.microsoft.com/office/drawing/2014/main" val="20000"/>
+                      <a16:colId xmlns:a16="http://schemas.microsoft.com/office/drawing/2014/main" xmlns="" val="20000"/>
                     </a:ext>
                   </a:extLst>
                 </a:gridCol>
@@ -10982,7 +11102,7 @@
                 </a:tc>
                 <a:extLst>
                   <a:ext uri="{0D108BD9-81ED-4DB2-BD59-A6C34878D82A}">
-                    <a16:rowId xmlns="" xmlns:a16="http://schemas.microsoft.com/office/drawing/2014/main" val="10000"/>
+                    <a16:rowId xmlns:a16="http://schemas.microsoft.com/office/drawing/2014/main" xmlns="" val="10000"/>
                   </a:ext>
                 </a:extLst>
               </a:tr>
@@ -11003,7 +11123,7 @@
                 </a:tc>
                 <a:extLst>
                   <a:ext uri="{0D108BD9-81ED-4DB2-BD59-A6C34878D82A}">
-                    <a16:rowId xmlns="" xmlns:a16="http://schemas.microsoft.com/office/drawing/2014/main" val="10001"/>
+                    <a16:rowId xmlns:a16="http://schemas.microsoft.com/office/drawing/2014/main" xmlns="" val="10001"/>
                   </a:ext>
                 </a:extLst>
               </a:tr>
@@ -11024,7 +11144,7 @@
                 </a:tc>
                 <a:extLst>
                   <a:ext uri="{0D108BD9-81ED-4DB2-BD59-A6C34878D82A}">
-                    <a16:rowId xmlns="" xmlns:a16="http://schemas.microsoft.com/office/drawing/2014/main" val="10002"/>
+                    <a16:rowId xmlns:a16="http://schemas.microsoft.com/office/drawing/2014/main" xmlns="" val="10002"/>
                   </a:ext>
                 </a:extLst>
               </a:tr>
@@ -11060,7 +11180,7 @@
                 <a:gridCol w="1463824">
                   <a:extLst>
                     <a:ext uri="{9D8B030D-6E8A-4147-A177-3AD203B41FA5}">
-                      <a16:colId xmlns="" xmlns:a16="http://schemas.microsoft.com/office/drawing/2014/main" val="20000"/>
+                      <a16:colId xmlns:a16="http://schemas.microsoft.com/office/drawing/2014/main" xmlns="" val="20000"/>
                     </a:ext>
                   </a:extLst>
                 </a:gridCol>
@@ -11081,7 +11201,7 @@
                 </a:tc>
                 <a:extLst>
                   <a:ext uri="{0D108BD9-81ED-4DB2-BD59-A6C34878D82A}">
-                    <a16:rowId xmlns="" xmlns:a16="http://schemas.microsoft.com/office/drawing/2014/main" val="10000"/>
+                    <a16:rowId xmlns:a16="http://schemas.microsoft.com/office/drawing/2014/main" xmlns="" val="10000"/>
                   </a:ext>
                 </a:extLst>
               </a:tr>
@@ -11102,7 +11222,7 @@
                 </a:tc>
                 <a:extLst>
                   <a:ext uri="{0D108BD9-81ED-4DB2-BD59-A6C34878D82A}">
-                    <a16:rowId xmlns="" xmlns:a16="http://schemas.microsoft.com/office/drawing/2014/main" val="10001"/>
+                    <a16:rowId xmlns:a16="http://schemas.microsoft.com/office/drawing/2014/main" xmlns="" val="10001"/>
                   </a:ext>
                 </a:extLst>
               </a:tr>
@@ -11136,7 +11256,7 @@
                 </a:tc>
                 <a:extLst>
                   <a:ext uri="{0D108BD9-81ED-4DB2-BD59-A6C34878D82A}">
-                    <a16:rowId xmlns="" xmlns:a16="http://schemas.microsoft.com/office/drawing/2014/main" val="10002"/>
+                    <a16:rowId xmlns:a16="http://schemas.microsoft.com/office/drawing/2014/main" xmlns="" val="10002"/>
                   </a:ext>
                 </a:extLst>
               </a:tr>
@@ -11172,7 +11292,7 @@
                 <a:gridCol w="1463824">
                   <a:extLst>
                     <a:ext uri="{9D8B030D-6E8A-4147-A177-3AD203B41FA5}">
-                      <a16:colId xmlns="" xmlns:a16="http://schemas.microsoft.com/office/drawing/2014/main" val="20000"/>
+                      <a16:colId xmlns:a16="http://schemas.microsoft.com/office/drawing/2014/main" xmlns="" val="20000"/>
                     </a:ext>
                   </a:extLst>
                 </a:gridCol>
@@ -11194,7 +11314,7 @@
                 </a:tc>
                 <a:extLst>
                   <a:ext uri="{0D108BD9-81ED-4DB2-BD59-A6C34878D82A}">
-                    <a16:rowId xmlns="" xmlns:a16="http://schemas.microsoft.com/office/drawing/2014/main" val="10000"/>
+                    <a16:rowId xmlns:a16="http://schemas.microsoft.com/office/drawing/2014/main" xmlns="" val="10000"/>
                   </a:ext>
                 </a:extLst>
               </a:tr>
@@ -11215,7 +11335,7 @@
                 </a:tc>
                 <a:extLst>
                   <a:ext uri="{0D108BD9-81ED-4DB2-BD59-A6C34878D82A}">
-                    <a16:rowId xmlns="" xmlns:a16="http://schemas.microsoft.com/office/drawing/2014/main" val="10001"/>
+                    <a16:rowId xmlns:a16="http://schemas.microsoft.com/office/drawing/2014/main" xmlns="" val="10001"/>
                   </a:ext>
                 </a:extLst>
               </a:tr>
@@ -11235,7 +11355,7 @@
                 </a:tc>
                 <a:extLst>
                   <a:ext uri="{0D108BD9-81ED-4DB2-BD59-A6C34878D82A}">
-                    <a16:rowId xmlns="" xmlns:a16="http://schemas.microsoft.com/office/drawing/2014/main" val="10002"/>
+                    <a16:rowId xmlns:a16="http://schemas.microsoft.com/office/drawing/2014/main" xmlns="" val="10002"/>
                   </a:ext>
                 </a:extLst>
               </a:tr>
@@ -11271,7 +11391,7 @@
                 <a:gridCol w="1463824">
                   <a:extLst>
                     <a:ext uri="{9D8B030D-6E8A-4147-A177-3AD203B41FA5}">
-                      <a16:colId xmlns="" xmlns:a16="http://schemas.microsoft.com/office/drawing/2014/main" val="20000"/>
+                      <a16:colId xmlns:a16="http://schemas.microsoft.com/office/drawing/2014/main" xmlns="" val="20000"/>
                     </a:ext>
                   </a:extLst>
                 </a:gridCol>
@@ -11293,7 +11413,7 @@
                 </a:tc>
                 <a:extLst>
                   <a:ext uri="{0D108BD9-81ED-4DB2-BD59-A6C34878D82A}">
-                    <a16:rowId xmlns="" xmlns:a16="http://schemas.microsoft.com/office/drawing/2014/main" val="10000"/>
+                    <a16:rowId xmlns:a16="http://schemas.microsoft.com/office/drawing/2014/main" xmlns="" val="10000"/>
                   </a:ext>
                 </a:extLst>
               </a:tr>
@@ -11313,7 +11433,7 @@
                 </a:tc>
                 <a:extLst>
                   <a:ext uri="{0D108BD9-81ED-4DB2-BD59-A6C34878D82A}">
-                    <a16:rowId xmlns="" xmlns:a16="http://schemas.microsoft.com/office/drawing/2014/main" val="10001"/>
+                    <a16:rowId xmlns:a16="http://schemas.microsoft.com/office/drawing/2014/main" xmlns="" val="10001"/>
                   </a:ext>
                 </a:extLst>
               </a:tr>
@@ -11334,7 +11454,7 @@
                 </a:tc>
                 <a:extLst>
                   <a:ext uri="{0D108BD9-81ED-4DB2-BD59-A6C34878D82A}">
-                    <a16:rowId xmlns="" xmlns:a16="http://schemas.microsoft.com/office/drawing/2014/main" val="10002"/>
+                    <a16:rowId xmlns:a16="http://schemas.microsoft.com/office/drawing/2014/main" xmlns="" val="10002"/>
                   </a:ext>
                 </a:extLst>
               </a:tr>
@@ -11400,7 +11520,7 @@
                 <a:gridCol w="1463824">
                   <a:extLst>
                     <a:ext uri="{9D8B030D-6E8A-4147-A177-3AD203B41FA5}">
-                      <a16:colId xmlns="" xmlns:a16="http://schemas.microsoft.com/office/drawing/2014/main" val="20000"/>
+                      <a16:colId xmlns:a16="http://schemas.microsoft.com/office/drawing/2014/main" xmlns="" val="20000"/>
                     </a:ext>
                   </a:extLst>
                 </a:gridCol>
@@ -11422,7 +11542,7 @@
                 </a:tc>
                 <a:extLst>
                   <a:ext uri="{0D108BD9-81ED-4DB2-BD59-A6C34878D82A}">
-                    <a16:rowId xmlns="" xmlns:a16="http://schemas.microsoft.com/office/drawing/2014/main" val="10000"/>
+                    <a16:rowId xmlns:a16="http://schemas.microsoft.com/office/drawing/2014/main" xmlns="" val="10000"/>
                   </a:ext>
                 </a:extLst>
               </a:tr>
@@ -11443,7 +11563,7 @@
                 </a:tc>
                 <a:extLst>
                   <a:ext uri="{0D108BD9-81ED-4DB2-BD59-A6C34878D82A}">
-                    <a16:rowId xmlns="" xmlns:a16="http://schemas.microsoft.com/office/drawing/2014/main" val="10001"/>
+                    <a16:rowId xmlns:a16="http://schemas.microsoft.com/office/drawing/2014/main" xmlns="" val="10001"/>
                   </a:ext>
                 </a:extLst>
               </a:tr>
@@ -11464,7 +11584,7 @@
                 </a:tc>
                 <a:extLst>
                   <a:ext uri="{0D108BD9-81ED-4DB2-BD59-A6C34878D82A}">
-                    <a16:rowId xmlns="" xmlns:a16="http://schemas.microsoft.com/office/drawing/2014/main" val="10002"/>
+                    <a16:rowId xmlns:a16="http://schemas.microsoft.com/office/drawing/2014/main" xmlns="" val="10002"/>
                   </a:ext>
                 </a:extLst>
               </a:tr>
@@ -11500,7 +11620,7 @@
                 <a:gridCol w="1800200">
                   <a:extLst>
                     <a:ext uri="{9D8B030D-6E8A-4147-A177-3AD203B41FA5}">
-                      <a16:colId xmlns="" xmlns:a16="http://schemas.microsoft.com/office/drawing/2014/main" val="20000"/>
+                      <a16:colId xmlns:a16="http://schemas.microsoft.com/office/drawing/2014/main" xmlns="" val="20000"/>
                     </a:ext>
                   </a:extLst>
                 </a:gridCol>
@@ -11522,7 +11642,7 @@
                 </a:tc>
                 <a:extLst>
                   <a:ext uri="{0D108BD9-81ED-4DB2-BD59-A6C34878D82A}">
-                    <a16:rowId xmlns="" xmlns:a16="http://schemas.microsoft.com/office/drawing/2014/main" val="10000"/>
+                    <a16:rowId xmlns:a16="http://schemas.microsoft.com/office/drawing/2014/main" xmlns="" val="10000"/>
                   </a:ext>
                 </a:extLst>
               </a:tr>
@@ -11543,7 +11663,7 @@
                 </a:tc>
                 <a:extLst>
                   <a:ext uri="{0D108BD9-81ED-4DB2-BD59-A6C34878D82A}">
-                    <a16:rowId xmlns="" xmlns:a16="http://schemas.microsoft.com/office/drawing/2014/main" val="10001"/>
+                    <a16:rowId xmlns:a16="http://schemas.microsoft.com/office/drawing/2014/main" xmlns="" val="10001"/>
                   </a:ext>
                 </a:extLst>
               </a:tr>
@@ -11564,7 +11684,7 @@
                 </a:tc>
                 <a:extLst>
                   <a:ext uri="{0D108BD9-81ED-4DB2-BD59-A6C34878D82A}">
-                    <a16:rowId xmlns="" xmlns:a16="http://schemas.microsoft.com/office/drawing/2014/main" val="10002"/>
+                    <a16:rowId xmlns:a16="http://schemas.microsoft.com/office/drawing/2014/main" xmlns="" val="10002"/>
                   </a:ext>
                 </a:extLst>
               </a:tr>
@@ -11600,7 +11720,7 @@
                 <a:gridCol w="1463824">
                   <a:extLst>
                     <a:ext uri="{9D8B030D-6E8A-4147-A177-3AD203B41FA5}">
-                      <a16:colId xmlns="" xmlns:a16="http://schemas.microsoft.com/office/drawing/2014/main" val="20000"/>
+                      <a16:colId xmlns:a16="http://schemas.microsoft.com/office/drawing/2014/main" xmlns="" val="20000"/>
                     </a:ext>
                   </a:extLst>
                 </a:gridCol>
@@ -11621,7 +11741,7 @@
                 </a:tc>
                 <a:extLst>
                   <a:ext uri="{0D108BD9-81ED-4DB2-BD59-A6C34878D82A}">
-                    <a16:rowId xmlns="" xmlns:a16="http://schemas.microsoft.com/office/drawing/2014/main" val="10000"/>
+                    <a16:rowId xmlns:a16="http://schemas.microsoft.com/office/drawing/2014/main" xmlns="" val="10000"/>
                   </a:ext>
                 </a:extLst>
               </a:tr>
@@ -11646,7 +11766,7 @@
                 </a:tc>
                 <a:extLst>
                   <a:ext uri="{0D108BD9-81ED-4DB2-BD59-A6C34878D82A}">
-                    <a16:rowId xmlns="" xmlns:a16="http://schemas.microsoft.com/office/drawing/2014/main" val="10001"/>
+                    <a16:rowId xmlns:a16="http://schemas.microsoft.com/office/drawing/2014/main" xmlns="" val="10001"/>
                   </a:ext>
                 </a:extLst>
               </a:tr>
@@ -11667,7 +11787,7 @@
                 </a:tc>
                 <a:extLst>
                   <a:ext uri="{0D108BD9-81ED-4DB2-BD59-A6C34878D82A}">
-                    <a16:rowId xmlns="" xmlns:a16="http://schemas.microsoft.com/office/drawing/2014/main" val="10002"/>
+                    <a16:rowId xmlns:a16="http://schemas.microsoft.com/office/drawing/2014/main" xmlns="" val="10002"/>
                   </a:ext>
                 </a:extLst>
               </a:tr>
@@ -11703,7 +11823,7 @@
                 <a:gridCol w="1463824">
                   <a:extLst>
                     <a:ext uri="{9D8B030D-6E8A-4147-A177-3AD203B41FA5}">
-                      <a16:colId xmlns="" xmlns:a16="http://schemas.microsoft.com/office/drawing/2014/main" val="20000"/>
+                      <a16:colId xmlns:a16="http://schemas.microsoft.com/office/drawing/2014/main" xmlns="" val="20000"/>
                     </a:ext>
                   </a:extLst>
                 </a:gridCol>
@@ -11724,7 +11844,7 @@
                 </a:tc>
                 <a:extLst>
                   <a:ext uri="{0D108BD9-81ED-4DB2-BD59-A6C34878D82A}">
-                    <a16:rowId xmlns="" xmlns:a16="http://schemas.microsoft.com/office/drawing/2014/main" val="10000"/>
+                    <a16:rowId xmlns:a16="http://schemas.microsoft.com/office/drawing/2014/main" xmlns="" val="10000"/>
                   </a:ext>
                 </a:extLst>
               </a:tr>
@@ -11745,7 +11865,7 @@
                 </a:tc>
                 <a:extLst>
                   <a:ext uri="{0D108BD9-81ED-4DB2-BD59-A6C34878D82A}">
-                    <a16:rowId xmlns="" xmlns:a16="http://schemas.microsoft.com/office/drawing/2014/main" val="10001"/>
+                    <a16:rowId xmlns:a16="http://schemas.microsoft.com/office/drawing/2014/main" xmlns="" val="10001"/>
                   </a:ext>
                 </a:extLst>
               </a:tr>
@@ -11772,7 +11892,7 @@
                 </a:tc>
                 <a:extLst>
                   <a:ext uri="{0D108BD9-81ED-4DB2-BD59-A6C34878D82A}">
-                    <a16:rowId xmlns="" xmlns:a16="http://schemas.microsoft.com/office/drawing/2014/main" val="10002"/>
+                    <a16:rowId xmlns:a16="http://schemas.microsoft.com/office/drawing/2014/main" xmlns="" val="10002"/>
                   </a:ext>
                 </a:extLst>
               </a:tr>
@@ -11808,7 +11928,7 @@
                 <a:gridCol w="1800200">
                   <a:extLst>
                     <a:ext uri="{9D8B030D-6E8A-4147-A177-3AD203B41FA5}">
-                      <a16:colId xmlns="" xmlns:a16="http://schemas.microsoft.com/office/drawing/2014/main" val="20000"/>
+                      <a16:colId xmlns:a16="http://schemas.microsoft.com/office/drawing/2014/main" xmlns="" val="20000"/>
                     </a:ext>
                   </a:extLst>
                 </a:gridCol>
@@ -11829,7 +11949,7 @@
                 </a:tc>
                 <a:extLst>
                   <a:ext uri="{0D108BD9-81ED-4DB2-BD59-A6C34878D82A}">
-                    <a16:rowId xmlns="" xmlns:a16="http://schemas.microsoft.com/office/drawing/2014/main" val="10000"/>
+                    <a16:rowId xmlns:a16="http://schemas.microsoft.com/office/drawing/2014/main" xmlns="" val="10000"/>
                   </a:ext>
                 </a:extLst>
               </a:tr>
@@ -11849,7 +11969,7 @@
                 </a:tc>
                 <a:extLst>
                   <a:ext uri="{0D108BD9-81ED-4DB2-BD59-A6C34878D82A}">
-                    <a16:rowId xmlns="" xmlns:a16="http://schemas.microsoft.com/office/drawing/2014/main" val="10001"/>
+                    <a16:rowId xmlns:a16="http://schemas.microsoft.com/office/drawing/2014/main" xmlns="" val="10001"/>
                   </a:ext>
                 </a:extLst>
               </a:tr>
@@ -11869,7 +11989,7 @@
                 </a:tc>
                 <a:extLst>
                   <a:ext uri="{0D108BD9-81ED-4DB2-BD59-A6C34878D82A}">
-                    <a16:rowId xmlns="" xmlns:a16="http://schemas.microsoft.com/office/drawing/2014/main" val="10002"/>
+                    <a16:rowId xmlns:a16="http://schemas.microsoft.com/office/drawing/2014/main" xmlns="" val="10002"/>
                   </a:ext>
                 </a:extLst>
               </a:tr>
@@ -11905,7 +12025,7 @@
                 <a:gridCol w="1463824">
                   <a:extLst>
                     <a:ext uri="{9D8B030D-6E8A-4147-A177-3AD203B41FA5}">
-                      <a16:colId xmlns="" xmlns:a16="http://schemas.microsoft.com/office/drawing/2014/main" val="20000"/>
+                      <a16:colId xmlns:a16="http://schemas.microsoft.com/office/drawing/2014/main" xmlns="" val="20000"/>
                     </a:ext>
                   </a:extLst>
                 </a:gridCol>
@@ -11926,7 +12046,7 @@
                 </a:tc>
                 <a:extLst>
                   <a:ext uri="{0D108BD9-81ED-4DB2-BD59-A6C34878D82A}">
-                    <a16:rowId xmlns="" xmlns:a16="http://schemas.microsoft.com/office/drawing/2014/main" val="10000"/>
+                    <a16:rowId xmlns:a16="http://schemas.microsoft.com/office/drawing/2014/main" xmlns="" val="10000"/>
                   </a:ext>
                 </a:extLst>
               </a:tr>
@@ -11946,7 +12066,7 @@
                 </a:tc>
                 <a:extLst>
                   <a:ext uri="{0D108BD9-81ED-4DB2-BD59-A6C34878D82A}">
-                    <a16:rowId xmlns="" xmlns:a16="http://schemas.microsoft.com/office/drawing/2014/main" val="10001"/>
+                    <a16:rowId xmlns:a16="http://schemas.microsoft.com/office/drawing/2014/main" xmlns="" val="10001"/>
                   </a:ext>
                 </a:extLst>
               </a:tr>
@@ -11966,7 +12086,7 @@
                 </a:tc>
                 <a:extLst>
                   <a:ext uri="{0D108BD9-81ED-4DB2-BD59-A6C34878D82A}">
-                    <a16:rowId xmlns="" xmlns:a16="http://schemas.microsoft.com/office/drawing/2014/main" val="10002"/>
+                    <a16:rowId xmlns:a16="http://schemas.microsoft.com/office/drawing/2014/main" xmlns="" val="10002"/>
                   </a:ext>
                 </a:extLst>
               </a:tr>
@@ -12002,7 +12122,7 @@
                 <a:gridCol w="1463824">
                   <a:extLst>
                     <a:ext uri="{9D8B030D-6E8A-4147-A177-3AD203B41FA5}">
-                      <a16:colId xmlns="" xmlns:a16="http://schemas.microsoft.com/office/drawing/2014/main" val="20000"/>
+                      <a16:colId xmlns:a16="http://schemas.microsoft.com/office/drawing/2014/main" xmlns="" val="20000"/>
                     </a:ext>
                   </a:extLst>
                 </a:gridCol>
@@ -12024,7 +12144,7 @@
                 </a:tc>
                 <a:extLst>
                   <a:ext uri="{0D108BD9-81ED-4DB2-BD59-A6C34878D82A}">
-                    <a16:rowId xmlns="" xmlns:a16="http://schemas.microsoft.com/office/drawing/2014/main" val="10000"/>
+                    <a16:rowId xmlns:a16="http://schemas.microsoft.com/office/drawing/2014/main" xmlns="" val="10000"/>
                   </a:ext>
                 </a:extLst>
               </a:tr>
@@ -12062,7 +12182,7 @@
                 </a:tc>
                 <a:extLst>
                   <a:ext uri="{0D108BD9-81ED-4DB2-BD59-A6C34878D82A}">
-                    <a16:rowId xmlns="" xmlns:a16="http://schemas.microsoft.com/office/drawing/2014/main" val="10001"/>
+                    <a16:rowId xmlns:a16="http://schemas.microsoft.com/office/drawing/2014/main" xmlns="" val="10001"/>
                   </a:ext>
                 </a:extLst>
               </a:tr>
@@ -12083,7 +12203,7 @@
                 </a:tc>
                 <a:extLst>
                   <a:ext uri="{0D108BD9-81ED-4DB2-BD59-A6C34878D82A}">
-                    <a16:rowId xmlns="" xmlns:a16="http://schemas.microsoft.com/office/drawing/2014/main" val="10002"/>
+                    <a16:rowId xmlns:a16="http://schemas.microsoft.com/office/drawing/2014/main" xmlns="" val="10002"/>
                   </a:ext>
                 </a:extLst>
               </a:tr>
@@ -12119,7 +12239,7 @@
                 <a:gridCol w="1463824">
                   <a:extLst>
                     <a:ext uri="{9D8B030D-6E8A-4147-A177-3AD203B41FA5}">
-                      <a16:colId xmlns="" xmlns:a16="http://schemas.microsoft.com/office/drawing/2014/main" val="20000"/>
+                      <a16:colId xmlns:a16="http://schemas.microsoft.com/office/drawing/2014/main" xmlns="" val="20000"/>
                     </a:ext>
                   </a:extLst>
                 </a:gridCol>
@@ -12141,7 +12261,7 @@
                 </a:tc>
                 <a:extLst>
                   <a:ext uri="{0D108BD9-81ED-4DB2-BD59-A6C34878D82A}">
-                    <a16:rowId xmlns="" xmlns:a16="http://schemas.microsoft.com/office/drawing/2014/main" val="10000"/>
+                    <a16:rowId xmlns:a16="http://schemas.microsoft.com/office/drawing/2014/main" xmlns="" val="10000"/>
                   </a:ext>
                 </a:extLst>
               </a:tr>
@@ -12178,7 +12298,7 @@
                 </a:tc>
                 <a:extLst>
                   <a:ext uri="{0D108BD9-81ED-4DB2-BD59-A6C34878D82A}">
-                    <a16:rowId xmlns="" xmlns:a16="http://schemas.microsoft.com/office/drawing/2014/main" val="10001"/>
+                    <a16:rowId xmlns:a16="http://schemas.microsoft.com/office/drawing/2014/main" xmlns="" val="10001"/>
                   </a:ext>
                 </a:extLst>
               </a:tr>
@@ -12199,7 +12319,7 @@
                 </a:tc>
                 <a:extLst>
                   <a:ext uri="{0D108BD9-81ED-4DB2-BD59-A6C34878D82A}">
-                    <a16:rowId xmlns="" xmlns:a16="http://schemas.microsoft.com/office/drawing/2014/main" val="10002"/>
+                    <a16:rowId xmlns:a16="http://schemas.microsoft.com/office/drawing/2014/main" xmlns="" val="10002"/>
                   </a:ext>
                 </a:extLst>
               </a:tr>
@@ -12235,7 +12355,7 @@
                 <a:gridCol w="1463824">
                   <a:extLst>
                     <a:ext uri="{9D8B030D-6E8A-4147-A177-3AD203B41FA5}">
-                      <a16:colId xmlns="" xmlns:a16="http://schemas.microsoft.com/office/drawing/2014/main" val="20000"/>
+                      <a16:colId xmlns:a16="http://schemas.microsoft.com/office/drawing/2014/main" xmlns="" val="20000"/>
                     </a:ext>
                   </a:extLst>
                 </a:gridCol>
@@ -12256,7 +12376,7 @@
                 </a:tc>
                 <a:extLst>
                   <a:ext uri="{0D108BD9-81ED-4DB2-BD59-A6C34878D82A}">
-                    <a16:rowId xmlns="" xmlns:a16="http://schemas.microsoft.com/office/drawing/2014/main" val="10000"/>
+                    <a16:rowId xmlns:a16="http://schemas.microsoft.com/office/drawing/2014/main" xmlns="" val="10000"/>
                   </a:ext>
                 </a:extLst>
               </a:tr>
@@ -12293,7 +12413,7 @@
                 </a:tc>
                 <a:extLst>
                   <a:ext uri="{0D108BD9-81ED-4DB2-BD59-A6C34878D82A}">
-                    <a16:rowId xmlns="" xmlns:a16="http://schemas.microsoft.com/office/drawing/2014/main" val="10001"/>
+                    <a16:rowId xmlns:a16="http://schemas.microsoft.com/office/drawing/2014/main" xmlns="" val="10001"/>
                   </a:ext>
                 </a:extLst>
               </a:tr>
@@ -12314,7 +12434,7 @@
                 </a:tc>
                 <a:extLst>
                   <a:ext uri="{0D108BD9-81ED-4DB2-BD59-A6C34878D82A}">
-                    <a16:rowId xmlns="" xmlns:a16="http://schemas.microsoft.com/office/drawing/2014/main" val="10002"/>
+                    <a16:rowId xmlns:a16="http://schemas.microsoft.com/office/drawing/2014/main" xmlns="" val="10002"/>
                   </a:ext>
                 </a:extLst>
               </a:tr>
@@ -12585,7 +12705,7 @@
           <p:cNvPr id="51" name="28 Tabla">
             <a:extLst>
               <a:ext uri="{FF2B5EF4-FFF2-40B4-BE49-F238E27FC236}">
-                <a16:creationId xmlns="" xmlns:a16="http://schemas.microsoft.com/office/drawing/2014/main" id="{7BC80704-58FD-41C9-9A09-CA32EBE0B254}"/>
+                <a16:creationId xmlns:a16="http://schemas.microsoft.com/office/drawing/2014/main" xmlns="" id="{7BC80704-58FD-41C9-9A09-CA32EBE0B254}"/>
               </a:ext>
             </a:extLst>
           </p:cNvPr>
@@ -12614,7 +12734,7 @@
                 <a:gridCol w="1463824">
                   <a:extLst>
                     <a:ext uri="{9D8B030D-6E8A-4147-A177-3AD203B41FA5}">
-                      <a16:colId xmlns="" xmlns:a16="http://schemas.microsoft.com/office/drawing/2014/main" val="20000"/>
+                      <a16:colId xmlns:a16="http://schemas.microsoft.com/office/drawing/2014/main" xmlns="" val="20000"/>
                     </a:ext>
                   </a:extLst>
                 </a:gridCol>
@@ -12636,7 +12756,7 @@
                 </a:tc>
                 <a:extLst>
                   <a:ext uri="{0D108BD9-81ED-4DB2-BD59-A6C34878D82A}">
-                    <a16:rowId xmlns="" xmlns:a16="http://schemas.microsoft.com/office/drawing/2014/main" val="10000"/>
+                    <a16:rowId xmlns:a16="http://schemas.microsoft.com/office/drawing/2014/main" xmlns="" val="10000"/>
                   </a:ext>
                 </a:extLst>
               </a:tr>
@@ -12674,7 +12794,7 @@
                 </a:tc>
                 <a:extLst>
                   <a:ext uri="{0D108BD9-81ED-4DB2-BD59-A6C34878D82A}">
-                    <a16:rowId xmlns="" xmlns:a16="http://schemas.microsoft.com/office/drawing/2014/main" val="10001"/>
+                    <a16:rowId xmlns:a16="http://schemas.microsoft.com/office/drawing/2014/main" xmlns="" val="10001"/>
                   </a:ext>
                 </a:extLst>
               </a:tr>
@@ -12695,7 +12815,7 @@
                 </a:tc>
                 <a:extLst>
                   <a:ext uri="{0D108BD9-81ED-4DB2-BD59-A6C34878D82A}">
-                    <a16:rowId xmlns="" xmlns:a16="http://schemas.microsoft.com/office/drawing/2014/main" val="10002"/>
+                    <a16:rowId xmlns:a16="http://schemas.microsoft.com/office/drawing/2014/main" xmlns="" val="10002"/>
                   </a:ext>
                 </a:extLst>
               </a:tr>
@@ -12762,7 +12882,7 @@
                 <a:gridCol w="1103784">
                   <a:extLst>
                     <a:ext uri="{9D8B030D-6E8A-4147-A177-3AD203B41FA5}">
-                      <a16:colId xmlns="" xmlns:a16="http://schemas.microsoft.com/office/drawing/2014/main" val="20000"/>
+                      <a16:colId xmlns:a16="http://schemas.microsoft.com/office/drawing/2014/main" xmlns="" val="20000"/>
                     </a:ext>
                   </a:extLst>
                 </a:gridCol>
@@ -12784,7 +12904,7 @@
                 </a:tc>
                 <a:extLst>
                   <a:ext uri="{0D108BD9-81ED-4DB2-BD59-A6C34878D82A}">
-                    <a16:rowId xmlns="" xmlns:a16="http://schemas.microsoft.com/office/drawing/2014/main" val="10000"/>
+                    <a16:rowId xmlns:a16="http://schemas.microsoft.com/office/drawing/2014/main" xmlns="" val="10000"/>
                   </a:ext>
                 </a:extLst>
               </a:tr>
@@ -12809,7 +12929,7 @@
                 </a:tc>
                 <a:extLst>
                   <a:ext uri="{0D108BD9-81ED-4DB2-BD59-A6C34878D82A}">
-                    <a16:rowId xmlns="" xmlns:a16="http://schemas.microsoft.com/office/drawing/2014/main" val="10001"/>
+                    <a16:rowId xmlns:a16="http://schemas.microsoft.com/office/drawing/2014/main" xmlns="" val="10001"/>
                   </a:ext>
                 </a:extLst>
               </a:tr>
@@ -12851,7 +12971,7 @@
                 </a:tc>
                 <a:extLst>
                   <a:ext uri="{0D108BD9-81ED-4DB2-BD59-A6C34878D82A}">
-                    <a16:rowId xmlns="" xmlns:a16="http://schemas.microsoft.com/office/drawing/2014/main" val="10002"/>
+                    <a16:rowId xmlns:a16="http://schemas.microsoft.com/office/drawing/2014/main" xmlns="" val="10002"/>
                   </a:ext>
                 </a:extLst>
               </a:tr>
@@ -12894,7 +13014,7 @@
           <p:cNvPr id="2" name="24 Tabla">
             <a:extLst>
               <a:ext uri="{FF2B5EF4-FFF2-40B4-BE49-F238E27FC236}">
-                <a16:creationId xmlns="" xmlns:a16="http://schemas.microsoft.com/office/drawing/2014/main" id="{F6A8AF39-2787-44F7-B4F6-72ABA8FD81D3}"/>
+                <a16:creationId xmlns:a16="http://schemas.microsoft.com/office/drawing/2014/main" xmlns="" id="{F6A8AF39-2787-44F7-B4F6-72ABA8FD81D3}"/>
               </a:ext>
             </a:extLst>
           </p:cNvPr>
@@ -12904,7 +13024,7 @@
           <p:nvPr>
             <p:extLst>
               <p:ext uri="{D42A27DB-BD31-4B8C-83A1-F6EECF244321}">
-                <p14:modId xmlns:p14="http://schemas.microsoft.com/office/powerpoint/2010/main" val="712612657"/>
+                <p14:modId xmlns:p14="http://schemas.microsoft.com/office/powerpoint/2010/main" val="834022154"/>
               </p:ext>
             </p:extLst>
           </p:nvPr>
@@ -12923,7 +13043,7 @@
                 <a:gridCol w="1463824">
                   <a:extLst>
                     <a:ext uri="{9D8B030D-6E8A-4147-A177-3AD203B41FA5}">
-                      <a16:colId xmlns="" xmlns:a16="http://schemas.microsoft.com/office/drawing/2014/main" val="20000"/>
+                      <a16:colId xmlns:a16="http://schemas.microsoft.com/office/drawing/2014/main" xmlns="" val="20000"/>
                     </a:ext>
                   </a:extLst>
                 </a:gridCol>
@@ -12935,8 +13055,8 @@
                     <a:lstStyle/>
                     <a:p>
                       <a:r>
-                        <a:rPr lang="es-ES" sz="800" i="1" dirty="0" err="1"/>
-                        <a:t>ORGANISMOS_PAGADORES</a:t>
+                        <a:rPr lang="es-ES" sz="800" i="1" dirty="0" smtClean="0"/>
+                        <a:t>ORGANISMOS</a:t>
                       </a:r>
                       <a:endParaRPr lang="es-ES" sz="800" i="1" dirty="0"/>
                     </a:p>
@@ -12945,7 +13065,7 @@
                 </a:tc>
                 <a:extLst>
                   <a:ext uri="{0D108BD9-81ED-4DB2-BD59-A6C34878D82A}">
-                    <a16:rowId xmlns="" xmlns:a16="http://schemas.microsoft.com/office/drawing/2014/main" val="10000"/>
+                    <a16:rowId xmlns:a16="http://schemas.microsoft.com/office/drawing/2014/main" xmlns="" val="10000"/>
                   </a:ext>
                 </a:extLst>
               </a:tr>
@@ -12966,7 +13086,7 @@
                 </a:tc>
                 <a:extLst>
                   <a:ext uri="{0D108BD9-81ED-4DB2-BD59-A6C34878D82A}">
-                    <a16:rowId xmlns="" xmlns:a16="http://schemas.microsoft.com/office/drawing/2014/main" val="10001"/>
+                    <a16:rowId xmlns:a16="http://schemas.microsoft.com/office/drawing/2014/main" xmlns="" val="10001"/>
                   </a:ext>
                 </a:extLst>
               </a:tr>
@@ -13053,7 +13173,7 @@
                 </a:tc>
                 <a:extLst>
                   <a:ext uri="{0D108BD9-81ED-4DB2-BD59-A6C34878D82A}">
-                    <a16:rowId xmlns="" xmlns:a16="http://schemas.microsoft.com/office/drawing/2014/main" val="10002"/>
+                    <a16:rowId xmlns:a16="http://schemas.microsoft.com/office/drawing/2014/main" xmlns="" val="10002"/>
                   </a:ext>
                 </a:extLst>
               </a:tr>
@@ -13066,7 +13186,7 @@
           <p:cNvPr id="3" name="24 Tabla">
             <a:extLst>
               <a:ext uri="{FF2B5EF4-FFF2-40B4-BE49-F238E27FC236}">
-                <a16:creationId xmlns="" xmlns:a16="http://schemas.microsoft.com/office/drawing/2014/main" id="{F6A8AF39-2787-44F7-B4F6-72ABA8FD81D3}"/>
+                <a16:creationId xmlns:a16="http://schemas.microsoft.com/office/drawing/2014/main" xmlns="" id="{F6A8AF39-2787-44F7-B4F6-72ABA8FD81D3}"/>
               </a:ext>
             </a:extLst>
           </p:cNvPr>
@@ -13095,7 +13215,7 @@
                 <a:gridCol w="1463824">
                   <a:extLst>
                     <a:ext uri="{9D8B030D-6E8A-4147-A177-3AD203B41FA5}">
-                      <a16:colId xmlns="" xmlns:a16="http://schemas.microsoft.com/office/drawing/2014/main" val="20000"/>
+                      <a16:colId xmlns:a16="http://schemas.microsoft.com/office/drawing/2014/main" xmlns="" val="20000"/>
                     </a:ext>
                   </a:extLst>
                 </a:gridCol>
@@ -13117,7 +13237,7 @@
                 </a:tc>
                 <a:extLst>
                   <a:ext uri="{0D108BD9-81ED-4DB2-BD59-A6C34878D82A}">
-                    <a16:rowId xmlns="" xmlns:a16="http://schemas.microsoft.com/office/drawing/2014/main" val="10000"/>
+                    <a16:rowId xmlns:a16="http://schemas.microsoft.com/office/drawing/2014/main" xmlns="" val="10000"/>
                   </a:ext>
                 </a:extLst>
               </a:tr>
@@ -13137,7 +13257,7 @@
                 </a:tc>
                 <a:extLst>
                   <a:ext uri="{0D108BD9-81ED-4DB2-BD59-A6C34878D82A}">
-                    <a16:rowId xmlns="" xmlns:a16="http://schemas.microsoft.com/office/drawing/2014/main" val="10001"/>
+                    <a16:rowId xmlns:a16="http://schemas.microsoft.com/office/drawing/2014/main" xmlns="" val="10001"/>
                   </a:ext>
                 </a:extLst>
               </a:tr>
@@ -13158,7 +13278,7 @@
                 </a:tc>
                 <a:extLst>
                   <a:ext uri="{0D108BD9-81ED-4DB2-BD59-A6C34878D82A}">
-                    <a16:rowId xmlns="" xmlns:a16="http://schemas.microsoft.com/office/drawing/2014/main" val="10002"/>
+                    <a16:rowId xmlns:a16="http://schemas.microsoft.com/office/drawing/2014/main" xmlns="" val="10002"/>
                   </a:ext>
                 </a:extLst>
               </a:tr>
@@ -13171,7 +13291,7 @@
           <p:cNvPr id="4" name="24 Tabla">
             <a:extLst>
               <a:ext uri="{FF2B5EF4-FFF2-40B4-BE49-F238E27FC236}">
-                <a16:creationId xmlns="" xmlns:a16="http://schemas.microsoft.com/office/drawing/2014/main" id="{F6A8AF39-2787-44F7-B4F6-72ABA8FD81D3}"/>
+                <a16:creationId xmlns:a16="http://schemas.microsoft.com/office/drawing/2014/main" xmlns="" id="{F6A8AF39-2787-44F7-B4F6-72ABA8FD81D3}"/>
               </a:ext>
             </a:extLst>
           </p:cNvPr>
@@ -13200,7 +13320,7 @@
                 <a:gridCol w="1463824">
                   <a:extLst>
                     <a:ext uri="{9D8B030D-6E8A-4147-A177-3AD203B41FA5}">
-                      <a16:colId xmlns="" xmlns:a16="http://schemas.microsoft.com/office/drawing/2014/main" val="20000"/>
+                      <a16:colId xmlns:a16="http://schemas.microsoft.com/office/drawing/2014/main" xmlns="" val="20000"/>
                     </a:ext>
                   </a:extLst>
                 </a:gridCol>
@@ -13222,7 +13342,7 @@
                 </a:tc>
                 <a:extLst>
                   <a:ext uri="{0D108BD9-81ED-4DB2-BD59-A6C34878D82A}">
-                    <a16:rowId xmlns="" xmlns:a16="http://schemas.microsoft.com/office/drawing/2014/main" val="10000"/>
+                    <a16:rowId xmlns:a16="http://schemas.microsoft.com/office/drawing/2014/main" xmlns="" val="10000"/>
                   </a:ext>
                 </a:extLst>
               </a:tr>
@@ -13243,7 +13363,7 @@
                 </a:tc>
                 <a:extLst>
                   <a:ext uri="{0D108BD9-81ED-4DB2-BD59-A6C34878D82A}">
-                    <a16:rowId xmlns="" xmlns:a16="http://schemas.microsoft.com/office/drawing/2014/main" val="10001"/>
+                    <a16:rowId xmlns:a16="http://schemas.microsoft.com/office/drawing/2014/main" xmlns="" val="10001"/>
                   </a:ext>
                 </a:extLst>
               </a:tr>
@@ -13264,7 +13384,7 @@
                 </a:tc>
                 <a:extLst>
                   <a:ext uri="{0D108BD9-81ED-4DB2-BD59-A6C34878D82A}">
-                    <a16:rowId xmlns="" xmlns:a16="http://schemas.microsoft.com/office/drawing/2014/main" val="10002"/>
+                    <a16:rowId xmlns:a16="http://schemas.microsoft.com/office/drawing/2014/main" xmlns="" val="10002"/>
                   </a:ext>
                 </a:extLst>
               </a:tr>
@@ -13335,7 +13455,7 @@
           <p:cNvPr id="9" name="36 Tabla">
             <a:extLst>
               <a:ext uri="{FF2B5EF4-FFF2-40B4-BE49-F238E27FC236}">
-                <a16:creationId xmlns="" xmlns:a16="http://schemas.microsoft.com/office/drawing/2014/main" id="{74E71F2C-CF67-4AFF-8B3F-B7DD43BBFA8A}"/>
+                <a16:creationId xmlns:a16="http://schemas.microsoft.com/office/drawing/2014/main" xmlns="" id="{74E71F2C-CF67-4AFF-8B3F-B7DD43BBFA8A}"/>
               </a:ext>
             </a:extLst>
           </p:cNvPr>
@@ -13364,7 +13484,7 @@
                 <a:gridCol w="1463824">
                   <a:extLst>
                     <a:ext uri="{9D8B030D-6E8A-4147-A177-3AD203B41FA5}">
-                      <a16:colId xmlns="" xmlns:a16="http://schemas.microsoft.com/office/drawing/2014/main" val="20000"/>
+                      <a16:colId xmlns:a16="http://schemas.microsoft.com/office/drawing/2014/main" xmlns="" val="20000"/>
                     </a:ext>
                   </a:extLst>
                 </a:gridCol>
@@ -13385,7 +13505,7 @@
                 </a:tc>
                 <a:extLst>
                   <a:ext uri="{0D108BD9-81ED-4DB2-BD59-A6C34878D82A}">
-                    <a16:rowId xmlns="" xmlns:a16="http://schemas.microsoft.com/office/drawing/2014/main" val="10000"/>
+                    <a16:rowId xmlns:a16="http://schemas.microsoft.com/office/drawing/2014/main" xmlns="" val="10000"/>
                   </a:ext>
                 </a:extLst>
               </a:tr>
@@ -13406,7 +13526,7 @@
                 </a:tc>
                 <a:extLst>
                   <a:ext uri="{0D108BD9-81ED-4DB2-BD59-A6C34878D82A}">
-                    <a16:rowId xmlns="" xmlns:a16="http://schemas.microsoft.com/office/drawing/2014/main" val="10001"/>
+                    <a16:rowId xmlns:a16="http://schemas.microsoft.com/office/drawing/2014/main" xmlns="" val="10001"/>
                   </a:ext>
                 </a:extLst>
               </a:tr>
@@ -13434,7 +13554,7 @@
                 </a:tc>
                 <a:extLst>
                   <a:ext uri="{0D108BD9-81ED-4DB2-BD59-A6C34878D82A}">
-                    <a16:rowId xmlns="" xmlns:a16="http://schemas.microsoft.com/office/drawing/2014/main" val="10002"/>
+                    <a16:rowId xmlns:a16="http://schemas.microsoft.com/office/drawing/2014/main" xmlns="" val="10002"/>
                   </a:ext>
                 </a:extLst>
               </a:tr>
@@ -13470,7 +13590,7 @@
                 <a:gridCol w="1463824">
                   <a:extLst>
                     <a:ext uri="{9D8B030D-6E8A-4147-A177-3AD203B41FA5}">
-                      <a16:colId xmlns="" xmlns:a16="http://schemas.microsoft.com/office/drawing/2014/main" val="20000"/>
+                      <a16:colId xmlns:a16="http://schemas.microsoft.com/office/drawing/2014/main" xmlns="" val="20000"/>
                     </a:ext>
                   </a:extLst>
                 </a:gridCol>
@@ -13491,7 +13611,7 @@
                 </a:tc>
                 <a:extLst>
                   <a:ext uri="{0D108BD9-81ED-4DB2-BD59-A6C34878D82A}">
-                    <a16:rowId xmlns="" xmlns:a16="http://schemas.microsoft.com/office/drawing/2014/main" val="10000"/>
+                    <a16:rowId xmlns:a16="http://schemas.microsoft.com/office/drawing/2014/main" xmlns="" val="10000"/>
                   </a:ext>
                 </a:extLst>
               </a:tr>
@@ -13512,7 +13632,7 @@
                 </a:tc>
                 <a:extLst>
                   <a:ext uri="{0D108BD9-81ED-4DB2-BD59-A6C34878D82A}">
-                    <a16:rowId xmlns="" xmlns:a16="http://schemas.microsoft.com/office/drawing/2014/main" val="10001"/>
+                    <a16:rowId xmlns:a16="http://schemas.microsoft.com/office/drawing/2014/main" xmlns="" val="10001"/>
                   </a:ext>
                 </a:extLst>
               </a:tr>
@@ -13533,7 +13653,7 @@
                 </a:tc>
                 <a:extLst>
                   <a:ext uri="{0D108BD9-81ED-4DB2-BD59-A6C34878D82A}">
-                    <a16:rowId xmlns="" xmlns:a16="http://schemas.microsoft.com/office/drawing/2014/main" val="10002"/>
+                    <a16:rowId xmlns:a16="http://schemas.microsoft.com/office/drawing/2014/main" xmlns="" val="10002"/>
                   </a:ext>
                 </a:extLst>
               </a:tr>
@@ -13598,7 +13718,7 @@
                 <a:gridCol w="1463824">
                   <a:extLst>
                     <a:ext uri="{9D8B030D-6E8A-4147-A177-3AD203B41FA5}">
-                      <a16:colId xmlns="" xmlns:a16="http://schemas.microsoft.com/office/drawing/2014/main" val="20000"/>
+                      <a16:colId xmlns:a16="http://schemas.microsoft.com/office/drawing/2014/main" xmlns="" val="20000"/>
                     </a:ext>
                   </a:extLst>
                 </a:gridCol>
@@ -13619,7 +13739,7 @@
                 </a:tc>
                 <a:extLst>
                   <a:ext uri="{0D108BD9-81ED-4DB2-BD59-A6C34878D82A}">
-                    <a16:rowId xmlns="" xmlns:a16="http://schemas.microsoft.com/office/drawing/2014/main" val="10000"/>
+                    <a16:rowId xmlns:a16="http://schemas.microsoft.com/office/drawing/2014/main" xmlns="" val="10000"/>
                   </a:ext>
                 </a:extLst>
               </a:tr>
@@ -13640,7 +13760,7 @@
                 </a:tc>
                 <a:extLst>
                   <a:ext uri="{0D108BD9-81ED-4DB2-BD59-A6C34878D82A}">
-                    <a16:rowId xmlns="" xmlns:a16="http://schemas.microsoft.com/office/drawing/2014/main" val="10001"/>
+                    <a16:rowId xmlns:a16="http://schemas.microsoft.com/office/drawing/2014/main" xmlns="" val="10001"/>
                   </a:ext>
                 </a:extLst>
               </a:tr>
@@ -13661,7 +13781,7 @@
                 </a:tc>
                 <a:extLst>
                   <a:ext uri="{0D108BD9-81ED-4DB2-BD59-A6C34878D82A}">
-                    <a16:rowId xmlns="" xmlns:a16="http://schemas.microsoft.com/office/drawing/2014/main" val="10002"/>
+                    <a16:rowId xmlns:a16="http://schemas.microsoft.com/office/drawing/2014/main" xmlns="" val="10002"/>
                   </a:ext>
                 </a:extLst>
               </a:tr>
@@ -13697,7 +13817,7 @@
                 <a:gridCol w="1463824">
                   <a:extLst>
                     <a:ext uri="{9D8B030D-6E8A-4147-A177-3AD203B41FA5}">
-                      <a16:colId xmlns="" xmlns:a16="http://schemas.microsoft.com/office/drawing/2014/main" val="20000"/>
+                      <a16:colId xmlns:a16="http://schemas.microsoft.com/office/drawing/2014/main" xmlns="" val="20000"/>
                     </a:ext>
                   </a:extLst>
                 </a:gridCol>
@@ -13718,7 +13838,7 @@
                 </a:tc>
                 <a:extLst>
                   <a:ext uri="{0D108BD9-81ED-4DB2-BD59-A6C34878D82A}">
-                    <a16:rowId xmlns="" xmlns:a16="http://schemas.microsoft.com/office/drawing/2014/main" val="10000"/>
+                    <a16:rowId xmlns:a16="http://schemas.microsoft.com/office/drawing/2014/main" xmlns="" val="10000"/>
                   </a:ext>
                 </a:extLst>
               </a:tr>
@@ -13739,7 +13859,7 @@
                 </a:tc>
                 <a:extLst>
                   <a:ext uri="{0D108BD9-81ED-4DB2-BD59-A6C34878D82A}">
-                    <a16:rowId xmlns="" xmlns:a16="http://schemas.microsoft.com/office/drawing/2014/main" val="10001"/>
+                    <a16:rowId xmlns:a16="http://schemas.microsoft.com/office/drawing/2014/main" xmlns="" val="10001"/>
                   </a:ext>
                 </a:extLst>
               </a:tr>
@@ -13760,7 +13880,7 @@
                 </a:tc>
                 <a:extLst>
                   <a:ext uri="{0D108BD9-81ED-4DB2-BD59-A6C34878D82A}">
-                    <a16:rowId xmlns="" xmlns:a16="http://schemas.microsoft.com/office/drawing/2014/main" val="10002"/>
+                    <a16:rowId xmlns:a16="http://schemas.microsoft.com/office/drawing/2014/main" xmlns="" val="10002"/>
                   </a:ext>
                 </a:extLst>
               </a:tr>
@@ -13796,7 +13916,7 @@
                 <a:gridCol w="1463824">
                   <a:extLst>
                     <a:ext uri="{9D8B030D-6E8A-4147-A177-3AD203B41FA5}">
-                      <a16:colId xmlns="" xmlns:a16="http://schemas.microsoft.com/office/drawing/2014/main" val="20000"/>
+                      <a16:colId xmlns:a16="http://schemas.microsoft.com/office/drawing/2014/main" xmlns="" val="20000"/>
                     </a:ext>
                   </a:extLst>
                 </a:gridCol>
@@ -13817,7 +13937,7 @@
                 </a:tc>
                 <a:extLst>
                   <a:ext uri="{0D108BD9-81ED-4DB2-BD59-A6C34878D82A}">
-                    <a16:rowId xmlns="" xmlns:a16="http://schemas.microsoft.com/office/drawing/2014/main" val="10000"/>
+                    <a16:rowId xmlns:a16="http://schemas.microsoft.com/office/drawing/2014/main" xmlns="" val="10000"/>
                   </a:ext>
                 </a:extLst>
               </a:tr>
@@ -13838,7 +13958,7 @@
                 </a:tc>
                 <a:extLst>
                   <a:ext uri="{0D108BD9-81ED-4DB2-BD59-A6C34878D82A}">
-                    <a16:rowId xmlns="" xmlns:a16="http://schemas.microsoft.com/office/drawing/2014/main" val="10001"/>
+                    <a16:rowId xmlns:a16="http://schemas.microsoft.com/office/drawing/2014/main" xmlns="" val="10001"/>
                   </a:ext>
                 </a:extLst>
               </a:tr>
@@ -13859,7 +13979,7 @@
                 </a:tc>
                 <a:extLst>
                   <a:ext uri="{0D108BD9-81ED-4DB2-BD59-A6C34878D82A}">
-                    <a16:rowId xmlns="" xmlns:a16="http://schemas.microsoft.com/office/drawing/2014/main" val="10002"/>
+                    <a16:rowId xmlns:a16="http://schemas.microsoft.com/office/drawing/2014/main" xmlns="" val="10002"/>
                   </a:ext>
                 </a:extLst>
               </a:tr>
@@ -13895,7 +14015,7 @@
                 <a:gridCol w="1463824">
                   <a:extLst>
                     <a:ext uri="{9D8B030D-6E8A-4147-A177-3AD203B41FA5}">
-                      <a16:colId xmlns="" xmlns:a16="http://schemas.microsoft.com/office/drawing/2014/main" val="20000"/>
+                      <a16:colId xmlns:a16="http://schemas.microsoft.com/office/drawing/2014/main" xmlns="" val="20000"/>
                     </a:ext>
                   </a:extLst>
                 </a:gridCol>
@@ -13916,7 +14036,7 @@
                 </a:tc>
                 <a:extLst>
                   <a:ext uri="{0D108BD9-81ED-4DB2-BD59-A6C34878D82A}">
-                    <a16:rowId xmlns="" xmlns:a16="http://schemas.microsoft.com/office/drawing/2014/main" val="10000"/>
+                    <a16:rowId xmlns:a16="http://schemas.microsoft.com/office/drawing/2014/main" xmlns="" val="10000"/>
                   </a:ext>
                 </a:extLst>
               </a:tr>
@@ -13937,7 +14057,7 @@
                 </a:tc>
                 <a:extLst>
                   <a:ext uri="{0D108BD9-81ED-4DB2-BD59-A6C34878D82A}">
-                    <a16:rowId xmlns="" xmlns:a16="http://schemas.microsoft.com/office/drawing/2014/main" val="10001"/>
+                    <a16:rowId xmlns:a16="http://schemas.microsoft.com/office/drawing/2014/main" xmlns="" val="10001"/>
                   </a:ext>
                 </a:extLst>
               </a:tr>
@@ -13958,7 +14078,7 @@
                 </a:tc>
                 <a:extLst>
                   <a:ext uri="{0D108BD9-81ED-4DB2-BD59-A6C34878D82A}">
-                    <a16:rowId xmlns="" xmlns:a16="http://schemas.microsoft.com/office/drawing/2014/main" val="10002"/>
+                    <a16:rowId xmlns:a16="http://schemas.microsoft.com/office/drawing/2014/main" xmlns="" val="10002"/>
                   </a:ext>
                 </a:extLst>
               </a:tr>
@@ -14112,7 +14232,7 @@
                 <a:gridCol w="1463824">
                   <a:extLst>
                     <a:ext uri="{9D8B030D-6E8A-4147-A177-3AD203B41FA5}">
-                      <a16:colId xmlns="" xmlns:a16="http://schemas.microsoft.com/office/drawing/2014/main" val="20000"/>
+                      <a16:colId xmlns:a16="http://schemas.microsoft.com/office/drawing/2014/main" xmlns="" val="20000"/>
                     </a:ext>
                   </a:extLst>
                 </a:gridCol>
@@ -14134,7 +14254,7 @@
                 </a:tc>
                 <a:extLst>
                   <a:ext uri="{0D108BD9-81ED-4DB2-BD59-A6C34878D82A}">
-                    <a16:rowId xmlns="" xmlns:a16="http://schemas.microsoft.com/office/drawing/2014/main" val="10000"/>
+                    <a16:rowId xmlns:a16="http://schemas.microsoft.com/office/drawing/2014/main" xmlns="" val="10000"/>
                   </a:ext>
                 </a:extLst>
               </a:tr>
@@ -14155,7 +14275,7 @@
                 </a:tc>
                 <a:extLst>
                   <a:ext uri="{0D108BD9-81ED-4DB2-BD59-A6C34878D82A}">
-                    <a16:rowId xmlns="" xmlns:a16="http://schemas.microsoft.com/office/drawing/2014/main" val="10001"/>
+                    <a16:rowId xmlns:a16="http://schemas.microsoft.com/office/drawing/2014/main" xmlns="" val="10001"/>
                   </a:ext>
                 </a:extLst>
               </a:tr>
@@ -14176,7 +14296,7 @@
                 </a:tc>
                 <a:extLst>
                   <a:ext uri="{0D108BD9-81ED-4DB2-BD59-A6C34878D82A}">
-                    <a16:rowId xmlns="" xmlns:a16="http://schemas.microsoft.com/office/drawing/2014/main" val="10002"/>
+                    <a16:rowId xmlns:a16="http://schemas.microsoft.com/office/drawing/2014/main" xmlns="" val="10002"/>
                   </a:ext>
                 </a:extLst>
               </a:tr>
@@ -14212,7 +14332,7 @@
                 <a:gridCol w="1463824">
                   <a:extLst>
                     <a:ext uri="{9D8B030D-6E8A-4147-A177-3AD203B41FA5}">
-                      <a16:colId xmlns="" xmlns:a16="http://schemas.microsoft.com/office/drawing/2014/main" val="20000"/>
+                      <a16:colId xmlns:a16="http://schemas.microsoft.com/office/drawing/2014/main" xmlns="" val="20000"/>
                     </a:ext>
                   </a:extLst>
                 </a:gridCol>
@@ -14234,7 +14354,7 @@
                 </a:tc>
                 <a:extLst>
                   <a:ext uri="{0D108BD9-81ED-4DB2-BD59-A6C34878D82A}">
-                    <a16:rowId xmlns="" xmlns:a16="http://schemas.microsoft.com/office/drawing/2014/main" val="10000"/>
+                    <a16:rowId xmlns:a16="http://schemas.microsoft.com/office/drawing/2014/main" xmlns="" val="10000"/>
                   </a:ext>
                 </a:extLst>
               </a:tr>
@@ -14255,7 +14375,7 @@
                 </a:tc>
                 <a:extLst>
                   <a:ext uri="{0D108BD9-81ED-4DB2-BD59-A6C34878D82A}">
-                    <a16:rowId xmlns="" xmlns:a16="http://schemas.microsoft.com/office/drawing/2014/main" val="10001"/>
+                    <a16:rowId xmlns:a16="http://schemas.microsoft.com/office/drawing/2014/main" xmlns="" val="10001"/>
                   </a:ext>
                 </a:extLst>
               </a:tr>
@@ -14276,7 +14396,7 @@
                 </a:tc>
                 <a:extLst>
                   <a:ext uri="{0D108BD9-81ED-4DB2-BD59-A6C34878D82A}">
-                    <a16:rowId xmlns="" xmlns:a16="http://schemas.microsoft.com/office/drawing/2014/main" val="10002"/>
+                    <a16:rowId xmlns:a16="http://schemas.microsoft.com/office/drawing/2014/main" xmlns="" val="10002"/>
                   </a:ext>
                 </a:extLst>
               </a:tr>

</xml_diff>